<commit_message>
change final representation data
</commit_message>
<xml_diff>
--- a/D조_최종발표.pptx
+++ b/D조_최종발표.pptx
@@ -123,6 +123,11 @@
       </a:defRPr>
     </a:lvl9pPr>
   </p:defaultTextStyle>
+  <p:extLst>
+    <p:ext uri="{EFAFB233-063F-42B5-8137-9DF3F51BA10A}">
+      <p15:sldGuideLst xmlns:p15="http://schemas.microsoft.com/office/powerpoint/2012/main"/>
+    </p:ext>
+  </p:extLst>
 </p:presentation>
 </file>
 
@@ -897,10 +902,16 @@
         <a:p>
           <a:pPr latinLnBrk="1"/>
           <a:r>
-            <a:rPr lang="en-US" altLang="ko-KR" sz="1600" dirty="0" smtClean="0"/>
+            <a:rPr lang="en-US" altLang="ko-KR" sz="1600" dirty="0" smtClean="0">
+              <a:latin typeface="D2Coding" panose="020B0609020101020101" pitchFamily="49" charset="-127"/>
+              <a:ea typeface="D2Coding" panose="020B0609020101020101" pitchFamily="49" charset="-127"/>
+            </a:rPr>
             <a:t>(backend) module test</a:t>
           </a:r>
-          <a:endParaRPr lang="ko-KR" altLang="en-US" sz="1600" dirty="0"/>
+          <a:endParaRPr lang="ko-KR" altLang="en-US" sz="1600" dirty="0">
+            <a:latin typeface="D2Coding" panose="020B0609020101020101" pitchFamily="49" charset="-127"/>
+            <a:ea typeface="D2Coding" panose="020B0609020101020101" pitchFamily="49" charset="-127"/>
+          </a:endParaRPr>
         </a:p>
       </dgm:t>
     </dgm:pt>
@@ -913,10 +924,16 @@
         <a:p>
           <a:pPr latinLnBrk="1"/>
           <a:r>
-            <a:rPr lang="ko-KR" altLang="en-US" sz="2200" b="1" dirty="0" smtClean="0"/>
+            <a:rPr lang="ko-KR" altLang="en-US" sz="2200" b="1" dirty="0" smtClean="0">
+              <a:latin typeface="D2Coding" panose="020B0609020101020101" pitchFamily="49" charset="-127"/>
+              <a:ea typeface="D2Coding" panose="020B0609020101020101" pitchFamily="49" charset="-127"/>
+            </a:rPr>
             <a:t>테스트</a:t>
           </a:r>
-          <a:endParaRPr lang="ko-KR" altLang="en-US" sz="2200" b="1" dirty="0"/>
+          <a:endParaRPr lang="ko-KR" altLang="en-US" sz="2200" b="1" dirty="0">
+            <a:latin typeface="D2Coding" panose="020B0609020101020101" pitchFamily="49" charset="-127"/>
+            <a:ea typeface="D2Coding" panose="020B0609020101020101" pitchFamily="49" charset="-127"/>
+          </a:endParaRPr>
         </a:p>
       </dgm:t>
     </dgm:pt>
@@ -977,14 +994,23 @@
         <a:p>
           <a:pPr latinLnBrk="1"/>
           <a:r>
-            <a:rPr lang="ko-KR" altLang="en-US" sz="1600" dirty="0" smtClean="0"/>
+            <a:rPr lang="ko-KR" altLang="en-US" sz="1600" dirty="0" smtClean="0">
+              <a:latin typeface="D2Coding" panose="020B0609020101020101" pitchFamily="49" charset="-127"/>
+              <a:ea typeface="D2Coding" panose="020B0609020101020101" pitchFamily="49" charset="-127"/>
+            </a:rPr>
             <a:t>동적 데이터 </a:t>
           </a:r>
           <a:r>
-            <a:rPr lang="ko-KR" altLang="en-US" sz="1600" dirty="0" err="1" smtClean="0"/>
+            <a:rPr lang="ko-KR" altLang="en-US" sz="1600" dirty="0" err="1" smtClean="0">
+              <a:latin typeface="D2Coding" panose="020B0609020101020101" pitchFamily="49" charset="-127"/>
+              <a:ea typeface="D2Coding" panose="020B0609020101020101" pitchFamily="49" charset="-127"/>
+            </a:rPr>
             <a:t>렌더링</a:t>
           </a:r>
-          <a:endParaRPr lang="ko-KR" altLang="en-US" sz="1600" dirty="0"/>
+          <a:endParaRPr lang="ko-KR" altLang="en-US" sz="1600" dirty="0">
+            <a:latin typeface="D2Coding" panose="020B0609020101020101" pitchFamily="49" charset="-127"/>
+            <a:ea typeface="D2Coding" panose="020B0609020101020101" pitchFamily="49" charset="-127"/>
+          </a:endParaRPr>
         </a:p>
       </dgm:t>
     </dgm:pt>
@@ -997,10 +1023,16 @@
         <a:p>
           <a:pPr latinLnBrk="1"/>
           <a:r>
-            <a:rPr lang="ko-KR" altLang="en-US" sz="2200" b="1" dirty="0" smtClean="0"/>
+            <a:rPr lang="ko-KR" altLang="en-US" sz="2200" b="1" dirty="0" smtClean="0">
+              <a:latin typeface="D2Coding" panose="020B0609020101020101" pitchFamily="49" charset="-127"/>
+              <a:ea typeface="D2Coding" panose="020B0609020101020101" pitchFamily="49" charset="-127"/>
+            </a:rPr>
             <a:t>서비스</a:t>
           </a:r>
-          <a:endParaRPr lang="ko-KR" altLang="en-US" sz="2200" b="1" dirty="0"/>
+          <a:endParaRPr lang="ko-KR" altLang="en-US" sz="2200" b="1" dirty="0">
+            <a:latin typeface="D2Coding" panose="020B0609020101020101" pitchFamily="49" charset="-127"/>
+            <a:ea typeface="D2Coding" panose="020B0609020101020101" pitchFamily="49" charset="-127"/>
+          </a:endParaRPr>
         </a:p>
       </dgm:t>
     </dgm:pt>
@@ -1061,10 +1093,16 @@
         <a:p>
           <a:pPr latinLnBrk="1"/>
           <a:r>
-            <a:rPr lang="ko-KR" altLang="en-US" sz="1600" dirty="0" smtClean="0"/>
+            <a:rPr lang="ko-KR" altLang="en-US" sz="1600" dirty="0" smtClean="0">
+              <a:latin typeface="D2Coding" panose="020B0609020101020101" pitchFamily="49" charset="-127"/>
+              <a:ea typeface="D2Coding" panose="020B0609020101020101" pitchFamily="49" charset="-127"/>
+            </a:rPr>
             <a:t>람다 아키텍처</a:t>
           </a:r>
-          <a:endParaRPr lang="ko-KR" altLang="en-US" sz="1600" dirty="0"/>
+          <a:endParaRPr lang="ko-KR" altLang="en-US" sz="1600" dirty="0">
+            <a:latin typeface="D2Coding" panose="020B0609020101020101" pitchFamily="49" charset="-127"/>
+            <a:ea typeface="D2Coding" panose="020B0609020101020101" pitchFamily="49" charset="-127"/>
+          </a:endParaRPr>
         </a:p>
       </dgm:t>
     </dgm:pt>
@@ -1077,17 +1115,26 @@
         <a:p>
           <a:pPr latinLnBrk="1"/>
           <a:r>
-            <a:rPr lang="en-US" altLang="ko-KR" sz="2200" b="1" dirty="0" smtClean="0"/>
+            <a:rPr lang="en-US" altLang="ko-KR" sz="2200" b="1" dirty="0" smtClean="0">
+              <a:latin typeface="D2Coding" panose="020B0609020101020101" pitchFamily="49" charset="-127"/>
+              <a:ea typeface="D2Coding" panose="020B0609020101020101" pitchFamily="49" charset="-127"/>
+            </a:rPr>
             <a:t>Data </a:t>
           </a:r>
         </a:p>
         <a:p>
           <a:pPr latinLnBrk="1"/>
           <a:r>
-            <a:rPr lang="ko-KR" altLang="en-US" sz="2200" b="1" dirty="0" smtClean="0"/>
+            <a:rPr lang="ko-KR" altLang="en-US" sz="2200" b="1" dirty="0" smtClean="0">
+              <a:latin typeface="D2Coding" panose="020B0609020101020101" pitchFamily="49" charset="-127"/>
+              <a:ea typeface="D2Coding" panose="020B0609020101020101" pitchFamily="49" charset="-127"/>
+            </a:rPr>
             <a:t>가공처리</a:t>
           </a:r>
-          <a:endParaRPr lang="ko-KR" altLang="en-US" sz="2200" b="1" dirty="0"/>
+          <a:endParaRPr lang="ko-KR" altLang="en-US" sz="2200" b="1" dirty="0">
+            <a:latin typeface="D2Coding" panose="020B0609020101020101" pitchFamily="49" charset="-127"/>
+            <a:ea typeface="D2Coding" panose="020B0609020101020101" pitchFamily="49" charset="-127"/>
+          </a:endParaRPr>
         </a:p>
       </dgm:t>
     </dgm:pt>
@@ -1148,22 +1195,37 @@
         <a:p>
           <a:pPr latinLnBrk="1"/>
           <a:r>
-            <a:rPr lang="ko-KR" altLang="en-US" sz="1600" dirty="0" err="1" smtClean="0"/>
+            <a:rPr lang="ko-KR" altLang="en-US" sz="1600" dirty="0" err="1" smtClean="0">
+              <a:latin typeface="D2Coding" panose="020B0609020101020101" pitchFamily="49" charset="-127"/>
+              <a:ea typeface="D2Coding" panose="020B0609020101020101" pitchFamily="49" charset="-127"/>
+            </a:rPr>
             <a:t>관계형</a:t>
           </a:r>
           <a:r>
-            <a:rPr lang="ko-KR" altLang="en-US" sz="1600" dirty="0" smtClean="0"/>
+            <a:rPr lang="ko-KR" altLang="en-US" sz="1600" dirty="0" smtClean="0">
+              <a:latin typeface="D2Coding" panose="020B0609020101020101" pitchFamily="49" charset="-127"/>
+              <a:ea typeface="D2Coding" panose="020B0609020101020101" pitchFamily="49" charset="-127"/>
+            </a:rPr>
             <a:t> </a:t>
           </a:r>
           <a:r>
-            <a:rPr lang="en-US" altLang="ko-KR" sz="1600" dirty="0" smtClean="0"/>
+            <a:rPr lang="en-US" altLang="ko-KR" sz="1600" dirty="0" smtClean="0">
+              <a:latin typeface="D2Coding" panose="020B0609020101020101" pitchFamily="49" charset="-127"/>
+              <a:ea typeface="D2Coding" panose="020B0609020101020101" pitchFamily="49" charset="-127"/>
+            </a:rPr>
             <a:t>DB </a:t>
           </a:r>
           <a:r>
-            <a:rPr lang="ko-KR" altLang="en-US" sz="1600" dirty="0" smtClean="0"/>
+            <a:rPr lang="ko-KR" altLang="en-US" sz="1600" dirty="0" smtClean="0">
+              <a:latin typeface="D2Coding" panose="020B0609020101020101" pitchFamily="49" charset="-127"/>
+              <a:ea typeface="D2Coding" panose="020B0609020101020101" pitchFamily="49" charset="-127"/>
+            </a:rPr>
             <a:t>모델</a:t>
           </a:r>
-          <a:endParaRPr lang="ko-KR" altLang="en-US" sz="1600" dirty="0"/>
+          <a:endParaRPr lang="ko-KR" altLang="en-US" sz="1600" dirty="0">
+            <a:latin typeface="D2Coding" panose="020B0609020101020101" pitchFamily="49" charset="-127"/>
+            <a:ea typeface="D2Coding" panose="020B0609020101020101" pitchFamily="49" charset="-127"/>
+          </a:endParaRPr>
         </a:p>
       </dgm:t>
     </dgm:pt>
@@ -1176,10 +1238,16 @@
         <a:p>
           <a:pPr latinLnBrk="1"/>
           <a:r>
-            <a:rPr lang="en-US" altLang="ko-KR" sz="2200" b="1" dirty="0" smtClean="0"/>
+            <a:rPr lang="en-US" altLang="ko-KR" sz="2200" b="1" dirty="0" smtClean="0">
+              <a:latin typeface="D2Coding" panose="020B0609020101020101" pitchFamily="49" charset="-127"/>
+              <a:ea typeface="D2Coding" panose="020B0609020101020101" pitchFamily="49" charset="-127"/>
+            </a:rPr>
             <a:t>DB</a:t>
           </a:r>
-          <a:endParaRPr lang="ko-KR" altLang="en-US" sz="2200" b="1" dirty="0"/>
+          <a:endParaRPr lang="ko-KR" altLang="en-US" sz="2200" b="1" dirty="0">
+            <a:latin typeface="D2Coding" panose="020B0609020101020101" pitchFamily="49" charset="-127"/>
+            <a:ea typeface="D2Coding" panose="020B0609020101020101" pitchFamily="49" charset="-127"/>
+          </a:endParaRPr>
         </a:p>
       </dgm:t>
     </dgm:pt>
@@ -1240,10 +1308,12 @@
         <a:p>
           <a:pPr latinLnBrk="1"/>
           <a:r>
-            <a:rPr lang="en-US" altLang="ko-KR" sz="1600" dirty="0" smtClean="0"/>
+            <a:rPr lang="en-US" altLang="ko-KR" sz="1600" dirty="0" smtClean="0">
+              <a:latin typeface="D2Coding" panose="020B0609020101020101" pitchFamily="49" charset="-127"/>
+              <a:ea typeface="D2Coding" panose="020B0609020101020101" pitchFamily="49" charset="-127"/>
+            </a:rPr>
             <a:t>Generic programming</a:t>
           </a:r>
-          <a:endParaRPr lang="en-US" altLang="ko-KR" sz="1600" dirty="0" smtClean="0"/>
         </a:p>
       </dgm:t>
     </dgm:pt>
@@ -1280,10 +1350,12 @@
         <a:p>
           <a:pPr latinLnBrk="1"/>
           <a:r>
-            <a:rPr lang="en-US" altLang="ko-KR" sz="1600" dirty="0" smtClean="0"/>
+            <a:rPr lang="en-US" altLang="ko-KR" sz="1600" dirty="0" smtClean="0">
+              <a:latin typeface="D2Coding" panose="020B0609020101020101" pitchFamily="49" charset="-127"/>
+              <a:ea typeface="D2Coding" panose="020B0609020101020101" pitchFamily="49" charset="-127"/>
+            </a:rPr>
             <a:t>Heuristic algorithm</a:t>
           </a:r>
-          <a:endParaRPr lang="en-US" altLang="ko-KR" sz="1600" dirty="0" smtClean="0"/>
         </a:p>
       </dgm:t>
     </dgm:pt>
@@ -1320,10 +1392,16 @@
         <a:p>
           <a:pPr latinLnBrk="1"/>
           <a:r>
-            <a:rPr lang="en-US" altLang="ko-KR" sz="1600" smtClean="0"/>
+            <a:rPr lang="en-US" altLang="ko-KR" sz="1600" smtClean="0">
+              <a:latin typeface="D2Coding" panose="020B0609020101020101" pitchFamily="49" charset="-127"/>
+              <a:ea typeface="D2Coding" panose="020B0609020101020101" pitchFamily="49" charset="-127"/>
+            </a:rPr>
             <a:t>script</a:t>
           </a:r>
-          <a:endParaRPr lang="en-US" altLang="ko-KR" sz="1600" dirty="0" smtClean="0"/>
+          <a:endParaRPr lang="en-US" altLang="ko-KR" sz="1600" dirty="0" smtClean="0">
+            <a:latin typeface="D2Coding" panose="020B0609020101020101" pitchFamily="49" charset="-127"/>
+            <a:ea typeface="D2Coding" panose="020B0609020101020101" pitchFamily="49" charset="-127"/>
+          </a:endParaRPr>
         </a:p>
       </dgm:t>
     </dgm:pt>
@@ -1360,10 +1438,12 @@
         <a:p>
           <a:pPr latinLnBrk="1"/>
           <a:r>
-            <a:rPr lang="en-US" altLang="ko-KR" sz="1600" dirty="0" smtClean="0"/>
+            <a:rPr lang="en-US" altLang="ko-KR" sz="1600" dirty="0" smtClean="0">
+              <a:latin typeface="D2Coding" panose="020B0609020101020101" pitchFamily="49" charset="-127"/>
+              <a:ea typeface="D2Coding" panose="020B0609020101020101" pitchFamily="49" charset="-127"/>
+            </a:rPr>
             <a:t>REST</a:t>
           </a:r>
-          <a:endParaRPr lang="en-US" altLang="ko-KR" sz="1600" dirty="0" smtClean="0"/>
         </a:p>
       </dgm:t>
     </dgm:pt>
@@ -1400,22 +1480,37 @@
         <a:p>
           <a:pPr latinLnBrk="1"/>
           <a:r>
-            <a:rPr lang="en-US" altLang="ko-KR" sz="1600" dirty="0" smtClean="0"/>
+            <a:rPr lang="en-US" altLang="ko-KR" sz="1600" dirty="0" smtClean="0">
+              <a:latin typeface="D2Coding" panose="020B0609020101020101" pitchFamily="49" charset="-127"/>
+              <a:ea typeface="D2Coding" panose="020B0609020101020101" pitchFamily="49" charset="-127"/>
+            </a:rPr>
             <a:t>(</a:t>
           </a:r>
           <a:r>
-            <a:rPr lang="en-US" altLang="ko-KR" sz="1600" dirty="0" err="1" smtClean="0"/>
+            <a:rPr lang="en-US" altLang="ko-KR" sz="1600" dirty="0" err="1" smtClean="0">
+              <a:latin typeface="D2Coding" panose="020B0609020101020101" pitchFamily="49" charset="-127"/>
+              <a:ea typeface="D2Coding" panose="020B0609020101020101" pitchFamily="49" charset="-127"/>
+            </a:rPr>
             <a:t>tps</a:t>
           </a:r>
           <a:r>
-            <a:rPr lang="en-US" altLang="ko-KR" sz="1600" dirty="0" smtClean="0"/>
+            <a:rPr lang="en-US" altLang="ko-KR" sz="1600" dirty="0" smtClean="0">
+              <a:latin typeface="D2Coding" panose="020B0609020101020101" pitchFamily="49" charset="-127"/>
+              <a:ea typeface="D2Coding" panose="020B0609020101020101" pitchFamily="49" charset="-127"/>
+            </a:rPr>
             <a:t>) </a:t>
           </a:r>
           <a:r>
-            <a:rPr lang="en-US" altLang="ko-KR" sz="1600" dirty="0" err="1" smtClean="0"/>
+            <a:rPr lang="en-US" altLang="ko-KR" sz="1600" dirty="0" err="1" smtClean="0">
+              <a:latin typeface="D2Coding" panose="020B0609020101020101" pitchFamily="49" charset="-127"/>
+              <a:ea typeface="D2Coding" panose="020B0609020101020101" pitchFamily="49" charset="-127"/>
+            </a:rPr>
             <a:t>nGrinder</a:t>
           </a:r>
-          <a:endParaRPr lang="ko-KR" altLang="en-US" sz="1600" dirty="0"/>
+          <a:endParaRPr lang="ko-KR" altLang="en-US" sz="1600" dirty="0">
+            <a:latin typeface="D2Coding" panose="020B0609020101020101" pitchFamily="49" charset="-127"/>
+            <a:ea typeface="D2Coding" panose="020B0609020101020101" pitchFamily="49" charset="-127"/>
+          </a:endParaRPr>
         </a:p>
       </dgm:t>
     </dgm:pt>
@@ -1453,6 +1548,14 @@
         </dgm:presLayoutVars>
       </dgm:prSet>
       <dgm:spPr/>
+      <dgm:t>
+        <a:bodyPr/>
+        <a:lstStyle/>
+        <a:p>
+          <a:pPr latinLnBrk="1"/>
+          <a:endParaRPr lang="ko-KR" altLang="en-US"/>
+        </a:p>
+      </dgm:t>
     </dgm:pt>
     <dgm:pt modelId="{0616F4D9-2387-444E-936F-7893D93F572A}" type="pres">
       <dgm:prSet presAssocID="{7BCC920D-3B88-4C53-8E36-BC66877F9F39}" presName="children" presStyleCnt="0"/>
@@ -1676,42 +1779,42 @@
     </dgm:pt>
   </dgm:ptLst>
   <dgm:cxnLst>
+    <dgm:cxn modelId="{791D0732-F9B7-4228-9F3D-5FF0E15B2107}" type="presOf" srcId="{AC5F9715-D79C-4065-8DB7-BA04D5C5F32A}" destId="{26FB3259-8963-4CD0-B88F-EE9B615A6628}" srcOrd="0" destOrd="1" presId="urn:microsoft.com/office/officeart/2005/8/layout/cycle4"/>
+    <dgm:cxn modelId="{E6F076B4-DF1C-42D3-B46A-0FF05C0C1B50}" srcId="{1B505CE1-A335-47DB-A8B8-642DDEBBACFE}" destId="{2B4A171C-3D40-49F0-93E2-79C84671CEED}" srcOrd="2" destOrd="0" parTransId="{44729C19-760A-4ACF-B8BB-78E1A7F5C1DF}" sibTransId="{D4161053-F4B2-4BDF-8394-4EACBD5BE127}"/>
+    <dgm:cxn modelId="{B0659538-A9F6-4B5B-837C-7EBCD9C876F7}" srcId="{275555CA-D7EB-4DD8-B2DD-CC908549D563}" destId="{922E52F2-F426-4357-8897-48613AFD40B4}" srcOrd="1" destOrd="0" parTransId="{4F4B634A-40D8-4A83-AABC-E5CD7661F6C1}" sibTransId="{EA741DDF-55E8-4ED6-BF28-58BA98A1743D}"/>
+    <dgm:cxn modelId="{D43325A7-7237-4F80-B83D-56DE610678B5}" type="presOf" srcId="{F5E17574-00D3-4A2E-A4E2-711818759C67}" destId="{FB6F5CFE-5200-4784-8EDB-682CF6E4E479}" srcOrd="0" destOrd="0" presId="urn:microsoft.com/office/officeart/2005/8/layout/cycle4"/>
     <dgm:cxn modelId="{C71581B4-826A-49B4-B316-57210BCD8E65}" type="presOf" srcId="{D2F1A2C0-9BAC-4B8E-B3D4-3E21DA2BBCF9}" destId="{6EBD0D7E-4BA0-45E0-8546-FDC01E3B80FD}" srcOrd="1" destOrd="0" presId="urn:microsoft.com/office/officeart/2005/8/layout/cycle4"/>
+    <dgm:cxn modelId="{D2AD92C9-C849-4ACA-B2D7-D6009EEC838E}" srcId="{7BCC920D-3B88-4C53-8E36-BC66877F9F39}" destId="{F5E17574-00D3-4A2E-A4E2-711818759C67}" srcOrd="1" destOrd="0" parTransId="{C632954C-E36E-4F26-B7EB-B2F8187F609E}" sibTransId="{4D1D54DA-C271-40C9-9550-E768A439EC93}"/>
+    <dgm:cxn modelId="{CB7A50C2-1F12-40B7-B316-F8F16E35CEC0}" type="presOf" srcId="{7BCC920D-3B88-4C53-8E36-BC66877F9F39}" destId="{DDDDC2B4-219B-4399-9306-A531B3DB679A}" srcOrd="0" destOrd="0" presId="urn:microsoft.com/office/officeart/2005/8/layout/cycle4"/>
+    <dgm:cxn modelId="{40CBDA5C-17AE-4B47-95C4-A1CFE32A11DF}" type="presOf" srcId="{2B4A171C-3D40-49F0-93E2-79C84671CEED}" destId="{2E65AF03-B92B-4B63-BA11-1DA53B9A4588}" srcOrd="0" destOrd="2" presId="urn:microsoft.com/office/officeart/2005/8/layout/cycle4"/>
+    <dgm:cxn modelId="{0BCEC3F6-8A73-483A-8920-FB6FBF91DBB9}" type="presOf" srcId="{922E52F2-F426-4357-8897-48613AFD40B4}" destId="{2562036B-9823-4741-9C30-324B57BBEC50}" srcOrd="1" destOrd="1" presId="urn:microsoft.com/office/officeart/2005/8/layout/cycle4"/>
+    <dgm:cxn modelId="{0F71A250-B277-4D9A-BD80-2C6E34CF1AF5}" type="presOf" srcId="{43144167-4046-4D98-AFD6-F41EF55D3F70}" destId="{3D823FB0-5594-478B-B37B-2B747336C0D3}" srcOrd="1" destOrd="0" presId="urn:microsoft.com/office/officeart/2005/8/layout/cycle4"/>
+    <dgm:cxn modelId="{5C8EC971-F3D5-403A-B4EB-AAE1C4A17DF4}" srcId="{FDCE3464-6338-42FA-95C4-3E70B55B95C3}" destId="{AC5F9715-D79C-4065-8DB7-BA04D5C5F32A}" srcOrd="1" destOrd="0" parTransId="{AB614F14-73C0-4B8D-AFAE-5BE5F86AD674}" sibTransId="{AA33D22F-7B69-4D4B-9F8E-B2E3D44F9C8E}"/>
+    <dgm:cxn modelId="{7C8A374E-D487-4D33-9420-E3A5C5AB23E2}" srcId="{F5E17574-00D3-4A2E-A4E2-711818759C67}" destId="{88D22048-C226-4B80-96F5-A6FF9EB77260}" srcOrd="1" destOrd="0" parTransId="{2FEC0CB4-90C2-47F6-A748-5CF93A677CF4}" sibTransId="{EA2D429B-261C-49D0-AEF4-5F5167FB04E9}"/>
+    <dgm:cxn modelId="{A815E0C3-6D91-4D0A-87DD-0DF13861D488}" type="presOf" srcId="{74BB59CA-B3E4-4677-AB66-F0E4F324D2DE}" destId="{2562036B-9823-4741-9C30-324B57BBEC50}" srcOrd="1" destOrd="0" presId="urn:microsoft.com/office/officeart/2005/8/layout/cycle4"/>
+    <dgm:cxn modelId="{F242BCE3-24DD-499D-9D66-77490D445607}" srcId="{275555CA-D7EB-4DD8-B2DD-CC908549D563}" destId="{74BB59CA-B3E4-4677-AB66-F0E4F324D2DE}" srcOrd="0" destOrd="0" parTransId="{0B342BEE-8E5B-4918-83D3-F8FAF20F62BC}" sibTransId="{BED6D5A7-4FD4-4AB3-863F-1D23801B5A28}"/>
+    <dgm:cxn modelId="{D74F363E-ACC2-40DA-AA4A-DFEDB70E0229}" type="presOf" srcId="{FDCE3464-6338-42FA-95C4-3E70B55B95C3}" destId="{DF71F2E0-47F5-41F2-AF8A-50E3759F6FE7}" srcOrd="0" destOrd="0" presId="urn:microsoft.com/office/officeart/2005/8/layout/cycle4"/>
+    <dgm:cxn modelId="{D69D8647-E3B4-4757-9AFC-3B8B8DB74DE1}" srcId="{7BCC920D-3B88-4C53-8E36-BC66877F9F39}" destId="{275555CA-D7EB-4DD8-B2DD-CC908549D563}" srcOrd="2" destOrd="0" parTransId="{E9FD5650-2F56-4614-965B-21E77F8A4546}" sibTransId="{06DE3C21-CE19-470B-A48A-E9EBD7829020}"/>
+    <dgm:cxn modelId="{68EE7918-CE39-40E1-AA14-057B5BFAC31A}" type="presOf" srcId="{A2CE1466-F34B-43B7-8ECB-4398E85CFDAD}" destId="{2E65AF03-B92B-4B63-BA11-1DA53B9A4588}" srcOrd="0" destOrd="1" presId="urn:microsoft.com/office/officeart/2005/8/layout/cycle4"/>
+    <dgm:cxn modelId="{7F87FF7C-CAA7-43F7-8922-C738C673435A}" type="presOf" srcId="{275555CA-D7EB-4DD8-B2DD-CC908549D563}" destId="{19D9A80A-C349-4038-84E5-8FE7F6C68CDA}" srcOrd="0" destOrd="0" presId="urn:microsoft.com/office/officeart/2005/8/layout/cycle4"/>
+    <dgm:cxn modelId="{F2DF1B9B-322A-454D-A3CF-76C4CC0F243C}" type="presOf" srcId="{A2CE1466-F34B-43B7-8ECB-4398E85CFDAD}" destId="{6EBD0D7E-4BA0-45E0-8546-FDC01E3B80FD}" srcOrd="1" destOrd="1" presId="urn:microsoft.com/office/officeart/2005/8/layout/cycle4"/>
+    <dgm:cxn modelId="{00463FFD-AEBA-4CF5-82D4-88EDA469C8C3}" type="presOf" srcId="{74BB59CA-B3E4-4677-AB66-F0E4F324D2DE}" destId="{6856C79E-7115-4188-B9D4-DE2AC7202F51}" srcOrd="0" destOrd="0" presId="urn:microsoft.com/office/officeart/2005/8/layout/cycle4"/>
+    <dgm:cxn modelId="{19C71F93-BC68-482F-B1D3-14E977182175}" type="presOf" srcId="{8E9FF4C9-8904-4931-B1B1-E0599ED1352B}" destId="{26FB3259-8963-4CD0-B88F-EE9B615A6628}" srcOrd="0" destOrd="0" presId="urn:microsoft.com/office/officeart/2005/8/layout/cycle4"/>
+    <dgm:cxn modelId="{F06CC154-F8C5-46F0-B78B-B78B96CA03B0}" type="presOf" srcId="{1B505CE1-A335-47DB-A8B8-642DDEBBACFE}" destId="{CAC30FB5-D215-4172-A9C1-69F27D948E39}" srcOrd="0" destOrd="0" presId="urn:microsoft.com/office/officeart/2005/8/layout/cycle4"/>
+    <dgm:cxn modelId="{FC36E040-9E86-427F-BEA7-21044232F34D}" type="presOf" srcId="{88D22048-C226-4B80-96F5-A6FF9EB77260}" destId="{3D823FB0-5594-478B-B37B-2B747336C0D3}" srcOrd="1" destOrd="1" presId="urn:microsoft.com/office/officeart/2005/8/layout/cycle4"/>
+    <dgm:cxn modelId="{556B3694-5E8F-40AA-BBB4-9E8AC7C887CC}" type="presOf" srcId="{88D22048-C226-4B80-96F5-A6FF9EB77260}" destId="{B83E5333-0549-48BE-AC65-CAE0E2E3048A}" srcOrd="0" destOrd="1" presId="urn:microsoft.com/office/officeart/2005/8/layout/cycle4"/>
+    <dgm:cxn modelId="{4387171C-4EAE-4EF7-82A5-55771BE428D8}" type="presOf" srcId="{8E9FF4C9-8904-4931-B1B1-E0599ED1352B}" destId="{9E31BBC7-3180-42ED-B620-3768608FF042}" srcOrd="1" destOrd="0" presId="urn:microsoft.com/office/officeart/2005/8/layout/cycle4"/>
+    <dgm:cxn modelId="{9CCC7F84-F95E-453D-BCE0-FCBF8692BD71}" type="presOf" srcId="{922E52F2-F426-4357-8897-48613AFD40B4}" destId="{6856C79E-7115-4188-B9D4-DE2AC7202F51}" srcOrd="0" destOrd="1" presId="urn:microsoft.com/office/officeart/2005/8/layout/cycle4"/>
+    <dgm:cxn modelId="{0BCBF041-42A1-4902-B3F4-8054F8BC5474}" type="presOf" srcId="{D2F1A2C0-9BAC-4B8E-B3D4-3E21DA2BBCF9}" destId="{2E65AF03-B92B-4B63-BA11-1DA53B9A4588}" srcOrd="0" destOrd="0" presId="urn:microsoft.com/office/officeart/2005/8/layout/cycle4"/>
     <dgm:cxn modelId="{EE129873-3DCE-40E5-87A1-0FF86CE8C1A3}" type="presOf" srcId="{43144167-4046-4D98-AFD6-F41EF55D3F70}" destId="{B83E5333-0549-48BE-AC65-CAE0E2E3048A}" srcOrd="0" destOrd="0" presId="urn:microsoft.com/office/officeart/2005/8/layout/cycle4"/>
+    <dgm:cxn modelId="{2FEB7C22-E307-48B9-9842-EB85B6A3EABB}" srcId="{1B505CE1-A335-47DB-A8B8-642DDEBBACFE}" destId="{A2CE1466-F34B-43B7-8ECB-4398E85CFDAD}" srcOrd="1" destOrd="0" parTransId="{F120B362-9F34-4C70-94A4-E09D05465505}" sibTransId="{4C6611D5-06EF-4C34-8639-A44114480B53}"/>
+    <dgm:cxn modelId="{B9772CDC-0C09-4073-B1A0-FAE484DE9A56}" srcId="{FDCE3464-6338-42FA-95C4-3E70B55B95C3}" destId="{8E9FF4C9-8904-4931-B1B1-E0599ED1352B}" srcOrd="0" destOrd="0" parTransId="{CCBB098E-47EB-431B-A47D-AD32185C922C}" sibTransId="{DE83B460-8A7B-4E97-A491-DCAEED80603A}"/>
+    <dgm:cxn modelId="{1820372F-CFBA-46EE-9B46-4344CDADDAA4}" type="presOf" srcId="{2B4A171C-3D40-49F0-93E2-79C84671CEED}" destId="{6EBD0D7E-4BA0-45E0-8546-FDC01E3B80FD}" srcOrd="1" destOrd="2" presId="urn:microsoft.com/office/officeart/2005/8/layout/cycle4"/>
+    <dgm:cxn modelId="{DA4A026B-814B-4A0C-BF4A-7DCFBFD3913A}" srcId="{1B505CE1-A335-47DB-A8B8-642DDEBBACFE}" destId="{D2F1A2C0-9BAC-4B8E-B3D4-3E21DA2BBCF9}" srcOrd="0" destOrd="0" parTransId="{2DDE2588-249A-404D-931C-13A044FAF239}" sibTransId="{B5054DA1-3097-4788-B417-C9807E02121D}"/>
+    <dgm:cxn modelId="{07D4A55F-44AC-4284-AC81-E6C19D8E246A}" srcId="{7BCC920D-3B88-4C53-8E36-BC66877F9F39}" destId="{FDCE3464-6338-42FA-95C4-3E70B55B95C3}" srcOrd="3" destOrd="0" parTransId="{2E8DE614-C19C-4415-A328-ADA15E6345F8}" sibTransId="{B9CEC731-895E-4592-986C-B661D5646108}"/>
+    <dgm:cxn modelId="{FE7E69FC-6FF9-4D5C-B584-53433895CC6B}" srcId="{F5E17574-00D3-4A2E-A4E2-711818759C67}" destId="{43144167-4046-4D98-AFD6-F41EF55D3F70}" srcOrd="0" destOrd="0" parTransId="{14E951AC-CA93-4DF4-A149-9A58B6A85F90}" sibTransId="{87CBA173-E8DE-40B0-B82C-21FBBECC272A}"/>
+    <dgm:cxn modelId="{9D9328E9-5320-4A4E-BED0-44095BD17EAB}" srcId="{7BCC920D-3B88-4C53-8E36-BC66877F9F39}" destId="{1B505CE1-A335-47DB-A8B8-642DDEBBACFE}" srcOrd="0" destOrd="0" parTransId="{CDC6FB0A-980E-4A99-A051-6E9538CB423C}" sibTransId="{7C578917-BE8F-4D8A-84AE-9B545F5030A3}"/>
     <dgm:cxn modelId="{78215FD7-D9F6-446C-8905-D225390C7089}" type="presOf" srcId="{AC5F9715-D79C-4065-8DB7-BA04D5C5F32A}" destId="{9E31BBC7-3180-42ED-B620-3768608FF042}" srcOrd="1" destOrd="1" presId="urn:microsoft.com/office/officeart/2005/8/layout/cycle4"/>
-    <dgm:cxn modelId="{FE7E69FC-6FF9-4D5C-B584-53433895CC6B}" srcId="{F5E17574-00D3-4A2E-A4E2-711818759C67}" destId="{43144167-4046-4D98-AFD6-F41EF55D3F70}" srcOrd="0" destOrd="0" parTransId="{14E951AC-CA93-4DF4-A149-9A58B6A85F90}" sibTransId="{87CBA173-E8DE-40B0-B82C-21FBBECC272A}"/>
-    <dgm:cxn modelId="{CB7A50C2-1F12-40B7-B316-F8F16E35CEC0}" type="presOf" srcId="{7BCC920D-3B88-4C53-8E36-BC66877F9F39}" destId="{DDDDC2B4-219B-4399-9306-A531B3DB679A}" srcOrd="0" destOrd="0" presId="urn:microsoft.com/office/officeart/2005/8/layout/cycle4"/>
-    <dgm:cxn modelId="{00463FFD-AEBA-4CF5-82D4-88EDA469C8C3}" type="presOf" srcId="{74BB59CA-B3E4-4677-AB66-F0E4F324D2DE}" destId="{6856C79E-7115-4188-B9D4-DE2AC7202F51}" srcOrd="0" destOrd="0" presId="urn:microsoft.com/office/officeart/2005/8/layout/cycle4"/>
-    <dgm:cxn modelId="{0BCBF041-42A1-4902-B3F4-8054F8BC5474}" type="presOf" srcId="{D2F1A2C0-9BAC-4B8E-B3D4-3E21DA2BBCF9}" destId="{2E65AF03-B92B-4B63-BA11-1DA53B9A4588}" srcOrd="0" destOrd="0" presId="urn:microsoft.com/office/officeart/2005/8/layout/cycle4"/>
-    <dgm:cxn modelId="{19C71F93-BC68-482F-B1D3-14E977182175}" type="presOf" srcId="{8E9FF4C9-8904-4931-B1B1-E0599ED1352B}" destId="{26FB3259-8963-4CD0-B88F-EE9B615A6628}" srcOrd="0" destOrd="0" presId="urn:microsoft.com/office/officeart/2005/8/layout/cycle4"/>
-    <dgm:cxn modelId="{7F87FF7C-CAA7-43F7-8922-C738C673435A}" type="presOf" srcId="{275555CA-D7EB-4DD8-B2DD-CC908549D563}" destId="{19D9A80A-C349-4038-84E5-8FE7F6C68CDA}" srcOrd="0" destOrd="0" presId="urn:microsoft.com/office/officeart/2005/8/layout/cycle4"/>
-    <dgm:cxn modelId="{DA4A026B-814B-4A0C-BF4A-7DCFBFD3913A}" srcId="{1B505CE1-A335-47DB-A8B8-642DDEBBACFE}" destId="{D2F1A2C0-9BAC-4B8E-B3D4-3E21DA2BBCF9}" srcOrd="0" destOrd="0" parTransId="{2DDE2588-249A-404D-931C-13A044FAF239}" sibTransId="{B5054DA1-3097-4788-B417-C9807E02121D}"/>
-    <dgm:cxn modelId="{5C8EC971-F3D5-403A-B4EB-AAE1C4A17DF4}" srcId="{FDCE3464-6338-42FA-95C4-3E70B55B95C3}" destId="{AC5F9715-D79C-4065-8DB7-BA04D5C5F32A}" srcOrd="1" destOrd="0" parTransId="{AB614F14-73C0-4B8D-AFAE-5BE5F86AD674}" sibTransId="{AA33D22F-7B69-4D4B-9F8E-B2E3D44F9C8E}"/>
-    <dgm:cxn modelId="{B9772CDC-0C09-4073-B1A0-FAE484DE9A56}" srcId="{FDCE3464-6338-42FA-95C4-3E70B55B95C3}" destId="{8E9FF4C9-8904-4931-B1B1-E0599ED1352B}" srcOrd="0" destOrd="0" parTransId="{CCBB098E-47EB-431B-A47D-AD32185C922C}" sibTransId="{DE83B460-8A7B-4E97-A491-DCAEED80603A}"/>
-    <dgm:cxn modelId="{791D0732-F9B7-4228-9F3D-5FF0E15B2107}" type="presOf" srcId="{AC5F9715-D79C-4065-8DB7-BA04D5C5F32A}" destId="{26FB3259-8963-4CD0-B88F-EE9B615A6628}" srcOrd="0" destOrd="1" presId="urn:microsoft.com/office/officeart/2005/8/layout/cycle4"/>
-    <dgm:cxn modelId="{07D4A55F-44AC-4284-AC81-E6C19D8E246A}" srcId="{7BCC920D-3B88-4C53-8E36-BC66877F9F39}" destId="{FDCE3464-6338-42FA-95C4-3E70B55B95C3}" srcOrd="3" destOrd="0" parTransId="{2E8DE614-C19C-4415-A328-ADA15E6345F8}" sibTransId="{B9CEC731-895E-4592-986C-B661D5646108}"/>
-    <dgm:cxn modelId="{0BCEC3F6-8A73-483A-8920-FB6FBF91DBB9}" type="presOf" srcId="{922E52F2-F426-4357-8897-48613AFD40B4}" destId="{2562036B-9823-4741-9C30-324B57BBEC50}" srcOrd="1" destOrd="1" presId="urn:microsoft.com/office/officeart/2005/8/layout/cycle4"/>
-    <dgm:cxn modelId="{F06CC154-F8C5-46F0-B78B-B78B96CA03B0}" type="presOf" srcId="{1B505CE1-A335-47DB-A8B8-642DDEBBACFE}" destId="{CAC30FB5-D215-4172-A9C1-69F27D948E39}" srcOrd="0" destOrd="0" presId="urn:microsoft.com/office/officeart/2005/8/layout/cycle4"/>
-    <dgm:cxn modelId="{9D9328E9-5320-4A4E-BED0-44095BD17EAB}" srcId="{7BCC920D-3B88-4C53-8E36-BC66877F9F39}" destId="{1B505CE1-A335-47DB-A8B8-642DDEBBACFE}" srcOrd="0" destOrd="0" parTransId="{CDC6FB0A-980E-4A99-A051-6E9538CB423C}" sibTransId="{7C578917-BE8F-4D8A-84AE-9B545F5030A3}"/>
-    <dgm:cxn modelId="{D43325A7-7237-4F80-B83D-56DE610678B5}" type="presOf" srcId="{F5E17574-00D3-4A2E-A4E2-711818759C67}" destId="{FB6F5CFE-5200-4784-8EDB-682CF6E4E479}" srcOrd="0" destOrd="0" presId="urn:microsoft.com/office/officeart/2005/8/layout/cycle4"/>
-    <dgm:cxn modelId="{A815E0C3-6D91-4D0A-87DD-0DF13861D488}" type="presOf" srcId="{74BB59CA-B3E4-4677-AB66-F0E4F324D2DE}" destId="{2562036B-9823-4741-9C30-324B57BBEC50}" srcOrd="1" destOrd="0" presId="urn:microsoft.com/office/officeart/2005/8/layout/cycle4"/>
-    <dgm:cxn modelId="{68EE7918-CE39-40E1-AA14-057B5BFAC31A}" type="presOf" srcId="{A2CE1466-F34B-43B7-8ECB-4398E85CFDAD}" destId="{2E65AF03-B92B-4B63-BA11-1DA53B9A4588}" srcOrd="0" destOrd="1" presId="urn:microsoft.com/office/officeart/2005/8/layout/cycle4"/>
-    <dgm:cxn modelId="{F2DF1B9B-322A-454D-A3CF-76C4CC0F243C}" type="presOf" srcId="{A2CE1466-F34B-43B7-8ECB-4398E85CFDAD}" destId="{6EBD0D7E-4BA0-45E0-8546-FDC01E3B80FD}" srcOrd="1" destOrd="1" presId="urn:microsoft.com/office/officeart/2005/8/layout/cycle4"/>
-    <dgm:cxn modelId="{E6F076B4-DF1C-42D3-B46A-0FF05C0C1B50}" srcId="{1B505CE1-A335-47DB-A8B8-642DDEBBACFE}" destId="{2B4A171C-3D40-49F0-93E2-79C84671CEED}" srcOrd="2" destOrd="0" parTransId="{44729C19-760A-4ACF-B8BB-78E1A7F5C1DF}" sibTransId="{D4161053-F4B2-4BDF-8394-4EACBD5BE127}"/>
-    <dgm:cxn modelId="{D69D8647-E3B4-4757-9AFC-3B8B8DB74DE1}" srcId="{7BCC920D-3B88-4C53-8E36-BC66877F9F39}" destId="{275555CA-D7EB-4DD8-B2DD-CC908549D563}" srcOrd="2" destOrd="0" parTransId="{E9FD5650-2F56-4614-965B-21E77F8A4546}" sibTransId="{06DE3C21-CE19-470B-A48A-E9EBD7829020}"/>
-    <dgm:cxn modelId="{D74F363E-ACC2-40DA-AA4A-DFEDB70E0229}" type="presOf" srcId="{FDCE3464-6338-42FA-95C4-3E70B55B95C3}" destId="{DF71F2E0-47F5-41F2-AF8A-50E3759F6FE7}" srcOrd="0" destOrd="0" presId="urn:microsoft.com/office/officeart/2005/8/layout/cycle4"/>
-    <dgm:cxn modelId="{0F71A250-B277-4D9A-BD80-2C6E34CF1AF5}" type="presOf" srcId="{43144167-4046-4D98-AFD6-F41EF55D3F70}" destId="{3D823FB0-5594-478B-B37B-2B747336C0D3}" srcOrd="1" destOrd="0" presId="urn:microsoft.com/office/officeart/2005/8/layout/cycle4"/>
-    <dgm:cxn modelId="{556B3694-5E8F-40AA-BBB4-9E8AC7C887CC}" type="presOf" srcId="{88D22048-C226-4B80-96F5-A6FF9EB77260}" destId="{B83E5333-0549-48BE-AC65-CAE0E2E3048A}" srcOrd="0" destOrd="1" presId="urn:microsoft.com/office/officeart/2005/8/layout/cycle4"/>
-    <dgm:cxn modelId="{9CCC7F84-F95E-453D-BCE0-FCBF8692BD71}" type="presOf" srcId="{922E52F2-F426-4357-8897-48613AFD40B4}" destId="{6856C79E-7115-4188-B9D4-DE2AC7202F51}" srcOrd="0" destOrd="1" presId="urn:microsoft.com/office/officeart/2005/8/layout/cycle4"/>
-    <dgm:cxn modelId="{2FEB7C22-E307-48B9-9842-EB85B6A3EABB}" srcId="{1B505CE1-A335-47DB-A8B8-642DDEBBACFE}" destId="{A2CE1466-F34B-43B7-8ECB-4398E85CFDAD}" srcOrd="1" destOrd="0" parTransId="{F120B362-9F34-4C70-94A4-E09D05465505}" sibTransId="{4C6611D5-06EF-4C34-8639-A44114480B53}"/>
-    <dgm:cxn modelId="{FC36E040-9E86-427F-BEA7-21044232F34D}" type="presOf" srcId="{88D22048-C226-4B80-96F5-A6FF9EB77260}" destId="{3D823FB0-5594-478B-B37B-2B747336C0D3}" srcOrd="1" destOrd="1" presId="urn:microsoft.com/office/officeart/2005/8/layout/cycle4"/>
-    <dgm:cxn modelId="{F242BCE3-24DD-499D-9D66-77490D445607}" srcId="{275555CA-D7EB-4DD8-B2DD-CC908549D563}" destId="{74BB59CA-B3E4-4677-AB66-F0E4F324D2DE}" srcOrd="0" destOrd="0" parTransId="{0B342BEE-8E5B-4918-83D3-F8FAF20F62BC}" sibTransId="{BED6D5A7-4FD4-4AB3-863F-1D23801B5A28}"/>
-    <dgm:cxn modelId="{1820372F-CFBA-46EE-9B46-4344CDADDAA4}" type="presOf" srcId="{2B4A171C-3D40-49F0-93E2-79C84671CEED}" destId="{6EBD0D7E-4BA0-45E0-8546-FDC01E3B80FD}" srcOrd="1" destOrd="2" presId="urn:microsoft.com/office/officeart/2005/8/layout/cycle4"/>
-    <dgm:cxn modelId="{7C8A374E-D487-4D33-9420-E3A5C5AB23E2}" srcId="{F5E17574-00D3-4A2E-A4E2-711818759C67}" destId="{88D22048-C226-4B80-96F5-A6FF9EB77260}" srcOrd="1" destOrd="0" parTransId="{2FEC0CB4-90C2-47F6-A748-5CF93A677CF4}" sibTransId="{EA2D429B-261C-49D0-AEF4-5F5167FB04E9}"/>
-    <dgm:cxn modelId="{40CBDA5C-17AE-4B47-95C4-A1CFE32A11DF}" type="presOf" srcId="{2B4A171C-3D40-49F0-93E2-79C84671CEED}" destId="{2E65AF03-B92B-4B63-BA11-1DA53B9A4588}" srcOrd="0" destOrd="2" presId="urn:microsoft.com/office/officeart/2005/8/layout/cycle4"/>
-    <dgm:cxn modelId="{B0659538-A9F6-4B5B-837C-7EBCD9C876F7}" srcId="{275555CA-D7EB-4DD8-B2DD-CC908549D563}" destId="{922E52F2-F426-4357-8897-48613AFD40B4}" srcOrd="1" destOrd="0" parTransId="{4F4B634A-40D8-4A83-AABC-E5CD7661F6C1}" sibTransId="{EA741DDF-55E8-4ED6-BF28-58BA98A1743D}"/>
-    <dgm:cxn modelId="{4387171C-4EAE-4EF7-82A5-55771BE428D8}" type="presOf" srcId="{8E9FF4C9-8904-4931-B1B1-E0599ED1352B}" destId="{9E31BBC7-3180-42ED-B620-3768608FF042}" srcOrd="1" destOrd="0" presId="urn:microsoft.com/office/officeart/2005/8/layout/cycle4"/>
-    <dgm:cxn modelId="{D2AD92C9-C849-4ACA-B2D7-D6009EEC838E}" srcId="{7BCC920D-3B88-4C53-8E36-BC66877F9F39}" destId="{F5E17574-00D3-4A2E-A4E2-711818759C67}" srcOrd="1" destOrd="0" parTransId="{C632954C-E36E-4F26-B7EB-B2F8187F609E}" sibTransId="{4D1D54DA-C271-40C9-9550-E768A439EC93}"/>
     <dgm:cxn modelId="{67B47022-51DB-477A-AE63-8D2732671925}" type="presParOf" srcId="{DDDDC2B4-219B-4399-9306-A531B3DB679A}" destId="{0616F4D9-2387-444E-936F-7893D93F572A}" srcOrd="0" destOrd="0" presId="urn:microsoft.com/office/officeart/2005/8/layout/cycle4"/>
     <dgm:cxn modelId="{7D92A23B-80B3-4F6D-B66F-617FD77846E4}" type="presParOf" srcId="{0616F4D9-2387-444E-936F-7893D93F572A}" destId="{BF0670B4-DC3F-4872-8ED2-EB6DBB2BC3C3}" srcOrd="0" destOrd="0" presId="urn:microsoft.com/office/officeart/2005/8/layout/cycle4"/>
     <dgm:cxn modelId="{F0682566-F949-4C98-9700-931FD6CBB819}" type="presParOf" srcId="{BF0670B4-DC3F-4872-8ED2-EB6DBB2BC3C3}" destId="{2E65AF03-B92B-4B63-BA11-1DA53B9A4588}" srcOrd="0" destOrd="0" presId="urn:microsoft.com/office/officeart/2005/8/layout/cycle4"/>
@@ -1821,14 +1924,23 @@
             <a:buChar char="••"/>
           </a:pPr>
           <a:r>
-            <a:rPr lang="ko-KR" altLang="en-US" sz="1600" kern="1200" dirty="0" smtClean="0"/>
+            <a:rPr lang="ko-KR" altLang="en-US" sz="1600" kern="1200" dirty="0" smtClean="0">
+              <a:latin typeface="D2Coding" panose="020B0609020101020101" pitchFamily="49" charset="-127"/>
+              <a:ea typeface="D2Coding" panose="020B0609020101020101" pitchFamily="49" charset="-127"/>
+            </a:rPr>
             <a:t>동적 데이터 </a:t>
           </a:r>
           <a:r>
-            <a:rPr lang="ko-KR" altLang="en-US" sz="1600" kern="1200" dirty="0" err="1" smtClean="0"/>
+            <a:rPr lang="ko-KR" altLang="en-US" sz="1600" kern="1200" dirty="0" err="1" smtClean="0">
+              <a:latin typeface="D2Coding" panose="020B0609020101020101" pitchFamily="49" charset="-127"/>
+              <a:ea typeface="D2Coding" panose="020B0609020101020101" pitchFamily="49" charset="-127"/>
+            </a:rPr>
             <a:t>렌더링</a:t>
           </a:r>
-          <a:endParaRPr lang="ko-KR" altLang="en-US" sz="1600" kern="1200" dirty="0"/>
+          <a:endParaRPr lang="ko-KR" altLang="en-US" sz="1600" kern="1200" dirty="0">
+            <a:latin typeface="D2Coding" panose="020B0609020101020101" pitchFamily="49" charset="-127"/>
+            <a:ea typeface="D2Coding" panose="020B0609020101020101" pitchFamily="49" charset="-127"/>
+          </a:endParaRPr>
         </a:p>
         <a:p>
           <a:pPr marL="171450" lvl="1" indent="-171450" algn="l" defTabSz="711200" latinLnBrk="1">
@@ -1844,10 +1956,12 @@
             <a:buChar char="••"/>
           </a:pPr>
           <a:r>
-            <a:rPr lang="en-US" altLang="ko-KR" sz="1600" kern="1200" dirty="0" smtClean="0"/>
+            <a:rPr lang="en-US" altLang="ko-KR" sz="1600" kern="1200" dirty="0" smtClean="0">
+              <a:latin typeface="D2Coding" panose="020B0609020101020101" pitchFamily="49" charset="-127"/>
+              <a:ea typeface="D2Coding" panose="020B0609020101020101" pitchFamily="49" charset="-127"/>
+            </a:rPr>
             <a:t>REST</a:t>
           </a:r>
-          <a:endParaRPr lang="en-US" altLang="ko-KR" sz="1600" kern="1200" dirty="0" smtClean="0"/>
         </a:p>
       </dsp:txBody>
       <dsp:txXfrm>
@@ -1923,10 +2037,16 @@
             <a:buChar char="••"/>
           </a:pPr>
           <a:r>
-            <a:rPr lang="en-US" altLang="ko-KR" sz="1600" kern="1200" dirty="0" smtClean="0"/>
+            <a:rPr lang="en-US" altLang="ko-KR" sz="1600" kern="1200" dirty="0" smtClean="0">
+              <a:latin typeface="D2Coding" panose="020B0609020101020101" pitchFamily="49" charset="-127"/>
+              <a:ea typeface="D2Coding" panose="020B0609020101020101" pitchFamily="49" charset="-127"/>
+            </a:rPr>
             <a:t>(backend) module test</a:t>
           </a:r>
-          <a:endParaRPr lang="ko-KR" altLang="en-US" sz="1600" kern="1200" dirty="0"/>
+          <a:endParaRPr lang="ko-KR" altLang="en-US" sz="1600" kern="1200" dirty="0">
+            <a:latin typeface="D2Coding" panose="020B0609020101020101" pitchFamily="49" charset="-127"/>
+            <a:ea typeface="D2Coding" panose="020B0609020101020101" pitchFamily="49" charset="-127"/>
+          </a:endParaRPr>
         </a:p>
         <a:p>
           <a:pPr marL="171450" lvl="1" indent="-171450" algn="l" defTabSz="711200" latinLnBrk="1">
@@ -1942,22 +2062,37 @@
             <a:buChar char="••"/>
           </a:pPr>
           <a:r>
-            <a:rPr lang="en-US" altLang="ko-KR" sz="1600" kern="1200" dirty="0" smtClean="0"/>
+            <a:rPr lang="en-US" altLang="ko-KR" sz="1600" kern="1200" dirty="0" smtClean="0">
+              <a:latin typeface="D2Coding" panose="020B0609020101020101" pitchFamily="49" charset="-127"/>
+              <a:ea typeface="D2Coding" panose="020B0609020101020101" pitchFamily="49" charset="-127"/>
+            </a:rPr>
             <a:t>(</a:t>
           </a:r>
           <a:r>
-            <a:rPr lang="en-US" altLang="ko-KR" sz="1600" kern="1200" dirty="0" err="1" smtClean="0"/>
+            <a:rPr lang="en-US" altLang="ko-KR" sz="1600" kern="1200" dirty="0" err="1" smtClean="0">
+              <a:latin typeface="D2Coding" panose="020B0609020101020101" pitchFamily="49" charset="-127"/>
+              <a:ea typeface="D2Coding" panose="020B0609020101020101" pitchFamily="49" charset="-127"/>
+            </a:rPr>
             <a:t>tps</a:t>
           </a:r>
           <a:r>
-            <a:rPr lang="en-US" altLang="ko-KR" sz="1600" kern="1200" dirty="0" smtClean="0"/>
+            <a:rPr lang="en-US" altLang="ko-KR" sz="1600" kern="1200" dirty="0" smtClean="0">
+              <a:latin typeface="D2Coding" panose="020B0609020101020101" pitchFamily="49" charset="-127"/>
+              <a:ea typeface="D2Coding" panose="020B0609020101020101" pitchFamily="49" charset="-127"/>
+            </a:rPr>
             <a:t>) </a:t>
           </a:r>
           <a:r>
-            <a:rPr lang="en-US" altLang="ko-KR" sz="1600" kern="1200" dirty="0" err="1" smtClean="0"/>
+            <a:rPr lang="en-US" altLang="ko-KR" sz="1600" kern="1200" dirty="0" err="1" smtClean="0">
+              <a:latin typeface="D2Coding" panose="020B0609020101020101" pitchFamily="49" charset="-127"/>
+              <a:ea typeface="D2Coding" panose="020B0609020101020101" pitchFamily="49" charset="-127"/>
+            </a:rPr>
             <a:t>nGrinder</a:t>
           </a:r>
-          <a:endParaRPr lang="ko-KR" altLang="en-US" sz="1600" kern="1200" dirty="0"/>
+          <a:endParaRPr lang="ko-KR" altLang="en-US" sz="1600" kern="1200" dirty="0">
+            <a:latin typeface="D2Coding" panose="020B0609020101020101" pitchFamily="49" charset="-127"/>
+            <a:ea typeface="D2Coding" panose="020B0609020101020101" pitchFamily="49" charset="-127"/>
+          </a:endParaRPr>
         </a:p>
       </dsp:txBody>
       <dsp:txXfrm>
@@ -2033,10 +2168,16 @@
             <a:buChar char="••"/>
           </a:pPr>
           <a:r>
-            <a:rPr lang="ko-KR" altLang="en-US" sz="1600" kern="1200" dirty="0" smtClean="0"/>
+            <a:rPr lang="ko-KR" altLang="en-US" sz="1600" kern="1200" dirty="0" smtClean="0">
+              <a:latin typeface="D2Coding" panose="020B0609020101020101" pitchFamily="49" charset="-127"/>
+              <a:ea typeface="D2Coding" panose="020B0609020101020101" pitchFamily="49" charset="-127"/>
+            </a:rPr>
             <a:t>람다 아키텍처</a:t>
           </a:r>
-          <a:endParaRPr lang="ko-KR" altLang="en-US" sz="1600" kern="1200" dirty="0"/>
+          <a:endParaRPr lang="ko-KR" altLang="en-US" sz="1600" kern="1200" dirty="0">
+            <a:latin typeface="D2Coding" panose="020B0609020101020101" pitchFamily="49" charset="-127"/>
+            <a:ea typeface="D2Coding" panose="020B0609020101020101" pitchFamily="49" charset="-127"/>
+          </a:endParaRPr>
         </a:p>
         <a:p>
           <a:pPr marL="171450" lvl="1" indent="-171450" algn="l" defTabSz="711200" latinLnBrk="1">
@@ -2052,10 +2193,16 @@
             <a:buChar char="••"/>
           </a:pPr>
           <a:r>
-            <a:rPr lang="en-US" altLang="ko-KR" sz="1600" kern="1200" smtClean="0"/>
+            <a:rPr lang="en-US" altLang="ko-KR" sz="1600" kern="1200" smtClean="0">
+              <a:latin typeface="D2Coding" panose="020B0609020101020101" pitchFamily="49" charset="-127"/>
+              <a:ea typeface="D2Coding" panose="020B0609020101020101" pitchFamily="49" charset="-127"/>
+            </a:rPr>
             <a:t>script</a:t>
           </a:r>
-          <a:endParaRPr lang="en-US" altLang="ko-KR" sz="1600" kern="1200" dirty="0" smtClean="0"/>
+          <a:endParaRPr lang="en-US" altLang="ko-KR" sz="1600" kern="1200" dirty="0" smtClean="0">
+            <a:latin typeface="D2Coding" panose="020B0609020101020101" pitchFamily="49" charset="-127"/>
+            <a:ea typeface="D2Coding" panose="020B0609020101020101" pitchFamily="49" charset="-127"/>
+          </a:endParaRPr>
         </a:p>
       </dsp:txBody>
       <dsp:txXfrm>
@@ -2131,22 +2278,37 @@
             <a:buChar char="••"/>
           </a:pPr>
           <a:r>
-            <a:rPr lang="ko-KR" altLang="en-US" sz="1600" kern="1200" dirty="0" err="1" smtClean="0"/>
+            <a:rPr lang="ko-KR" altLang="en-US" sz="1600" kern="1200" dirty="0" err="1" smtClean="0">
+              <a:latin typeface="D2Coding" panose="020B0609020101020101" pitchFamily="49" charset="-127"/>
+              <a:ea typeface="D2Coding" panose="020B0609020101020101" pitchFamily="49" charset="-127"/>
+            </a:rPr>
             <a:t>관계형</a:t>
           </a:r>
           <a:r>
-            <a:rPr lang="ko-KR" altLang="en-US" sz="1600" kern="1200" dirty="0" smtClean="0"/>
+            <a:rPr lang="ko-KR" altLang="en-US" sz="1600" kern="1200" dirty="0" smtClean="0">
+              <a:latin typeface="D2Coding" panose="020B0609020101020101" pitchFamily="49" charset="-127"/>
+              <a:ea typeface="D2Coding" panose="020B0609020101020101" pitchFamily="49" charset="-127"/>
+            </a:rPr>
             <a:t> </a:t>
           </a:r>
           <a:r>
-            <a:rPr lang="en-US" altLang="ko-KR" sz="1600" kern="1200" dirty="0" smtClean="0"/>
+            <a:rPr lang="en-US" altLang="ko-KR" sz="1600" kern="1200" dirty="0" smtClean="0">
+              <a:latin typeface="D2Coding" panose="020B0609020101020101" pitchFamily="49" charset="-127"/>
+              <a:ea typeface="D2Coding" panose="020B0609020101020101" pitchFamily="49" charset="-127"/>
+            </a:rPr>
             <a:t>DB </a:t>
           </a:r>
           <a:r>
-            <a:rPr lang="ko-KR" altLang="en-US" sz="1600" kern="1200" dirty="0" smtClean="0"/>
+            <a:rPr lang="ko-KR" altLang="en-US" sz="1600" kern="1200" dirty="0" smtClean="0">
+              <a:latin typeface="D2Coding" panose="020B0609020101020101" pitchFamily="49" charset="-127"/>
+              <a:ea typeface="D2Coding" panose="020B0609020101020101" pitchFamily="49" charset="-127"/>
+            </a:rPr>
             <a:t>모델</a:t>
           </a:r>
-          <a:endParaRPr lang="ko-KR" altLang="en-US" sz="1600" kern="1200" dirty="0"/>
+          <a:endParaRPr lang="ko-KR" altLang="en-US" sz="1600" kern="1200" dirty="0">
+            <a:latin typeface="D2Coding" panose="020B0609020101020101" pitchFamily="49" charset="-127"/>
+            <a:ea typeface="D2Coding" panose="020B0609020101020101" pitchFamily="49" charset="-127"/>
+          </a:endParaRPr>
         </a:p>
         <a:p>
           <a:pPr marL="171450" lvl="1" indent="-171450" algn="l" defTabSz="711200" latinLnBrk="1">
@@ -2162,10 +2324,12 @@
             <a:buChar char="••"/>
           </a:pPr>
           <a:r>
-            <a:rPr lang="en-US" altLang="ko-KR" sz="1600" kern="1200" dirty="0" smtClean="0"/>
+            <a:rPr lang="en-US" altLang="ko-KR" sz="1600" kern="1200" dirty="0" smtClean="0">
+              <a:latin typeface="D2Coding" panose="020B0609020101020101" pitchFamily="49" charset="-127"/>
+              <a:ea typeface="D2Coding" panose="020B0609020101020101" pitchFamily="49" charset="-127"/>
+            </a:rPr>
             <a:t>Generic programming</a:t>
           </a:r>
-          <a:endParaRPr lang="en-US" altLang="ko-KR" sz="1600" kern="1200" dirty="0" smtClean="0"/>
         </a:p>
         <a:p>
           <a:pPr marL="171450" lvl="1" indent="-171450" algn="l" defTabSz="711200" latinLnBrk="1">
@@ -2181,10 +2345,12 @@
             <a:buChar char="••"/>
           </a:pPr>
           <a:r>
-            <a:rPr lang="en-US" altLang="ko-KR" sz="1600" kern="1200" dirty="0" smtClean="0"/>
+            <a:rPr lang="en-US" altLang="ko-KR" sz="1600" kern="1200" dirty="0" smtClean="0">
+              <a:latin typeface="D2Coding" panose="020B0609020101020101" pitchFamily="49" charset="-127"/>
+              <a:ea typeface="D2Coding" panose="020B0609020101020101" pitchFamily="49" charset="-127"/>
+            </a:rPr>
             <a:t>Heuristic algorithm</a:t>
           </a:r>
-          <a:endParaRPr lang="en-US" altLang="ko-KR" sz="1600" kern="1200" dirty="0" smtClean="0"/>
         </a:p>
       </dsp:txBody>
       <dsp:txXfrm>
@@ -2258,10 +2424,16 @@
             </a:spcAft>
           </a:pPr>
           <a:r>
-            <a:rPr lang="en-US" altLang="ko-KR" sz="2200" b="1" kern="1200" dirty="0" smtClean="0"/>
+            <a:rPr lang="en-US" altLang="ko-KR" sz="2200" b="1" kern="1200" dirty="0" smtClean="0">
+              <a:latin typeface="D2Coding" panose="020B0609020101020101" pitchFamily="49" charset="-127"/>
+              <a:ea typeface="D2Coding" panose="020B0609020101020101" pitchFamily="49" charset="-127"/>
+            </a:rPr>
             <a:t>DB</a:t>
           </a:r>
-          <a:endParaRPr lang="ko-KR" altLang="en-US" sz="2200" b="1" kern="1200" dirty="0"/>
+          <a:endParaRPr lang="ko-KR" altLang="en-US" sz="2200" b="1" kern="1200" dirty="0">
+            <a:latin typeface="D2Coding" panose="020B0609020101020101" pitchFamily="49" charset="-127"/>
+            <a:ea typeface="D2Coding" panose="020B0609020101020101" pitchFamily="49" charset="-127"/>
+          </a:endParaRPr>
         </a:p>
       </dsp:txBody>
       <dsp:txXfrm>
@@ -2335,7 +2507,10 @@
             </a:spcAft>
           </a:pPr>
           <a:r>
-            <a:rPr lang="en-US" altLang="ko-KR" sz="2200" b="1" kern="1200" dirty="0" smtClean="0"/>
+            <a:rPr lang="en-US" altLang="ko-KR" sz="2200" b="1" kern="1200" dirty="0" smtClean="0">
+              <a:latin typeface="D2Coding" panose="020B0609020101020101" pitchFamily="49" charset="-127"/>
+              <a:ea typeface="D2Coding" panose="020B0609020101020101" pitchFamily="49" charset="-127"/>
+            </a:rPr>
             <a:t>Data </a:t>
           </a:r>
         </a:p>
@@ -2352,10 +2527,16 @@
             </a:spcAft>
           </a:pPr>
           <a:r>
-            <a:rPr lang="ko-KR" altLang="en-US" sz="2200" b="1" kern="1200" dirty="0" smtClean="0"/>
+            <a:rPr lang="ko-KR" altLang="en-US" sz="2200" b="1" kern="1200" dirty="0" smtClean="0">
+              <a:latin typeface="D2Coding" panose="020B0609020101020101" pitchFamily="49" charset="-127"/>
+              <a:ea typeface="D2Coding" panose="020B0609020101020101" pitchFamily="49" charset="-127"/>
+            </a:rPr>
             <a:t>가공처리</a:t>
           </a:r>
-          <a:endParaRPr lang="ko-KR" altLang="en-US" sz="2200" b="1" kern="1200" dirty="0"/>
+          <a:endParaRPr lang="ko-KR" altLang="en-US" sz="2200" b="1" kern="1200" dirty="0">
+            <a:latin typeface="D2Coding" panose="020B0609020101020101" pitchFamily="49" charset="-127"/>
+            <a:ea typeface="D2Coding" panose="020B0609020101020101" pitchFamily="49" charset="-127"/>
+          </a:endParaRPr>
         </a:p>
       </dsp:txBody>
       <dsp:txXfrm rot="-5400000">
@@ -2429,10 +2610,16 @@
             </a:spcAft>
           </a:pPr>
           <a:r>
-            <a:rPr lang="ko-KR" altLang="en-US" sz="2200" b="1" kern="1200" dirty="0" smtClean="0"/>
+            <a:rPr lang="ko-KR" altLang="en-US" sz="2200" b="1" kern="1200" dirty="0" smtClean="0">
+              <a:latin typeface="D2Coding" panose="020B0609020101020101" pitchFamily="49" charset="-127"/>
+              <a:ea typeface="D2Coding" panose="020B0609020101020101" pitchFamily="49" charset="-127"/>
+            </a:rPr>
             <a:t>서비스</a:t>
           </a:r>
-          <a:endParaRPr lang="ko-KR" altLang="en-US" sz="2200" b="1" kern="1200" dirty="0"/>
+          <a:endParaRPr lang="ko-KR" altLang="en-US" sz="2200" b="1" kern="1200" dirty="0">
+            <a:latin typeface="D2Coding" panose="020B0609020101020101" pitchFamily="49" charset="-127"/>
+            <a:ea typeface="D2Coding" panose="020B0609020101020101" pitchFamily="49" charset="-127"/>
+          </a:endParaRPr>
         </a:p>
       </dsp:txBody>
       <dsp:txXfrm rot="10800000">
@@ -2506,10 +2693,16 @@
             </a:spcAft>
           </a:pPr>
           <a:r>
-            <a:rPr lang="ko-KR" altLang="en-US" sz="2200" b="1" kern="1200" dirty="0" smtClean="0"/>
+            <a:rPr lang="ko-KR" altLang="en-US" sz="2200" b="1" kern="1200" dirty="0" smtClean="0">
+              <a:latin typeface="D2Coding" panose="020B0609020101020101" pitchFamily="49" charset="-127"/>
+              <a:ea typeface="D2Coding" panose="020B0609020101020101" pitchFamily="49" charset="-127"/>
+            </a:rPr>
             <a:t>테스트</a:t>
           </a:r>
-          <a:endParaRPr lang="ko-KR" altLang="en-US" sz="2200" b="1" kern="1200" dirty="0"/>
+          <a:endParaRPr lang="ko-KR" altLang="en-US" sz="2200" b="1" kern="1200" dirty="0">
+            <a:latin typeface="D2Coding" panose="020B0609020101020101" pitchFamily="49" charset="-127"/>
+            <a:ea typeface="D2Coding" panose="020B0609020101020101" pitchFamily="49" charset="-127"/>
+          </a:endParaRPr>
         </a:p>
       </dsp:txBody>
       <dsp:txXfrm rot="5400000">
@@ -4458,7 +4651,7 @@
           <a:p>
             <a:fld id="{584A621E-A026-49A7-8979-266E56CB692A}" type="datetimeFigureOut">
               <a:rPr lang="ko-KR" altLang="en-US" smtClean="0"/>
-              <a:t>2017-06-15</a:t>
+              <a:t>2017-06-16</a:t>
             </a:fld>
             <a:endParaRPr lang="ko-KR" altLang="en-US"/>
           </a:p>
@@ -4915,6 +5108,367 @@
 </p:notes>
 </file>
 
+<file path=ppt/notesSlides/notesSlide10.xml><?xml version="1.0" encoding="utf-8"?>
+<p:notes xmlns:a="http://schemas.openxmlformats.org/drawingml/2006/main" xmlns:r="http://schemas.openxmlformats.org/officeDocument/2006/relationships" xmlns:p="http://schemas.openxmlformats.org/presentationml/2006/main">
+  <p:cSld>
+    <p:spTree>
+      <p:nvGrpSpPr>
+        <p:cNvPr id="1" name=""/>
+        <p:cNvGrpSpPr/>
+        <p:nvPr/>
+      </p:nvGrpSpPr>
+      <p:grpSpPr>
+        <a:xfrm>
+          <a:off x="0" y="0"/>
+          <a:ext cx="0" cy="0"/>
+          <a:chOff x="0" y="0"/>
+          <a:chExt cx="0" cy="0"/>
+        </a:xfrm>
+      </p:grpSpPr>
+      <p:sp>
+        <p:nvSpPr>
+          <p:cNvPr id="2" name="슬라이드 이미지 개체 틀 1"/>
+          <p:cNvSpPr>
+            <a:spLocks noGrp="1" noRot="1" noChangeAspect="1"/>
+          </p:cNvSpPr>
+          <p:nvPr>
+            <p:ph type="sldImg"/>
+          </p:nvPr>
+        </p:nvSpPr>
+        <p:spPr/>
+      </p:sp>
+      <p:sp>
+        <p:nvSpPr>
+          <p:cNvPr id="3" name="슬라이드 노트 개체 틀 2"/>
+          <p:cNvSpPr>
+            <a:spLocks noGrp="1"/>
+          </p:cNvSpPr>
+          <p:nvPr>
+            <p:ph type="body" idx="1"/>
+          </p:nvPr>
+        </p:nvSpPr>
+        <p:spPr/>
+        <p:txBody>
+          <a:bodyPr/>
+          <a:lstStyle/>
+          <a:p>
+            <a:r>
+              <a:rPr lang="en-US" altLang="ko-KR" dirty="0" smtClean="0"/>
+              <a:t>2. </a:t>
+            </a:r>
+            <a:r>
+              <a:rPr lang="ko-KR" altLang="en-US" dirty="0" err="1" smtClean="0"/>
+              <a:t>두번째</a:t>
+            </a:r>
+            <a:r>
+              <a:rPr lang="ko-KR" altLang="en-US" dirty="0" smtClean="0"/>
+              <a:t> </a:t>
+            </a:r>
+            <a:r>
+              <a:rPr lang="en-US" altLang="ko-KR" dirty="0" smtClean="0"/>
+              <a:t>result </a:t>
+            </a:r>
+            <a:r>
+              <a:rPr lang="ko-KR" altLang="en-US" dirty="0" smtClean="0"/>
+              <a:t>해석</a:t>
+            </a:r>
+            <a:endParaRPr lang="en-US" altLang="ko-KR" dirty="0" smtClean="0"/>
+          </a:p>
+          <a:p>
+            <a:r>
+              <a:rPr lang="ko-KR" altLang="en-US" dirty="0" smtClean="0"/>
+              <a:t>그래프</a:t>
+            </a:r>
+            <a:r>
+              <a:rPr lang="en-US" altLang="ko-KR" dirty="0" smtClean="0"/>
+              <a:t>(view</a:t>
+            </a:r>
+            <a:r>
+              <a:rPr lang="ko-KR" altLang="en-US" dirty="0" smtClean="0"/>
+              <a:t>를 제거한 후 </a:t>
+            </a:r>
+            <a:r>
+              <a:rPr lang="en-US" altLang="ko-KR" dirty="0" smtClean="0"/>
+              <a:t>40</a:t>
+            </a:r>
+            <a:r>
+              <a:rPr lang="ko-KR" altLang="en-US" dirty="0" smtClean="0"/>
+              <a:t>명이 한 주소에 대한 </a:t>
+            </a:r>
+            <a:r>
+              <a:rPr lang="en-US" altLang="ko-KR" dirty="0" smtClean="0"/>
+              <a:t>curation </a:t>
+            </a:r>
+            <a:r>
+              <a:rPr lang="ko-KR" altLang="en-US" dirty="0" smtClean="0"/>
+              <a:t>동시 요청</a:t>
+            </a:r>
+            <a:r>
+              <a:rPr lang="en-US" altLang="ko-KR" dirty="0" smtClean="0"/>
+              <a:t>)</a:t>
+            </a:r>
+          </a:p>
+          <a:p>
+            <a:r>
+              <a:rPr lang="ko-KR" altLang="en-US" dirty="0" smtClean="0"/>
+              <a:t> </a:t>
+            </a:r>
+            <a:r>
+              <a:rPr lang="en-US" altLang="ko-KR" dirty="0" smtClean="0"/>
+              <a:t>: </a:t>
+            </a:r>
+            <a:r>
+              <a:rPr lang="ko-KR" altLang="en-US" dirty="0" smtClean="0"/>
+              <a:t>작업에 이용한 </a:t>
+            </a:r>
+            <a:r>
+              <a:rPr lang="en-US" altLang="ko-KR" dirty="0" err="1" smtClean="0"/>
+              <a:t>framewor</a:t>
+            </a:r>
+            <a:r>
+              <a:rPr lang="ko-KR" altLang="en-US" baseline="0" dirty="0" smtClean="0"/>
+              <a:t>의 </a:t>
+            </a:r>
+            <a:r>
+              <a:rPr lang="en-US" altLang="ko-KR" dirty="0" smtClean="0"/>
+              <a:t>garbage</a:t>
+            </a:r>
+            <a:r>
+              <a:rPr lang="en-US" altLang="ko-KR" baseline="0" dirty="0" smtClean="0"/>
+              <a:t> collector</a:t>
+            </a:r>
+            <a:r>
+              <a:rPr lang="ko-KR" altLang="en-US" baseline="0" dirty="0" smtClean="0"/>
+              <a:t>가 성능이 좋지 못하다</a:t>
+            </a:r>
+            <a:endParaRPr lang="en-US" altLang="ko-KR" dirty="0" smtClean="0"/>
+          </a:p>
+          <a:p>
+            <a:endParaRPr lang="en-US" altLang="ko-KR" dirty="0" smtClean="0"/>
+          </a:p>
+          <a:p>
+            <a:r>
+              <a:rPr lang="en-US" altLang="ko-KR" dirty="0" smtClean="0"/>
+              <a:t>3. </a:t>
+            </a:r>
+            <a:r>
+              <a:rPr lang="ko-KR" altLang="en-US" baseline="0" dirty="0" smtClean="0"/>
+              <a:t>개선방안</a:t>
+            </a:r>
+            <a:endParaRPr lang="en-US" altLang="ko-KR" baseline="0" dirty="0" smtClean="0"/>
+          </a:p>
+          <a:p>
+            <a:r>
+              <a:rPr lang="ko-KR" altLang="en-US" sz="1200" b="0" i="0" kern="1200" dirty="0" smtClean="0">
+                <a:solidFill>
+                  <a:schemeClr val="tx1"/>
+                </a:solidFill>
+                <a:effectLst/>
+                <a:latin typeface="+mn-lt"/>
+                <a:ea typeface="+mn-ea"/>
+                <a:cs typeface="+mn-cs"/>
+              </a:rPr>
+              <a:t>간소화의 경우는 테스트 전에 람다 아키텍처와 커팅 </a:t>
+            </a:r>
+            <a:r>
+              <a:rPr lang="ko-KR" altLang="en-US" sz="1200" b="0" i="0" kern="1200" dirty="0" err="1" smtClean="0">
+                <a:solidFill>
+                  <a:schemeClr val="tx1"/>
+                </a:solidFill>
+                <a:effectLst/>
+                <a:latin typeface="+mn-lt"/>
+                <a:ea typeface="+mn-ea"/>
+                <a:cs typeface="+mn-cs"/>
+              </a:rPr>
+              <a:t>메소드를</a:t>
+            </a:r>
+            <a:r>
+              <a:rPr lang="ko-KR" altLang="en-US" sz="1200" b="0" i="0" kern="1200" dirty="0" smtClean="0">
+                <a:solidFill>
+                  <a:schemeClr val="tx1"/>
+                </a:solidFill>
+                <a:effectLst/>
+                <a:latin typeface="+mn-lt"/>
+                <a:ea typeface="+mn-ea"/>
+                <a:cs typeface="+mn-cs"/>
+              </a:rPr>
+              <a:t> 통해 이미 충분한 최적화를 진행한 부분이었다</a:t>
+            </a:r>
+            <a:r>
+              <a:rPr lang="en-US" altLang="ko-KR" sz="1200" b="0" i="0" kern="1200" dirty="0" smtClean="0">
+                <a:solidFill>
+                  <a:schemeClr val="tx1"/>
+                </a:solidFill>
+                <a:effectLst/>
+                <a:latin typeface="+mn-lt"/>
+                <a:ea typeface="+mn-ea"/>
+                <a:cs typeface="+mn-cs"/>
+              </a:rPr>
+              <a:t>.</a:t>
+            </a:r>
+          </a:p>
+          <a:p>
+            <a:r>
+              <a:rPr lang="ko-KR" altLang="en-US" sz="1200" b="0" i="0" kern="1200" dirty="0" smtClean="0">
+                <a:solidFill>
+                  <a:schemeClr val="tx1"/>
+                </a:solidFill>
+                <a:effectLst/>
+                <a:latin typeface="+mn-lt"/>
+                <a:ea typeface="+mn-ea"/>
+                <a:cs typeface="+mn-cs"/>
+              </a:rPr>
+              <a:t>타 </a:t>
+            </a:r>
+            <a:r>
+              <a:rPr lang="en-US" altLang="ko-KR" sz="1200" b="0" i="0" kern="1200" dirty="0" smtClean="0">
+                <a:solidFill>
+                  <a:schemeClr val="tx1"/>
+                </a:solidFill>
+                <a:effectLst/>
+                <a:latin typeface="+mn-lt"/>
+                <a:ea typeface="+mn-ea"/>
+                <a:cs typeface="+mn-cs"/>
+              </a:rPr>
+              <a:t>framework</a:t>
+            </a:r>
+            <a:r>
+              <a:rPr lang="ko-KR" altLang="en-US" sz="1200" b="0" i="0" kern="1200" dirty="0" smtClean="0">
+                <a:solidFill>
+                  <a:schemeClr val="tx1"/>
+                </a:solidFill>
+                <a:effectLst/>
+                <a:latin typeface="+mn-lt"/>
+                <a:ea typeface="+mn-ea"/>
+                <a:cs typeface="+mn-cs"/>
+              </a:rPr>
+              <a:t>를 이용하는 것은 좋은 시도가 될 수 있지만 시간 관계상 넘어갔다</a:t>
+            </a:r>
+            <a:r>
+              <a:rPr lang="en-US" altLang="ko-KR" sz="1200" b="0" i="0" kern="1200" dirty="0" smtClean="0">
+                <a:solidFill>
+                  <a:schemeClr val="tx1"/>
+                </a:solidFill>
+                <a:effectLst/>
+                <a:latin typeface="+mn-lt"/>
+                <a:ea typeface="+mn-ea"/>
+                <a:cs typeface="+mn-cs"/>
+              </a:rPr>
+              <a:t>.</a:t>
+            </a:r>
+          </a:p>
+          <a:p>
+            <a:r>
+              <a:rPr lang="ko-KR" altLang="en-US" sz="1200" b="0" i="0" kern="1200" dirty="0" smtClean="0">
+                <a:solidFill>
+                  <a:schemeClr val="tx1"/>
+                </a:solidFill>
+                <a:effectLst/>
+                <a:latin typeface="+mn-lt"/>
+                <a:ea typeface="+mn-ea"/>
+                <a:cs typeface="+mn-cs"/>
+              </a:rPr>
+              <a:t>따라서 서비스 전에 미리 </a:t>
+            </a:r>
+            <a:r>
+              <a:rPr lang="ko-KR" altLang="en-US" sz="1200" b="0" i="0" kern="1200" dirty="0" err="1" smtClean="0">
+                <a:solidFill>
+                  <a:schemeClr val="tx1"/>
+                </a:solidFill>
+                <a:effectLst/>
+                <a:latin typeface="+mn-lt"/>
+                <a:ea typeface="+mn-ea"/>
+                <a:cs typeface="+mn-cs"/>
+              </a:rPr>
+              <a:t>캐싱을</a:t>
+            </a:r>
+            <a:r>
+              <a:rPr lang="ko-KR" altLang="en-US" sz="1200" b="0" i="0" kern="1200" dirty="0" smtClean="0">
+                <a:solidFill>
+                  <a:schemeClr val="tx1"/>
+                </a:solidFill>
+                <a:effectLst/>
+                <a:latin typeface="+mn-lt"/>
+                <a:ea typeface="+mn-ea"/>
+                <a:cs typeface="+mn-cs"/>
+              </a:rPr>
+              <a:t> </a:t>
+            </a:r>
+            <a:r>
+              <a:rPr lang="ko-KR" altLang="en-US" sz="1200" b="0" i="0" kern="1200" dirty="0" err="1" smtClean="0">
+                <a:solidFill>
+                  <a:schemeClr val="tx1"/>
+                </a:solidFill>
+                <a:effectLst/>
+                <a:latin typeface="+mn-lt"/>
+                <a:ea typeface="+mn-ea"/>
+                <a:cs typeface="+mn-cs"/>
+              </a:rPr>
+              <a:t>여러번</a:t>
+            </a:r>
+            <a:r>
+              <a:rPr lang="ko-KR" altLang="en-US" sz="1200" b="0" i="0" kern="1200" dirty="0" smtClean="0">
+                <a:solidFill>
+                  <a:schemeClr val="tx1"/>
+                </a:solidFill>
+                <a:effectLst/>
+                <a:latin typeface="+mn-lt"/>
+                <a:ea typeface="+mn-ea"/>
+                <a:cs typeface="+mn-cs"/>
+              </a:rPr>
+              <a:t> 해놓는 것이 현재 생각할 수 있는 제일 나은 전략이다</a:t>
+            </a:r>
+            <a:r>
+              <a:rPr lang="en-US" altLang="ko-KR" sz="1200" b="0" i="0" kern="1200" dirty="0" smtClean="0">
+                <a:solidFill>
+                  <a:schemeClr val="tx1"/>
+                </a:solidFill>
+                <a:effectLst/>
+                <a:latin typeface="+mn-lt"/>
+                <a:ea typeface="+mn-ea"/>
+                <a:cs typeface="+mn-cs"/>
+              </a:rPr>
+              <a:t>.</a:t>
+            </a:r>
+          </a:p>
+        </p:txBody>
+      </p:sp>
+      <p:sp>
+        <p:nvSpPr>
+          <p:cNvPr id="4" name="슬라이드 번호 개체 틀 3"/>
+          <p:cNvSpPr>
+            <a:spLocks noGrp="1"/>
+          </p:cNvSpPr>
+          <p:nvPr>
+            <p:ph type="sldNum" sz="quarter" idx="10"/>
+          </p:nvPr>
+        </p:nvSpPr>
+        <p:spPr/>
+        <p:txBody>
+          <a:bodyPr/>
+          <a:lstStyle/>
+          <a:p>
+            <a:fld id="{6F21B0EB-C86B-4604-8114-9CE19A3BBEEA}" type="slidenum">
+              <a:rPr lang="ko-KR" altLang="en-US" smtClean="0"/>
+              <a:t>14</a:t>
+            </a:fld>
+            <a:endParaRPr lang="ko-KR" altLang="en-US"/>
+          </a:p>
+        </p:txBody>
+      </p:sp>
+    </p:spTree>
+    <p:extLst>
+      <p:ext uri="{BB962C8B-B14F-4D97-AF65-F5344CB8AC3E}">
+        <p14:creationId xmlns:p14="http://schemas.microsoft.com/office/powerpoint/2010/main" val="4169883793"/>
+      </p:ext>
+    </p:extLst>
+  </p:cSld>
+  <p:clrMapOvr>
+    <a:masterClrMapping/>
+  </p:clrMapOvr>
+</p:notes>
+</file>
+
 <file path=ppt/notesSlides/notesSlide2.xml><?xml version="1.0" encoding="utf-8"?>
 <p:notes xmlns:a="http://schemas.openxmlformats.org/drawingml/2006/main" xmlns:r="http://schemas.openxmlformats.org/officeDocument/2006/relationships" xmlns:p="http://schemas.openxmlformats.org/presentationml/2006/main">
   <p:cSld>
@@ -5407,24 +5961,23 @@
           <a:p>
             <a:r>
               <a:rPr lang="ko-KR" altLang="en-US" dirty="0" smtClean="0"/>
-              <a:t>처음의 계획대로 웹 서비스와 </a:t>
+              <a:t>트랙의 </a:t>
             </a:r>
             <a:r>
               <a:rPr lang="en-US" altLang="ko-KR" dirty="0" smtClean="0"/>
-              <a:t>API </a:t>
-            </a:r>
+              <a:t>harmony</a:t>
+            </a:r>
+          </a:p>
+          <a:p>
             <a:r>
               <a:rPr lang="ko-KR" altLang="en-US" dirty="0" smtClean="0"/>
-              <a:t>두 가지를</a:t>
-            </a:r>
-            <a:r>
-              <a:rPr lang="ko-KR" altLang="en-US" baseline="0" dirty="0" smtClean="0"/>
-              <a:t> 만들었습니다</a:t>
-            </a:r>
-            <a:r>
-              <a:rPr lang="en-US" altLang="ko-KR" baseline="0" dirty="0" smtClean="0"/>
-              <a:t>.</a:t>
-            </a:r>
+              <a:t>태그의 </a:t>
+            </a:r>
+            <a:r>
+              <a:rPr lang="en-US" altLang="ko-KR" dirty="0" smtClean="0"/>
+              <a:t>score</a:t>
+            </a:r>
+            <a:endParaRPr lang="ko-KR" altLang="en-US" dirty="0"/>
           </a:p>
         </p:txBody>
       </p:sp>
@@ -5445,7 +5998,7 @@
           <a:p>
             <a:fld id="{6F21B0EB-C86B-4604-8114-9CE19A3BBEEA}" type="slidenum">
               <a:rPr lang="ko-KR" altLang="en-US" smtClean="0"/>
-              <a:t>11</a:t>
+              <a:t>10</a:t>
             </a:fld>
             <a:endParaRPr lang="ko-KR" altLang="en-US"/>
           </a:p>
@@ -5454,7 +6007,7 @@
     </p:spTree>
     <p:extLst>
       <p:ext uri="{BB962C8B-B14F-4D97-AF65-F5344CB8AC3E}">
-        <p14:creationId xmlns:p14="http://schemas.microsoft.com/office/powerpoint/2010/main" val="819134908"/>
+        <p14:creationId xmlns:p14="http://schemas.microsoft.com/office/powerpoint/2010/main" val="2580472117"/>
       </p:ext>
     </p:extLst>
   </p:cSld>
@@ -5510,87 +6063,24 @@
           <a:p>
             <a:r>
               <a:rPr lang="ko-KR" altLang="en-US" dirty="0" smtClean="0"/>
-              <a:t>다음과 같이 음악들이</a:t>
+              <a:t>처음의 계획대로 웹 서비스와 </a:t>
+            </a:r>
+            <a:r>
+              <a:rPr lang="en-US" altLang="ko-KR" dirty="0" smtClean="0"/>
+              <a:t>API </a:t>
+            </a:r>
+            <a:r>
+              <a:rPr lang="ko-KR" altLang="en-US" dirty="0" smtClean="0"/>
+              <a:t>두 가지를</a:t>
+            </a:r>
+            <a:r>
+              <a:rPr lang="ko-KR" altLang="en-US" baseline="0" dirty="0" smtClean="0"/>
+              <a:t> 만들었습니다</a:t>
             </a:r>
             <a:r>
               <a:rPr lang="en-US" altLang="ko-KR" baseline="0" dirty="0" smtClean="0"/>
-              <a:t> Tag A,B,C</a:t>
-            </a:r>
-            <a:r>
-              <a:rPr lang="ko-KR" altLang="en-US" baseline="0" dirty="0" smtClean="0"/>
-              <a:t>에 분류되어있다고 가정 </a:t>
-            </a:r>
-            <a:r>
-              <a:rPr lang="en-US" altLang="ko-KR" baseline="0" dirty="0" smtClean="0"/>
-              <a:t>-&gt; </a:t>
-            </a:r>
-            <a:r>
-              <a:rPr lang="ko-KR" altLang="en-US" baseline="0" dirty="0" smtClean="0"/>
-              <a:t>각 태그의 스코어는 동일하고</a:t>
-            </a:r>
-            <a:r>
-              <a:rPr lang="en-US" altLang="ko-KR" baseline="0" dirty="0" smtClean="0"/>
-              <a:t>, </a:t>
-            </a:r>
-            <a:r>
-              <a:rPr lang="ko-KR" altLang="en-US" baseline="0" dirty="0" smtClean="0"/>
-              <a:t>음악의 태그에 대한 조화도가 다름</a:t>
-            </a:r>
-            <a:endParaRPr lang="en-US" altLang="ko-KR" baseline="0" dirty="0" smtClean="0"/>
-          </a:p>
-          <a:p>
-            <a:r>
-              <a:rPr lang="en-US" altLang="ko-KR" baseline="0" dirty="0" smtClean="0"/>
-              <a:t>* </a:t>
-            </a:r>
-            <a:r>
-              <a:rPr lang="ko-KR" altLang="en-US" baseline="0" dirty="0" smtClean="0"/>
-              <a:t>각 </a:t>
-            </a:r>
-            <a:r>
-              <a:rPr lang="en-US" altLang="ko-KR" baseline="0" dirty="0" smtClean="0"/>
-              <a:t>Track</a:t>
-            </a:r>
-            <a:r>
-              <a:rPr lang="ko-KR" altLang="en-US" baseline="0" dirty="0" smtClean="0"/>
-              <a:t>은 </a:t>
-            </a:r>
-            <a:r>
-              <a:rPr lang="en-US" altLang="ko-KR" baseline="0" dirty="0" smtClean="0"/>
-              <a:t>1,2,….13 </a:t>
-            </a:r>
-            <a:r>
-              <a:rPr lang="ko-KR" altLang="en-US" baseline="0" dirty="0" smtClean="0"/>
-              <a:t>로 번호로 명명</a:t>
-            </a:r>
-            <a:endParaRPr lang="en-US" altLang="ko-KR" baseline="0" dirty="0" smtClean="0"/>
-          </a:p>
-          <a:p>
-            <a:r>
-              <a:rPr lang="en-US" altLang="ko-KR" baseline="0" dirty="0" smtClean="0"/>
-              <a:t>* () : </a:t>
-            </a:r>
-            <a:r>
-              <a:rPr lang="ko-KR" altLang="en-US" baseline="0" dirty="0" err="1" smtClean="0"/>
-              <a:t>태그인경우</a:t>
-            </a:r>
-            <a:r>
-              <a:rPr lang="ko-KR" altLang="en-US" baseline="0" dirty="0" smtClean="0"/>
-              <a:t> </a:t>
-            </a:r>
-            <a:r>
-              <a:rPr lang="en-US" altLang="ko-KR" baseline="0" dirty="0" smtClean="0"/>
-              <a:t>score, </a:t>
-            </a:r>
-            <a:r>
-              <a:rPr lang="ko-KR" altLang="en-US" baseline="0" dirty="0" smtClean="0"/>
-              <a:t>트랙인 경우 </a:t>
-            </a:r>
-            <a:r>
-              <a:rPr lang="en-US" altLang="ko-KR" baseline="0" dirty="0" smtClean="0"/>
-              <a:t>harmony</a:t>
-            </a:r>
-            <a:endParaRPr lang="ko-KR" altLang="en-US" dirty="0"/>
+              <a:t>.</a:t>
+            </a:r>
           </a:p>
         </p:txBody>
       </p:sp>
@@ -5611,7 +6101,7 @@
           <a:p>
             <a:fld id="{6F21B0EB-C86B-4604-8114-9CE19A3BBEEA}" type="slidenum">
               <a:rPr lang="ko-KR" altLang="en-US" smtClean="0"/>
-              <a:t>12</a:t>
+              <a:t>11</a:t>
             </a:fld>
             <a:endParaRPr lang="ko-KR" altLang="en-US"/>
           </a:p>
@@ -5620,7 +6110,7 @@
     </p:spTree>
     <p:extLst>
       <p:ext uri="{BB962C8B-B14F-4D97-AF65-F5344CB8AC3E}">
-        <p14:creationId xmlns:p14="http://schemas.microsoft.com/office/powerpoint/2010/main" val="2928624929"/>
+        <p14:creationId xmlns:p14="http://schemas.microsoft.com/office/powerpoint/2010/main" val="819134908"/>
       </p:ext>
     </p:extLst>
   </p:cSld>
@@ -5675,557 +6165,88 @@
           <a:lstStyle/>
           <a:p>
             <a:r>
-              <a:rPr lang="ko-KR" altLang="en-US" sz="1200" b="0" i="0" kern="1200" dirty="0" smtClean="0">
-                <a:solidFill>
-                  <a:schemeClr val="tx1"/>
-                </a:solidFill>
-                <a:effectLst/>
-                <a:latin typeface="+mn-lt"/>
-                <a:ea typeface="+mn-ea"/>
-                <a:cs typeface="+mn-cs"/>
-              </a:rPr>
-              <a:t>재생횟수가 가장 많은 지역</a:t>
-            </a:r>
-            <a:r>
-              <a:rPr lang="en-US" altLang="ko-KR" sz="1200" b="0" i="0" kern="1200" dirty="0" smtClean="0">
-                <a:solidFill>
-                  <a:schemeClr val="tx1"/>
-                </a:solidFill>
-                <a:effectLst/>
-                <a:latin typeface="+mn-lt"/>
-                <a:ea typeface="+mn-ea"/>
-                <a:cs typeface="+mn-cs"/>
-              </a:rPr>
-              <a:t>(</a:t>
-            </a:r>
-            <a:r>
-              <a:rPr lang="ko-KR" altLang="en-US" sz="1200" b="0" i="0" kern="1200" dirty="0" smtClean="0">
-                <a:solidFill>
-                  <a:schemeClr val="tx1"/>
-                </a:solidFill>
-                <a:effectLst/>
-                <a:latin typeface="+mn-lt"/>
-                <a:ea typeface="+mn-ea"/>
-                <a:cs typeface="+mn-cs"/>
-              </a:rPr>
-              <a:t>경기도 성남시</a:t>
-            </a:r>
-            <a:r>
-              <a:rPr lang="en-US" altLang="ko-KR" sz="1200" b="0" i="0" kern="1200" dirty="0" smtClean="0">
-                <a:solidFill>
-                  <a:schemeClr val="tx1"/>
-                </a:solidFill>
-                <a:effectLst/>
-                <a:latin typeface="+mn-lt"/>
-                <a:ea typeface="+mn-ea"/>
-                <a:cs typeface="+mn-cs"/>
-              </a:rPr>
-              <a:t>)</a:t>
-            </a:r>
-            <a:r>
-              <a:rPr lang="ko-KR" altLang="en-US" sz="1200" b="0" i="0" kern="1200" dirty="0" smtClean="0">
-                <a:solidFill>
-                  <a:schemeClr val="tx1"/>
-                </a:solidFill>
-                <a:effectLst/>
-                <a:latin typeface="+mn-lt"/>
-                <a:ea typeface="+mn-ea"/>
-                <a:cs typeface="+mn-cs"/>
-              </a:rPr>
-              <a:t>에 대해 </a:t>
-            </a:r>
-            <a:r>
-              <a:rPr lang="en-US" altLang="ko-KR" sz="1200" b="0" i="0" kern="1200" dirty="0" err="1" smtClean="0">
-                <a:solidFill>
-                  <a:schemeClr val="tx1"/>
-                </a:solidFill>
-                <a:effectLst/>
-                <a:latin typeface="+mn-lt"/>
-                <a:ea typeface="+mn-ea"/>
-                <a:cs typeface="+mn-cs"/>
-              </a:rPr>
-              <a:t>Vuser</a:t>
-            </a:r>
-            <a:r>
-              <a:rPr lang="ko-KR" altLang="en-US" sz="1200" b="0" i="0" kern="1200" dirty="0" smtClean="0">
-                <a:solidFill>
-                  <a:schemeClr val="tx1"/>
-                </a:solidFill>
-                <a:effectLst/>
-                <a:latin typeface="+mn-lt"/>
-                <a:ea typeface="+mn-ea"/>
-                <a:cs typeface="+mn-cs"/>
-              </a:rPr>
-              <a:t>를 조정해가면서 </a:t>
-            </a:r>
-            <a:r>
-              <a:rPr lang="en-US" altLang="ko-KR" sz="1200" b="0" i="0" kern="1200" dirty="0" smtClean="0">
-                <a:solidFill>
-                  <a:schemeClr val="tx1"/>
-                </a:solidFill>
-                <a:effectLst/>
-                <a:latin typeface="+mn-lt"/>
-                <a:ea typeface="+mn-ea"/>
-                <a:cs typeface="+mn-cs"/>
-              </a:rPr>
-              <a:t>5</a:t>
-            </a:r>
-            <a:r>
-              <a:rPr lang="ko-KR" altLang="en-US" sz="1200" b="0" i="0" kern="1200" dirty="0" smtClean="0">
-                <a:solidFill>
-                  <a:schemeClr val="tx1"/>
-                </a:solidFill>
-                <a:effectLst/>
-                <a:latin typeface="+mn-lt"/>
-                <a:ea typeface="+mn-ea"/>
-                <a:cs typeface="+mn-cs"/>
-              </a:rPr>
-              <a:t>분간 측정한다</a:t>
-            </a:r>
+              <a:rPr lang="ko-KR" altLang="en-US" dirty="0" smtClean="0"/>
+              <a:t>다음과 같이 음악들이</a:t>
+            </a:r>
+            <a:r>
+              <a:rPr lang="en-US" altLang="ko-KR" baseline="0" dirty="0" smtClean="0"/>
+              <a:t> Tag A,B,C</a:t>
+            </a:r>
+            <a:r>
+              <a:rPr lang="ko-KR" altLang="en-US" baseline="0" dirty="0" smtClean="0"/>
+              <a:t>에 분류되어있다고 가정 </a:t>
+            </a:r>
+            <a:r>
+              <a:rPr lang="en-US" altLang="ko-KR" baseline="0" dirty="0" smtClean="0"/>
+              <a:t>-&gt; </a:t>
+            </a:r>
+            <a:r>
+              <a:rPr lang="ko-KR" altLang="en-US" baseline="0" dirty="0" smtClean="0"/>
+              <a:t>각 태그의 스코어는 동일하고</a:t>
+            </a:r>
+            <a:r>
+              <a:rPr lang="en-US" altLang="ko-KR" baseline="0" dirty="0" smtClean="0"/>
+              <a:t>, </a:t>
+            </a:r>
+            <a:r>
+              <a:rPr lang="ko-KR" altLang="en-US" baseline="0" dirty="0" smtClean="0"/>
+              <a:t>음악의 태그에 대한 조화도가 다름</a:t>
+            </a:r>
+            <a:endParaRPr lang="en-US" altLang="ko-KR" baseline="0" dirty="0" smtClean="0"/>
           </a:p>
           <a:p>
             <a:r>
-              <a:rPr lang="ko-KR" altLang="en-US" sz="1200" b="0" i="0" kern="1200" dirty="0" smtClean="0">
-                <a:solidFill>
-                  <a:schemeClr val="tx1"/>
-                </a:solidFill>
-                <a:effectLst/>
-                <a:latin typeface="+mn-lt"/>
-                <a:ea typeface="+mn-ea"/>
-                <a:cs typeface="+mn-cs"/>
-              </a:rPr>
-              <a:t>프로그램의 코드와 구성을 다음과 같이 바꾸어가면서 측정한다</a:t>
-            </a:r>
-            <a:endParaRPr lang="en-US" altLang="ko-KR" sz="1200" b="0" i="0" kern="1200" dirty="0" smtClean="0">
-              <a:solidFill>
-                <a:schemeClr val="tx1"/>
-              </a:solidFill>
-              <a:effectLst/>
-              <a:latin typeface="+mn-lt"/>
-              <a:ea typeface="+mn-ea"/>
-              <a:cs typeface="+mn-cs"/>
-            </a:endParaRPr>
+              <a:rPr lang="en-US" altLang="ko-KR" baseline="0" dirty="0" smtClean="0"/>
+              <a:t>* </a:t>
+            </a:r>
+            <a:r>
+              <a:rPr lang="ko-KR" altLang="en-US" baseline="0" dirty="0" smtClean="0"/>
+              <a:t>각 </a:t>
+            </a:r>
+            <a:r>
+              <a:rPr lang="en-US" altLang="ko-KR" baseline="0" dirty="0" smtClean="0"/>
+              <a:t>Track</a:t>
+            </a:r>
+            <a:r>
+              <a:rPr lang="ko-KR" altLang="en-US" baseline="0" dirty="0" smtClean="0"/>
+              <a:t>은 </a:t>
+            </a:r>
+            <a:r>
+              <a:rPr lang="en-US" altLang="ko-KR" baseline="0" dirty="0" smtClean="0"/>
+              <a:t>1,2,….13 </a:t>
+            </a:r>
+            <a:r>
+              <a:rPr lang="ko-KR" altLang="en-US" baseline="0" dirty="0" smtClean="0"/>
+              <a:t>로 번호로 명명</a:t>
+            </a:r>
+            <a:endParaRPr lang="en-US" altLang="ko-KR" baseline="0" dirty="0" smtClean="0"/>
           </a:p>
           <a:p>
-            <a:endParaRPr lang="en-US" altLang="ko-KR" sz="1200" b="0" i="0" kern="1200" dirty="0" smtClean="0">
-              <a:solidFill>
-                <a:schemeClr val="tx1"/>
-              </a:solidFill>
-              <a:effectLst/>
-              <a:latin typeface="+mn-lt"/>
-              <a:ea typeface="+mn-ea"/>
-              <a:cs typeface="+mn-cs"/>
-            </a:endParaRPr>
-          </a:p>
-          <a:p>
-            <a:r>
-              <a:rPr lang="ko-KR" altLang="en-US" sz="1200" b="0" i="0" kern="1200" dirty="0" err="1" smtClean="0">
-                <a:solidFill>
-                  <a:schemeClr val="tx1"/>
-                </a:solidFill>
-                <a:effectLst/>
-                <a:latin typeface="+mn-lt"/>
-                <a:ea typeface="+mn-ea"/>
-                <a:cs typeface="+mn-cs"/>
-              </a:rPr>
-              <a:t>첫번째</a:t>
-            </a:r>
-            <a:r>
-              <a:rPr lang="ko-KR" altLang="en-US" sz="1200" b="0" i="0" kern="1200" dirty="0" smtClean="0">
-                <a:solidFill>
-                  <a:schemeClr val="tx1"/>
-                </a:solidFill>
-                <a:effectLst/>
-                <a:latin typeface="+mn-lt"/>
-                <a:ea typeface="+mn-ea"/>
-                <a:cs typeface="+mn-cs"/>
-              </a:rPr>
+            <a:r>
+              <a:rPr lang="en-US" altLang="ko-KR" baseline="0" dirty="0" smtClean="0"/>
+              <a:t>* () : </a:t>
+            </a:r>
+            <a:r>
+              <a:rPr lang="ko-KR" altLang="en-US" baseline="0" dirty="0" err="1" smtClean="0"/>
+              <a:t>태그인경우</a:t>
+            </a:r>
+            <a:r>
+              <a:rPr lang="ko-KR" altLang="en-US" baseline="0" dirty="0" smtClean="0"/>
               <a:t> </a:t>
             </a:r>
             <a:r>
-              <a:rPr lang="en-US" altLang="ko-KR" sz="1200" b="0" i="0" kern="1200" dirty="0" smtClean="0">
-                <a:solidFill>
-                  <a:schemeClr val="tx1"/>
-                </a:solidFill>
-                <a:effectLst/>
-                <a:latin typeface="+mn-lt"/>
-                <a:ea typeface="+mn-ea"/>
-                <a:cs typeface="+mn-cs"/>
-              </a:rPr>
-              <a:t>Result</a:t>
-            </a:r>
-            <a:r>
-              <a:rPr lang="en-US" altLang="ko-KR" sz="1200" b="0" i="0" kern="1200" baseline="0" dirty="0" smtClean="0">
-                <a:solidFill>
-                  <a:schemeClr val="tx1"/>
-                </a:solidFill>
-                <a:effectLst/>
-                <a:latin typeface="+mn-lt"/>
-                <a:ea typeface="+mn-ea"/>
-                <a:cs typeface="+mn-cs"/>
-              </a:rPr>
-              <a:t> </a:t>
-            </a:r>
-            <a:r>
-              <a:rPr lang="ko-KR" altLang="en-US" sz="1200" b="0" i="0" kern="1200" baseline="0" dirty="0" smtClean="0">
-                <a:solidFill>
-                  <a:schemeClr val="tx1"/>
-                </a:solidFill>
-                <a:effectLst/>
-                <a:latin typeface="+mn-lt"/>
-                <a:ea typeface="+mn-ea"/>
-                <a:cs typeface="+mn-cs"/>
-              </a:rPr>
-              <a:t>해석</a:t>
-            </a:r>
-            <a:r>
-              <a:rPr lang="en-US" altLang="ko-KR" sz="1200" b="0" i="0" kern="1200" baseline="0" dirty="0" smtClean="0">
-                <a:solidFill>
-                  <a:schemeClr val="tx1"/>
-                </a:solidFill>
-                <a:effectLst/>
-                <a:latin typeface="+mn-lt"/>
-                <a:ea typeface="+mn-ea"/>
-                <a:cs typeface="+mn-cs"/>
-              </a:rPr>
-              <a:t>: </a:t>
-            </a:r>
-          </a:p>
-          <a:p>
-            <a:pPr marL="228600" indent="-228600">
-              <a:buAutoNum type="arabicPeriod"/>
-            </a:pPr>
-            <a:r>
-              <a:rPr lang="ko-KR" altLang="en-US" sz="1200" b="0" i="0" kern="1200" baseline="0" dirty="0" smtClean="0">
-                <a:solidFill>
-                  <a:schemeClr val="tx1"/>
-                </a:solidFill>
-                <a:effectLst/>
-                <a:latin typeface="+mn-lt"/>
-                <a:ea typeface="+mn-ea"/>
-                <a:cs typeface="+mn-cs"/>
-              </a:rPr>
-              <a:t>평균 </a:t>
-            </a:r>
-            <a:r>
-              <a:rPr lang="en-US" altLang="ko-KR" sz="1200" b="0" i="0" kern="1200" baseline="0" dirty="0" err="1" smtClean="0">
-                <a:solidFill>
-                  <a:schemeClr val="tx1"/>
-                </a:solidFill>
-                <a:effectLst/>
-                <a:latin typeface="+mn-lt"/>
-                <a:ea typeface="+mn-ea"/>
-                <a:cs typeface="+mn-cs"/>
-              </a:rPr>
-              <a:t>tps</a:t>
-            </a:r>
-            <a:r>
-              <a:rPr lang="ko-KR" altLang="en-US" sz="1200" b="0" i="0" kern="1200" baseline="0" dirty="0" smtClean="0">
-                <a:solidFill>
-                  <a:schemeClr val="tx1"/>
-                </a:solidFill>
-                <a:effectLst/>
-                <a:latin typeface="+mn-lt"/>
-                <a:ea typeface="+mn-ea"/>
-                <a:cs typeface="+mn-cs"/>
-              </a:rPr>
-              <a:t>는 </a:t>
-            </a:r>
-            <a:r>
-              <a:rPr lang="en-US" altLang="ko-KR" sz="1200" b="0" i="0" kern="1200" baseline="0" dirty="0" smtClean="0">
-                <a:solidFill>
-                  <a:schemeClr val="tx1"/>
-                </a:solidFill>
-                <a:effectLst/>
-                <a:latin typeface="+mn-lt"/>
-                <a:ea typeface="+mn-ea"/>
-                <a:cs typeface="+mn-cs"/>
-              </a:rPr>
-              <a:t>1</a:t>
-            </a:r>
-            <a:r>
-              <a:rPr lang="ko-KR" altLang="en-US" sz="1200" b="0" i="0" kern="1200" baseline="0" dirty="0" smtClean="0">
-                <a:solidFill>
-                  <a:schemeClr val="tx1"/>
-                </a:solidFill>
-                <a:effectLst/>
-                <a:latin typeface="+mn-lt"/>
-                <a:ea typeface="+mn-ea"/>
-                <a:cs typeface="+mn-cs"/>
-              </a:rPr>
-              <a:t>명</a:t>
-            </a:r>
-            <a:r>
-              <a:rPr lang="en-US" altLang="ko-KR" sz="1200" b="0" i="0" kern="1200" baseline="0" dirty="0" smtClean="0">
-                <a:solidFill>
-                  <a:schemeClr val="tx1"/>
-                </a:solidFill>
-                <a:effectLst/>
-                <a:latin typeface="+mn-lt"/>
-                <a:ea typeface="+mn-ea"/>
-                <a:cs typeface="+mn-cs"/>
-              </a:rPr>
-              <a:t>, peak</a:t>
-            </a:r>
-            <a:r>
-              <a:rPr lang="ko-KR" altLang="en-US" sz="1200" b="0" i="0" kern="1200" baseline="0" dirty="0" smtClean="0">
-                <a:solidFill>
-                  <a:schemeClr val="tx1"/>
-                </a:solidFill>
-                <a:effectLst/>
-                <a:latin typeface="+mn-lt"/>
-                <a:ea typeface="+mn-ea"/>
-                <a:cs typeface="+mn-cs"/>
-              </a:rPr>
-              <a:t>는 </a:t>
-            </a:r>
-            <a:r>
-              <a:rPr lang="en-US" altLang="ko-KR" sz="1200" b="0" i="0" kern="1200" baseline="0" dirty="0" smtClean="0">
-                <a:solidFill>
-                  <a:schemeClr val="tx1"/>
-                </a:solidFill>
-                <a:effectLst/>
-                <a:latin typeface="+mn-lt"/>
-                <a:ea typeface="+mn-ea"/>
-                <a:cs typeface="+mn-cs"/>
-              </a:rPr>
-              <a:t>58</a:t>
-            </a:r>
-            <a:r>
-              <a:rPr lang="ko-KR" altLang="en-US" sz="1200" b="0" i="0" kern="1200" baseline="0" dirty="0" smtClean="0">
-                <a:solidFill>
-                  <a:schemeClr val="tx1"/>
-                </a:solidFill>
-                <a:effectLst/>
-                <a:latin typeface="+mn-lt"/>
-                <a:ea typeface="+mn-ea"/>
-                <a:cs typeface="+mn-cs"/>
-              </a:rPr>
-              <a:t>명</a:t>
-            </a:r>
-            <a:endParaRPr lang="en-US" altLang="ko-KR" sz="1200" b="0" i="0" kern="1200" baseline="0" dirty="0" smtClean="0">
-              <a:solidFill>
-                <a:schemeClr val="tx1"/>
-              </a:solidFill>
-              <a:effectLst/>
-              <a:latin typeface="+mn-lt"/>
-              <a:ea typeface="+mn-ea"/>
-              <a:cs typeface="+mn-cs"/>
-            </a:endParaRPr>
-          </a:p>
-          <a:p>
-            <a:pPr marL="228600" indent="-228600">
-              <a:buAutoNum type="arabicPeriod"/>
-            </a:pPr>
-            <a:r>
-              <a:rPr lang="ko-KR" altLang="en-US" sz="1200" b="0" i="0" kern="1200" dirty="0" smtClean="0">
-                <a:solidFill>
-                  <a:schemeClr val="tx1"/>
-                </a:solidFill>
-                <a:effectLst/>
-                <a:latin typeface="+mn-lt"/>
-                <a:ea typeface="+mn-ea"/>
-                <a:cs typeface="+mn-cs"/>
-              </a:rPr>
-              <a:t>병목지</a:t>
-            </a:r>
-            <a:r>
-              <a:rPr lang="ko-KR" altLang="en-US" sz="1200" b="0" i="0" kern="1200" baseline="0" dirty="0" smtClean="0">
-                <a:solidFill>
-                  <a:schemeClr val="tx1"/>
-                </a:solidFill>
-                <a:effectLst/>
-                <a:latin typeface="+mn-lt"/>
-                <a:ea typeface="+mn-ea"/>
-                <a:cs typeface="+mn-cs"/>
-              </a:rPr>
-              <a:t>점 </a:t>
-            </a:r>
-            <a:r>
-              <a:rPr lang="en-US" altLang="ko-KR" sz="1200" b="0" i="0" kern="1200" baseline="0" dirty="0" smtClean="0">
-                <a:solidFill>
-                  <a:schemeClr val="tx1"/>
-                </a:solidFill>
-                <a:effectLst/>
-                <a:latin typeface="+mn-lt"/>
-                <a:ea typeface="+mn-ea"/>
-                <a:cs typeface="+mn-cs"/>
-              </a:rPr>
-              <a:t>: </a:t>
-            </a:r>
-            <a:r>
-              <a:rPr lang="ko-KR" altLang="en-US" sz="1200" b="0" i="0" kern="1200" baseline="0" dirty="0" err="1" smtClean="0">
-                <a:solidFill>
-                  <a:schemeClr val="tx1"/>
-                </a:solidFill>
-                <a:effectLst/>
-                <a:latin typeface="+mn-lt"/>
-                <a:ea typeface="+mn-ea"/>
-                <a:cs typeface="+mn-cs"/>
-              </a:rPr>
-              <a:t>웹페이지로</a:t>
-            </a:r>
-            <a:r>
-              <a:rPr lang="ko-KR" altLang="en-US" sz="1200" b="0" i="0" kern="1200" baseline="0" dirty="0" smtClean="0">
-                <a:solidFill>
-                  <a:schemeClr val="tx1"/>
-                </a:solidFill>
-                <a:effectLst/>
-                <a:latin typeface="+mn-lt"/>
-                <a:ea typeface="+mn-ea"/>
-                <a:cs typeface="+mn-cs"/>
-              </a:rPr>
-              <a:t> </a:t>
-            </a:r>
-            <a:r>
-              <a:rPr lang="ko-KR" altLang="en-US" sz="1200" b="0" i="0" kern="1200" baseline="0" dirty="0" err="1" smtClean="0">
-                <a:solidFill>
-                  <a:schemeClr val="tx1"/>
-                </a:solidFill>
-                <a:effectLst/>
-                <a:latin typeface="+mn-lt"/>
-                <a:ea typeface="+mn-ea"/>
-                <a:cs typeface="+mn-cs"/>
-              </a:rPr>
-              <a:t>렌더링하는</a:t>
-            </a:r>
-            <a:r>
-              <a:rPr lang="ko-KR" altLang="en-US" sz="1200" b="0" i="0" kern="1200" baseline="0" dirty="0" smtClean="0">
-                <a:solidFill>
-                  <a:schemeClr val="tx1"/>
-                </a:solidFill>
-                <a:effectLst/>
-                <a:latin typeface="+mn-lt"/>
-                <a:ea typeface="+mn-ea"/>
-                <a:cs typeface="+mn-cs"/>
-              </a:rPr>
-              <a:t> 부분에서 오래 걸린다</a:t>
-            </a:r>
-            <a:r>
-              <a:rPr lang="en-US" altLang="ko-KR" sz="1200" b="0" i="0" kern="1200" baseline="0" dirty="0" smtClean="0">
-                <a:solidFill>
-                  <a:schemeClr val="tx1"/>
-                </a:solidFill>
-                <a:effectLst/>
-                <a:latin typeface="+mn-lt"/>
-                <a:ea typeface="+mn-ea"/>
-                <a:cs typeface="+mn-cs"/>
-              </a:rPr>
-              <a:t>.</a:t>
-            </a:r>
-          </a:p>
-          <a:p>
-            <a:pPr marL="228600" indent="-228600">
-              <a:buAutoNum type="arabicPeriod"/>
-            </a:pPr>
-            <a:r>
-              <a:rPr lang="en-US" altLang="ko-KR" sz="1200" b="0" i="0" kern="1200" baseline="0" dirty="0" smtClean="0">
-                <a:solidFill>
-                  <a:schemeClr val="tx1"/>
-                </a:solidFill>
-                <a:effectLst/>
-                <a:latin typeface="+mn-lt"/>
-                <a:ea typeface="+mn-ea"/>
-                <a:cs typeface="+mn-cs"/>
-              </a:rPr>
-              <a:t>core logic</a:t>
-            </a:r>
-            <a:r>
-              <a:rPr lang="ko-KR" altLang="en-US" sz="1200" b="0" i="0" kern="1200" baseline="0" dirty="0" smtClean="0">
-                <a:solidFill>
-                  <a:schemeClr val="tx1"/>
-                </a:solidFill>
-                <a:effectLst/>
-                <a:latin typeface="+mn-lt"/>
-                <a:ea typeface="+mn-ea"/>
-                <a:cs typeface="+mn-cs"/>
-              </a:rPr>
-              <a:t>의 존재유무는 </a:t>
-            </a:r>
-            <a:r>
-              <a:rPr lang="en-US" altLang="ko-KR" sz="1200" b="0" i="0" kern="1200" baseline="0" dirty="0" err="1" smtClean="0">
-                <a:solidFill>
-                  <a:schemeClr val="tx1"/>
-                </a:solidFill>
-                <a:effectLst/>
-                <a:latin typeface="+mn-lt"/>
-                <a:ea typeface="+mn-ea"/>
-                <a:cs typeface="+mn-cs"/>
-              </a:rPr>
-              <a:t>tps</a:t>
-            </a:r>
-            <a:r>
-              <a:rPr lang="ko-KR" altLang="en-US" sz="1200" b="0" i="0" kern="1200" baseline="0" dirty="0" smtClean="0">
-                <a:solidFill>
-                  <a:schemeClr val="tx1"/>
-                </a:solidFill>
-                <a:effectLst/>
-                <a:latin typeface="+mn-lt"/>
-                <a:ea typeface="+mn-ea"/>
-                <a:cs typeface="+mn-cs"/>
-              </a:rPr>
-              <a:t>에 영향을 미치지 않으므로 우리가 구현한 </a:t>
-            </a:r>
-            <a:r>
-              <a:rPr lang="en-US" altLang="ko-KR" sz="1200" b="0" i="0" kern="1200" baseline="0" dirty="0" smtClean="0">
-                <a:solidFill>
-                  <a:schemeClr val="tx1"/>
-                </a:solidFill>
-                <a:effectLst/>
-                <a:latin typeface="+mn-lt"/>
-                <a:ea typeface="+mn-ea"/>
-                <a:cs typeface="+mn-cs"/>
-              </a:rPr>
-              <a:t>logic</a:t>
-            </a:r>
-            <a:r>
-              <a:rPr lang="ko-KR" altLang="en-US" sz="1200" b="0" i="0" kern="1200" baseline="0" dirty="0" smtClean="0">
-                <a:solidFill>
-                  <a:schemeClr val="tx1"/>
-                </a:solidFill>
-                <a:effectLst/>
-                <a:latin typeface="+mn-lt"/>
-                <a:ea typeface="+mn-ea"/>
-                <a:cs typeface="+mn-cs"/>
-              </a:rPr>
-              <a:t>은 충분히 최적화 되어있다고 결론을 </a:t>
-            </a:r>
-            <a:r>
-              <a:rPr lang="ko-KR" altLang="en-US" sz="1200" b="0" i="0" kern="1200" baseline="0" dirty="0" err="1" smtClean="0">
-                <a:solidFill>
-                  <a:schemeClr val="tx1"/>
-                </a:solidFill>
-                <a:effectLst/>
-                <a:latin typeface="+mn-lt"/>
-                <a:ea typeface="+mn-ea"/>
-                <a:cs typeface="+mn-cs"/>
-              </a:rPr>
-              <a:t>내릴수</a:t>
-            </a:r>
-            <a:r>
-              <a:rPr lang="ko-KR" altLang="en-US" sz="1200" b="0" i="0" kern="1200" baseline="0" dirty="0" smtClean="0">
-                <a:solidFill>
-                  <a:schemeClr val="tx1"/>
-                </a:solidFill>
-                <a:effectLst/>
-                <a:latin typeface="+mn-lt"/>
-                <a:ea typeface="+mn-ea"/>
-                <a:cs typeface="+mn-cs"/>
-              </a:rPr>
-              <a:t> 있다</a:t>
-            </a:r>
-            <a:r>
-              <a:rPr lang="en-US" altLang="ko-KR" sz="1200" b="0" i="0" kern="1200" baseline="0" dirty="0" smtClean="0">
-                <a:solidFill>
-                  <a:schemeClr val="tx1"/>
-                </a:solidFill>
-                <a:effectLst/>
-                <a:latin typeface="+mn-lt"/>
-                <a:ea typeface="+mn-ea"/>
-                <a:cs typeface="+mn-cs"/>
-              </a:rPr>
-              <a:t>.</a:t>
-            </a:r>
+              <a:rPr lang="en-US" altLang="ko-KR" baseline="0" dirty="0" smtClean="0"/>
+              <a:t>score, </a:t>
+            </a:r>
+            <a:r>
+              <a:rPr lang="ko-KR" altLang="en-US" baseline="0" dirty="0" smtClean="0"/>
+              <a:t>트랙인 경우 </a:t>
+            </a:r>
+            <a:r>
+              <a:rPr lang="en-US" altLang="ko-KR" baseline="0" dirty="0" smtClean="0"/>
+              <a:t>harmony</a:t>
+            </a:r>
+            <a:endParaRPr lang="ko-KR" altLang="en-US" dirty="0"/>
           </a:p>
         </p:txBody>
       </p:sp>
@@ -6246,7 +6267,7 @@
           <a:p>
             <a:fld id="{6F21B0EB-C86B-4604-8114-9CE19A3BBEEA}" type="slidenum">
               <a:rPr lang="ko-KR" altLang="en-US" smtClean="0"/>
-              <a:t>13</a:t>
+              <a:t>12</a:t>
             </a:fld>
             <a:endParaRPr lang="ko-KR" altLang="en-US"/>
           </a:p>
@@ -6255,7 +6276,7 @@
     </p:spTree>
     <p:extLst>
       <p:ext uri="{BB962C8B-B14F-4D97-AF65-F5344CB8AC3E}">
-        <p14:creationId xmlns:p14="http://schemas.microsoft.com/office/powerpoint/2010/main" val="731346592"/>
+        <p14:creationId xmlns:p14="http://schemas.microsoft.com/office/powerpoint/2010/main" val="2928624929"/>
       </p:ext>
     </p:extLst>
   </p:cSld>
@@ -6310,112 +6331,6 @@
           <a:lstStyle/>
           <a:p>
             <a:r>
-              <a:rPr lang="en-US" altLang="ko-KR" dirty="0" smtClean="0"/>
-              <a:t>2. </a:t>
-            </a:r>
-            <a:r>
-              <a:rPr lang="ko-KR" altLang="en-US" dirty="0" err="1" smtClean="0"/>
-              <a:t>두번째</a:t>
-            </a:r>
-            <a:r>
-              <a:rPr lang="ko-KR" altLang="en-US" dirty="0" smtClean="0"/>
-              <a:t> </a:t>
-            </a:r>
-            <a:r>
-              <a:rPr lang="en-US" altLang="ko-KR" dirty="0" smtClean="0"/>
-              <a:t>result </a:t>
-            </a:r>
-            <a:r>
-              <a:rPr lang="ko-KR" altLang="en-US" dirty="0" smtClean="0"/>
-              <a:t>해석</a:t>
-            </a:r>
-            <a:endParaRPr lang="en-US" altLang="ko-KR" dirty="0" smtClean="0"/>
-          </a:p>
-          <a:p>
-            <a:r>
-              <a:rPr lang="ko-KR" altLang="en-US" dirty="0" smtClean="0"/>
-              <a:t>그래프</a:t>
-            </a:r>
-            <a:r>
-              <a:rPr lang="en-US" altLang="ko-KR" dirty="0" smtClean="0"/>
-              <a:t>(view</a:t>
-            </a:r>
-            <a:r>
-              <a:rPr lang="ko-KR" altLang="en-US" dirty="0" smtClean="0"/>
-              <a:t>를 제거한 후 </a:t>
-            </a:r>
-            <a:r>
-              <a:rPr lang="en-US" altLang="ko-KR" dirty="0" smtClean="0"/>
-              <a:t>40</a:t>
-            </a:r>
-            <a:r>
-              <a:rPr lang="ko-KR" altLang="en-US" dirty="0" smtClean="0"/>
-              <a:t>명이 한 주소에 대한 </a:t>
-            </a:r>
-            <a:r>
-              <a:rPr lang="en-US" altLang="ko-KR" dirty="0" smtClean="0"/>
-              <a:t>curation </a:t>
-            </a:r>
-            <a:r>
-              <a:rPr lang="ko-KR" altLang="en-US" dirty="0" smtClean="0"/>
-              <a:t>동시 요청</a:t>
-            </a:r>
-            <a:r>
-              <a:rPr lang="en-US" altLang="ko-KR" dirty="0" smtClean="0"/>
-              <a:t>)</a:t>
-            </a:r>
-          </a:p>
-          <a:p>
-            <a:r>
-              <a:rPr lang="ko-KR" altLang="en-US" dirty="0" smtClean="0"/>
-              <a:t> </a:t>
-            </a:r>
-            <a:r>
-              <a:rPr lang="en-US" altLang="ko-KR" dirty="0" smtClean="0"/>
-              <a:t>: </a:t>
-            </a:r>
-            <a:r>
-              <a:rPr lang="ko-KR" altLang="en-US" dirty="0" smtClean="0"/>
-              <a:t>작업에 이용한 </a:t>
-            </a:r>
-            <a:r>
-              <a:rPr lang="en-US" altLang="ko-KR" dirty="0" err="1" smtClean="0"/>
-              <a:t>framewor</a:t>
-            </a:r>
-            <a:r>
-              <a:rPr lang="ko-KR" altLang="en-US" baseline="0" dirty="0" smtClean="0"/>
-              <a:t>의 </a:t>
-            </a:r>
-            <a:r>
-              <a:rPr lang="en-US" altLang="ko-KR" dirty="0" smtClean="0"/>
-              <a:t>garbage</a:t>
-            </a:r>
-            <a:r>
-              <a:rPr lang="en-US" altLang="ko-KR" baseline="0" dirty="0" smtClean="0"/>
-              <a:t> collector</a:t>
-            </a:r>
-            <a:r>
-              <a:rPr lang="ko-KR" altLang="en-US" baseline="0" dirty="0" smtClean="0"/>
-              <a:t>가 성능이 좋지 못하다</a:t>
-            </a:r>
-            <a:endParaRPr lang="en-US" altLang="ko-KR" dirty="0" smtClean="0"/>
-          </a:p>
-          <a:p>
-            <a:endParaRPr lang="en-US" altLang="ko-KR" dirty="0" smtClean="0"/>
-          </a:p>
-          <a:p>
-            <a:r>
-              <a:rPr lang="en-US" altLang="ko-KR" dirty="0" smtClean="0"/>
-              <a:t>3. </a:t>
-            </a:r>
-            <a:r>
-              <a:rPr lang="ko-KR" altLang="en-US" baseline="0" dirty="0" smtClean="0"/>
-              <a:t>개선방안</a:t>
-            </a:r>
-            <a:endParaRPr lang="en-US" altLang="ko-KR" baseline="0" dirty="0" smtClean="0"/>
-          </a:p>
-          <a:p>
-            <a:r>
               <a:rPr lang="ko-KR" altLang="en-US" sz="1200" b="0" i="0" kern="1200" dirty="0" smtClean="0">
                 <a:solidFill>
                   <a:schemeClr val="tx1"/>
@@ -6425,8 +6340,140 @@
                 <a:ea typeface="+mn-ea"/>
                 <a:cs typeface="+mn-cs"/>
               </a:rPr>
-              <a:t>간소화의 경우는 테스트 전에 람다 아키텍처와 커팅 </a:t>
-            </a:r>
+              <a:t>재생횟수가 가장 많은 지역</a:t>
+            </a:r>
+            <a:r>
+              <a:rPr lang="en-US" altLang="ko-KR" sz="1200" b="0" i="0" kern="1200" dirty="0" smtClean="0">
+                <a:solidFill>
+                  <a:schemeClr val="tx1"/>
+                </a:solidFill>
+                <a:effectLst/>
+                <a:latin typeface="+mn-lt"/>
+                <a:ea typeface="+mn-ea"/>
+                <a:cs typeface="+mn-cs"/>
+              </a:rPr>
+              <a:t>(</a:t>
+            </a:r>
+            <a:r>
+              <a:rPr lang="ko-KR" altLang="en-US" sz="1200" b="0" i="0" kern="1200" dirty="0" smtClean="0">
+                <a:solidFill>
+                  <a:schemeClr val="tx1"/>
+                </a:solidFill>
+                <a:effectLst/>
+                <a:latin typeface="+mn-lt"/>
+                <a:ea typeface="+mn-ea"/>
+                <a:cs typeface="+mn-cs"/>
+              </a:rPr>
+              <a:t>경기도 성남시</a:t>
+            </a:r>
+            <a:r>
+              <a:rPr lang="en-US" altLang="ko-KR" sz="1200" b="0" i="0" kern="1200" dirty="0" smtClean="0">
+                <a:solidFill>
+                  <a:schemeClr val="tx1"/>
+                </a:solidFill>
+                <a:effectLst/>
+                <a:latin typeface="+mn-lt"/>
+                <a:ea typeface="+mn-ea"/>
+                <a:cs typeface="+mn-cs"/>
+              </a:rPr>
+              <a:t>)</a:t>
+            </a:r>
+            <a:r>
+              <a:rPr lang="ko-KR" altLang="en-US" sz="1200" b="0" i="0" kern="1200" dirty="0" smtClean="0">
+                <a:solidFill>
+                  <a:schemeClr val="tx1"/>
+                </a:solidFill>
+                <a:effectLst/>
+                <a:latin typeface="+mn-lt"/>
+                <a:ea typeface="+mn-ea"/>
+                <a:cs typeface="+mn-cs"/>
+              </a:rPr>
+              <a:t>에 대해 </a:t>
+            </a:r>
+            <a:r>
+              <a:rPr lang="en-US" altLang="ko-KR" sz="1200" b="0" i="0" kern="1200" dirty="0" err="1" smtClean="0">
+                <a:solidFill>
+                  <a:schemeClr val="tx1"/>
+                </a:solidFill>
+                <a:effectLst/>
+                <a:latin typeface="+mn-lt"/>
+                <a:ea typeface="+mn-ea"/>
+                <a:cs typeface="+mn-cs"/>
+              </a:rPr>
+              <a:t>Vuser</a:t>
+            </a:r>
+            <a:r>
+              <a:rPr lang="ko-KR" altLang="en-US" sz="1200" b="0" i="0" kern="1200" dirty="0" smtClean="0">
+                <a:solidFill>
+                  <a:schemeClr val="tx1"/>
+                </a:solidFill>
+                <a:effectLst/>
+                <a:latin typeface="+mn-lt"/>
+                <a:ea typeface="+mn-ea"/>
+                <a:cs typeface="+mn-cs"/>
+              </a:rPr>
+              <a:t>를 조정해가면서 </a:t>
+            </a:r>
+            <a:r>
+              <a:rPr lang="en-US" altLang="ko-KR" sz="1200" b="0" i="0" kern="1200" dirty="0" smtClean="0">
+                <a:solidFill>
+                  <a:schemeClr val="tx1"/>
+                </a:solidFill>
+                <a:effectLst/>
+                <a:latin typeface="+mn-lt"/>
+                <a:ea typeface="+mn-ea"/>
+                <a:cs typeface="+mn-cs"/>
+              </a:rPr>
+              <a:t>5</a:t>
+            </a:r>
+            <a:r>
+              <a:rPr lang="ko-KR" altLang="en-US" sz="1200" b="0" i="0" kern="1200" dirty="0" smtClean="0">
+                <a:solidFill>
+                  <a:schemeClr val="tx1"/>
+                </a:solidFill>
+                <a:effectLst/>
+                <a:latin typeface="+mn-lt"/>
+                <a:ea typeface="+mn-ea"/>
+                <a:cs typeface="+mn-cs"/>
+              </a:rPr>
+              <a:t>분간 측정한다</a:t>
+            </a:r>
+          </a:p>
+          <a:p>
+            <a:r>
+              <a:rPr lang="ko-KR" altLang="en-US" sz="1200" b="0" i="0" kern="1200" dirty="0" smtClean="0">
+                <a:solidFill>
+                  <a:schemeClr val="tx1"/>
+                </a:solidFill>
+                <a:effectLst/>
+                <a:latin typeface="+mn-lt"/>
+                <a:ea typeface="+mn-ea"/>
+                <a:cs typeface="+mn-cs"/>
+              </a:rPr>
+              <a:t>프로그램의 코드와 구성을 다음과 같이 바꾸어가면서 측정한다</a:t>
+            </a:r>
+            <a:endParaRPr lang="en-US" altLang="ko-KR" sz="1200" b="0" i="0" kern="1200" dirty="0" smtClean="0">
+              <a:solidFill>
+                <a:schemeClr val="tx1"/>
+              </a:solidFill>
+              <a:effectLst/>
+              <a:latin typeface="+mn-lt"/>
+              <a:ea typeface="+mn-ea"/>
+              <a:cs typeface="+mn-cs"/>
+            </a:endParaRPr>
+          </a:p>
+          <a:p>
+            <a:endParaRPr lang="en-US" altLang="ko-KR" sz="1200" b="0" i="0" kern="1200" dirty="0" smtClean="0">
+              <a:solidFill>
+                <a:schemeClr val="tx1"/>
+              </a:solidFill>
+              <a:effectLst/>
+              <a:latin typeface="+mn-lt"/>
+              <a:ea typeface="+mn-ea"/>
+              <a:cs typeface="+mn-cs"/>
+            </a:endParaRPr>
+          </a:p>
+          <a:p>
             <a:r>
               <a:rPr lang="ko-KR" altLang="en-US" sz="1200" b="0" i="0" kern="1200" dirty="0" err="1" smtClean="0">
                 <a:solidFill>
@@ -6437,107 +6484,7 @@
                 <a:ea typeface="+mn-ea"/>
                 <a:cs typeface="+mn-cs"/>
               </a:rPr>
-              <a:t>메소드를</a:t>
-            </a:r>
-            <a:r>
-              <a:rPr lang="ko-KR" altLang="en-US" sz="1200" b="0" i="0" kern="1200" dirty="0" smtClean="0">
-                <a:solidFill>
-                  <a:schemeClr val="tx1"/>
-                </a:solidFill>
-                <a:effectLst/>
-                <a:latin typeface="+mn-lt"/>
-                <a:ea typeface="+mn-ea"/>
-                <a:cs typeface="+mn-cs"/>
-              </a:rPr>
-              <a:t> 통해 이미 충분한 최적화를 진행한 부분이었다</a:t>
-            </a:r>
-            <a:r>
-              <a:rPr lang="en-US" altLang="ko-KR" sz="1200" b="0" i="0" kern="1200" dirty="0" smtClean="0">
-                <a:solidFill>
-                  <a:schemeClr val="tx1"/>
-                </a:solidFill>
-                <a:effectLst/>
-                <a:latin typeface="+mn-lt"/>
-                <a:ea typeface="+mn-ea"/>
-                <a:cs typeface="+mn-cs"/>
-              </a:rPr>
-              <a:t>.</a:t>
-            </a:r>
-          </a:p>
-          <a:p>
-            <a:r>
-              <a:rPr lang="ko-KR" altLang="en-US" sz="1200" b="0" i="0" kern="1200" dirty="0" smtClean="0">
-                <a:solidFill>
-                  <a:schemeClr val="tx1"/>
-                </a:solidFill>
-                <a:effectLst/>
-                <a:latin typeface="+mn-lt"/>
-                <a:ea typeface="+mn-ea"/>
-                <a:cs typeface="+mn-cs"/>
-              </a:rPr>
-              <a:t>타 </a:t>
-            </a:r>
-            <a:r>
-              <a:rPr lang="en-US" altLang="ko-KR" sz="1200" b="0" i="0" kern="1200" dirty="0" smtClean="0">
-                <a:solidFill>
-                  <a:schemeClr val="tx1"/>
-                </a:solidFill>
-                <a:effectLst/>
-                <a:latin typeface="+mn-lt"/>
-                <a:ea typeface="+mn-ea"/>
-                <a:cs typeface="+mn-cs"/>
-              </a:rPr>
-              <a:t>framework</a:t>
-            </a:r>
-            <a:r>
-              <a:rPr lang="ko-KR" altLang="en-US" sz="1200" b="0" i="0" kern="1200" dirty="0" smtClean="0">
-                <a:solidFill>
-                  <a:schemeClr val="tx1"/>
-                </a:solidFill>
-                <a:effectLst/>
-                <a:latin typeface="+mn-lt"/>
-                <a:ea typeface="+mn-ea"/>
-                <a:cs typeface="+mn-cs"/>
-              </a:rPr>
-              <a:t>를 이용하는 것은 좋은 시도가 될 수 있지만 시간 관계상 넘어갔다</a:t>
-            </a:r>
-            <a:r>
-              <a:rPr lang="en-US" altLang="ko-KR" sz="1200" b="0" i="0" kern="1200" dirty="0" smtClean="0">
-                <a:solidFill>
-                  <a:schemeClr val="tx1"/>
-                </a:solidFill>
-                <a:effectLst/>
-                <a:latin typeface="+mn-lt"/>
-                <a:ea typeface="+mn-ea"/>
-                <a:cs typeface="+mn-cs"/>
-              </a:rPr>
-              <a:t>.</a:t>
-            </a:r>
-          </a:p>
-          <a:p>
-            <a:r>
-              <a:rPr lang="ko-KR" altLang="en-US" sz="1200" b="0" i="0" kern="1200" dirty="0" smtClean="0">
-                <a:solidFill>
-                  <a:schemeClr val="tx1"/>
-                </a:solidFill>
-                <a:effectLst/>
-                <a:latin typeface="+mn-lt"/>
-                <a:ea typeface="+mn-ea"/>
-                <a:cs typeface="+mn-cs"/>
-              </a:rPr>
-              <a:t>따라서 서비스 전에 미리 </a:t>
-            </a:r>
-            <a:r>
-              <a:rPr lang="ko-KR" altLang="en-US" sz="1200" b="0" i="0" kern="1200" dirty="0" err="1" smtClean="0">
-                <a:solidFill>
-                  <a:schemeClr val="tx1"/>
-                </a:solidFill>
-                <a:effectLst/>
-                <a:latin typeface="+mn-lt"/>
-                <a:ea typeface="+mn-ea"/>
-                <a:cs typeface="+mn-cs"/>
-              </a:rPr>
-              <a:t>캐싱을</a:t>
+              <a:t>첫번째</a:t>
             </a:r>
             <a:r>
               <a:rPr lang="ko-KR" altLang="en-US" sz="1200" b="0" i="0" kern="1200" dirty="0" smtClean="0">
@@ -6552,7 +6499,7 @@
               <a:t> </a:t>
             </a:r>
             <a:r>
-              <a:rPr lang="ko-KR" altLang="en-US" sz="1200" b="0" i="0" kern="1200" dirty="0" err="1" smtClean="0">
+              <a:rPr lang="en-US" altLang="ko-KR" sz="1200" b="0" i="0" kern="1200" dirty="0" smtClean="0">
                 <a:solidFill>
                   <a:schemeClr val="tx1"/>
                 </a:solidFill>
@@ -6561,8 +6508,171 @@
                 <a:ea typeface="+mn-ea"/>
                 <a:cs typeface="+mn-cs"/>
               </a:rPr>
-              <a:t>여러번</a:t>
-            </a:r>
+              <a:t>Result</a:t>
+            </a:r>
+            <a:r>
+              <a:rPr lang="en-US" altLang="ko-KR" sz="1200" b="0" i="0" kern="1200" baseline="0" dirty="0" smtClean="0">
+                <a:solidFill>
+                  <a:schemeClr val="tx1"/>
+                </a:solidFill>
+                <a:effectLst/>
+                <a:latin typeface="+mn-lt"/>
+                <a:ea typeface="+mn-ea"/>
+                <a:cs typeface="+mn-cs"/>
+              </a:rPr>
+              <a:t> </a:t>
+            </a:r>
+            <a:r>
+              <a:rPr lang="ko-KR" altLang="en-US" sz="1200" b="0" i="0" kern="1200" baseline="0" dirty="0" smtClean="0">
+                <a:solidFill>
+                  <a:schemeClr val="tx1"/>
+                </a:solidFill>
+                <a:effectLst/>
+                <a:latin typeface="+mn-lt"/>
+                <a:ea typeface="+mn-ea"/>
+                <a:cs typeface="+mn-cs"/>
+              </a:rPr>
+              <a:t>해석</a:t>
+            </a:r>
+            <a:r>
+              <a:rPr lang="en-US" altLang="ko-KR" sz="1200" b="0" i="0" kern="1200" baseline="0" dirty="0" smtClean="0">
+                <a:solidFill>
+                  <a:schemeClr val="tx1"/>
+                </a:solidFill>
+                <a:effectLst/>
+                <a:latin typeface="+mn-lt"/>
+                <a:ea typeface="+mn-ea"/>
+                <a:cs typeface="+mn-cs"/>
+              </a:rPr>
+              <a:t>: </a:t>
+            </a:r>
+          </a:p>
+          <a:p>
+            <a:pPr marL="228600" indent="-228600">
+              <a:buAutoNum type="arabicPeriod"/>
+            </a:pPr>
+            <a:r>
+              <a:rPr lang="ko-KR" altLang="en-US" sz="1200" b="0" i="0" kern="1200" baseline="0" dirty="0" smtClean="0">
+                <a:solidFill>
+                  <a:schemeClr val="tx1"/>
+                </a:solidFill>
+                <a:effectLst/>
+                <a:latin typeface="+mn-lt"/>
+                <a:ea typeface="+mn-ea"/>
+                <a:cs typeface="+mn-cs"/>
+              </a:rPr>
+              <a:t>평균 </a:t>
+            </a:r>
+            <a:r>
+              <a:rPr lang="en-US" altLang="ko-KR" sz="1200" b="0" i="0" kern="1200" baseline="0" dirty="0" err="1" smtClean="0">
+                <a:solidFill>
+                  <a:schemeClr val="tx1"/>
+                </a:solidFill>
+                <a:effectLst/>
+                <a:latin typeface="+mn-lt"/>
+                <a:ea typeface="+mn-ea"/>
+                <a:cs typeface="+mn-cs"/>
+              </a:rPr>
+              <a:t>tps</a:t>
+            </a:r>
+            <a:r>
+              <a:rPr lang="ko-KR" altLang="en-US" sz="1200" b="0" i="0" kern="1200" baseline="0" dirty="0" smtClean="0">
+                <a:solidFill>
+                  <a:schemeClr val="tx1"/>
+                </a:solidFill>
+                <a:effectLst/>
+                <a:latin typeface="+mn-lt"/>
+                <a:ea typeface="+mn-ea"/>
+                <a:cs typeface="+mn-cs"/>
+              </a:rPr>
+              <a:t>는 </a:t>
+            </a:r>
+            <a:r>
+              <a:rPr lang="en-US" altLang="ko-KR" sz="1200" b="0" i="0" kern="1200" baseline="0" dirty="0" smtClean="0">
+                <a:solidFill>
+                  <a:schemeClr val="tx1"/>
+                </a:solidFill>
+                <a:effectLst/>
+                <a:latin typeface="+mn-lt"/>
+                <a:ea typeface="+mn-ea"/>
+                <a:cs typeface="+mn-cs"/>
+              </a:rPr>
+              <a:t>1</a:t>
+            </a:r>
+            <a:r>
+              <a:rPr lang="ko-KR" altLang="en-US" sz="1200" b="0" i="0" kern="1200" baseline="0" dirty="0" smtClean="0">
+                <a:solidFill>
+                  <a:schemeClr val="tx1"/>
+                </a:solidFill>
+                <a:effectLst/>
+                <a:latin typeface="+mn-lt"/>
+                <a:ea typeface="+mn-ea"/>
+                <a:cs typeface="+mn-cs"/>
+              </a:rPr>
+              <a:t>명</a:t>
+            </a:r>
+            <a:r>
+              <a:rPr lang="en-US" altLang="ko-KR" sz="1200" b="0" i="0" kern="1200" baseline="0" dirty="0" smtClean="0">
+                <a:solidFill>
+                  <a:schemeClr val="tx1"/>
+                </a:solidFill>
+                <a:effectLst/>
+                <a:latin typeface="+mn-lt"/>
+                <a:ea typeface="+mn-ea"/>
+                <a:cs typeface="+mn-cs"/>
+              </a:rPr>
+              <a:t>, peak</a:t>
+            </a:r>
+            <a:r>
+              <a:rPr lang="ko-KR" altLang="en-US" sz="1200" b="0" i="0" kern="1200" baseline="0" dirty="0" smtClean="0">
+                <a:solidFill>
+                  <a:schemeClr val="tx1"/>
+                </a:solidFill>
+                <a:effectLst/>
+                <a:latin typeface="+mn-lt"/>
+                <a:ea typeface="+mn-ea"/>
+                <a:cs typeface="+mn-cs"/>
+              </a:rPr>
+              <a:t>는 </a:t>
+            </a:r>
+            <a:r>
+              <a:rPr lang="en-US" altLang="ko-KR" sz="1200" b="0" i="0" kern="1200" baseline="0" dirty="0" smtClean="0">
+                <a:solidFill>
+                  <a:schemeClr val="tx1"/>
+                </a:solidFill>
+                <a:effectLst/>
+                <a:latin typeface="+mn-lt"/>
+                <a:ea typeface="+mn-ea"/>
+                <a:cs typeface="+mn-cs"/>
+              </a:rPr>
+              <a:t>58</a:t>
+            </a:r>
+            <a:r>
+              <a:rPr lang="ko-KR" altLang="en-US" sz="1200" b="0" i="0" kern="1200" baseline="0" dirty="0" smtClean="0">
+                <a:solidFill>
+                  <a:schemeClr val="tx1"/>
+                </a:solidFill>
+                <a:effectLst/>
+                <a:latin typeface="+mn-lt"/>
+                <a:ea typeface="+mn-ea"/>
+                <a:cs typeface="+mn-cs"/>
+              </a:rPr>
+              <a:t>명</a:t>
+            </a:r>
+            <a:endParaRPr lang="en-US" altLang="ko-KR" sz="1200" b="0" i="0" kern="1200" baseline="0" dirty="0" smtClean="0">
+              <a:solidFill>
+                <a:schemeClr val="tx1"/>
+              </a:solidFill>
+              <a:effectLst/>
+              <a:latin typeface="+mn-lt"/>
+              <a:ea typeface="+mn-ea"/>
+              <a:cs typeface="+mn-cs"/>
+            </a:endParaRPr>
+          </a:p>
+          <a:p>
+            <a:pPr marL="228600" indent="-228600">
+              <a:buAutoNum type="arabicPeriod"/>
+            </a:pPr>
             <a:r>
               <a:rPr lang="ko-KR" altLang="en-US" sz="1200" b="0" i="0" kern="1200" dirty="0" smtClean="0">
                 <a:solidFill>
@@ -6573,10 +6683,195 @@
                 <a:ea typeface="+mn-ea"/>
                 <a:cs typeface="+mn-cs"/>
               </a:rPr>
-              <a:t> 해놓는 것이 현재 생각할 수 있는 제일 나은 전략이다</a:t>
-            </a:r>
-            <a:r>
-              <a:rPr lang="en-US" altLang="ko-KR" sz="1200" b="0" i="0" kern="1200" dirty="0" smtClean="0">
+              <a:t>병목지</a:t>
+            </a:r>
+            <a:r>
+              <a:rPr lang="ko-KR" altLang="en-US" sz="1200" b="0" i="0" kern="1200" baseline="0" dirty="0" smtClean="0">
+                <a:solidFill>
+                  <a:schemeClr val="tx1"/>
+                </a:solidFill>
+                <a:effectLst/>
+                <a:latin typeface="+mn-lt"/>
+                <a:ea typeface="+mn-ea"/>
+                <a:cs typeface="+mn-cs"/>
+              </a:rPr>
+              <a:t>점 </a:t>
+            </a:r>
+            <a:r>
+              <a:rPr lang="en-US" altLang="ko-KR" sz="1200" b="0" i="0" kern="1200" baseline="0" dirty="0" smtClean="0">
+                <a:solidFill>
+                  <a:schemeClr val="tx1"/>
+                </a:solidFill>
+                <a:effectLst/>
+                <a:latin typeface="+mn-lt"/>
+                <a:ea typeface="+mn-ea"/>
+                <a:cs typeface="+mn-cs"/>
+              </a:rPr>
+              <a:t>: </a:t>
+            </a:r>
+            <a:r>
+              <a:rPr lang="ko-KR" altLang="en-US" sz="1200" b="0" i="0" kern="1200" baseline="0" dirty="0" err="1" smtClean="0">
+                <a:solidFill>
+                  <a:schemeClr val="tx1"/>
+                </a:solidFill>
+                <a:effectLst/>
+                <a:latin typeface="+mn-lt"/>
+                <a:ea typeface="+mn-ea"/>
+                <a:cs typeface="+mn-cs"/>
+              </a:rPr>
+              <a:t>웹페이지로</a:t>
+            </a:r>
+            <a:r>
+              <a:rPr lang="ko-KR" altLang="en-US" sz="1200" b="0" i="0" kern="1200" baseline="0" dirty="0" smtClean="0">
+                <a:solidFill>
+                  <a:schemeClr val="tx1"/>
+                </a:solidFill>
+                <a:effectLst/>
+                <a:latin typeface="+mn-lt"/>
+                <a:ea typeface="+mn-ea"/>
+                <a:cs typeface="+mn-cs"/>
+              </a:rPr>
+              <a:t> </a:t>
+            </a:r>
+            <a:r>
+              <a:rPr lang="ko-KR" altLang="en-US" sz="1200" b="0" i="0" kern="1200" baseline="0" dirty="0" err="1" smtClean="0">
+                <a:solidFill>
+                  <a:schemeClr val="tx1"/>
+                </a:solidFill>
+                <a:effectLst/>
+                <a:latin typeface="+mn-lt"/>
+                <a:ea typeface="+mn-ea"/>
+                <a:cs typeface="+mn-cs"/>
+              </a:rPr>
+              <a:t>렌더링하는</a:t>
+            </a:r>
+            <a:r>
+              <a:rPr lang="ko-KR" altLang="en-US" sz="1200" b="0" i="0" kern="1200" baseline="0" dirty="0" smtClean="0">
+                <a:solidFill>
+                  <a:schemeClr val="tx1"/>
+                </a:solidFill>
+                <a:effectLst/>
+                <a:latin typeface="+mn-lt"/>
+                <a:ea typeface="+mn-ea"/>
+                <a:cs typeface="+mn-cs"/>
+              </a:rPr>
+              <a:t> 부분에서 오래 걸린다</a:t>
+            </a:r>
+            <a:r>
+              <a:rPr lang="en-US" altLang="ko-KR" sz="1200" b="0" i="0" kern="1200" baseline="0" dirty="0" smtClean="0">
+                <a:solidFill>
+                  <a:schemeClr val="tx1"/>
+                </a:solidFill>
+                <a:effectLst/>
+                <a:latin typeface="+mn-lt"/>
+                <a:ea typeface="+mn-ea"/>
+                <a:cs typeface="+mn-cs"/>
+              </a:rPr>
+              <a:t>.</a:t>
+            </a:r>
+          </a:p>
+          <a:p>
+            <a:pPr marL="228600" indent="-228600">
+              <a:buAutoNum type="arabicPeriod"/>
+            </a:pPr>
+            <a:r>
+              <a:rPr lang="en-US" altLang="ko-KR" sz="1200" b="0" i="0" kern="1200" baseline="0" dirty="0" smtClean="0">
+                <a:solidFill>
+                  <a:schemeClr val="tx1"/>
+                </a:solidFill>
+                <a:effectLst/>
+                <a:latin typeface="+mn-lt"/>
+                <a:ea typeface="+mn-ea"/>
+                <a:cs typeface="+mn-cs"/>
+              </a:rPr>
+              <a:t>core logic</a:t>
+            </a:r>
+            <a:r>
+              <a:rPr lang="ko-KR" altLang="en-US" sz="1200" b="0" i="0" kern="1200" baseline="0" dirty="0" smtClean="0">
+                <a:solidFill>
+                  <a:schemeClr val="tx1"/>
+                </a:solidFill>
+                <a:effectLst/>
+                <a:latin typeface="+mn-lt"/>
+                <a:ea typeface="+mn-ea"/>
+                <a:cs typeface="+mn-cs"/>
+              </a:rPr>
+              <a:t>의 존재유무는 </a:t>
+            </a:r>
+            <a:r>
+              <a:rPr lang="en-US" altLang="ko-KR" sz="1200" b="0" i="0" kern="1200" baseline="0" dirty="0" err="1" smtClean="0">
+                <a:solidFill>
+                  <a:schemeClr val="tx1"/>
+                </a:solidFill>
+                <a:effectLst/>
+                <a:latin typeface="+mn-lt"/>
+                <a:ea typeface="+mn-ea"/>
+                <a:cs typeface="+mn-cs"/>
+              </a:rPr>
+              <a:t>tps</a:t>
+            </a:r>
+            <a:r>
+              <a:rPr lang="ko-KR" altLang="en-US" sz="1200" b="0" i="0" kern="1200" baseline="0" dirty="0" smtClean="0">
+                <a:solidFill>
+                  <a:schemeClr val="tx1"/>
+                </a:solidFill>
+                <a:effectLst/>
+                <a:latin typeface="+mn-lt"/>
+                <a:ea typeface="+mn-ea"/>
+                <a:cs typeface="+mn-cs"/>
+              </a:rPr>
+              <a:t>에 영향을 미치지 않으므로 우리가 구현한 </a:t>
+            </a:r>
+            <a:r>
+              <a:rPr lang="en-US" altLang="ko-KR" sz="1200" b="0" i="0" kern="1200" baseline="0" dirty="0" smtClean="0">
+                <a:solidFill>
+                  <a:schemeClr val="tx1"/>
+                </a:solidFill>
+                <a:effectLst/>
+                <a:latin typeface="+mn-lt"/>
+                <a:ea typeface="+mn-ea"/>
+                <a:cs typeface="+mn-cs"/>
+              </a:rPr>
+              <a:t>logic</a:t>
+            </a:r>
+            <a:r>
+              <a:rPr lang="ko-KR" altLang="en-US" sz="1200" b="0" i="0" kern="1200" baseline="0" dirty="0" smtClean="0">
+                <a:solidFill>
+                  <a:schemeClr val="tx1"/>
+                </a:solidFill>
+                <a:effectLst/>
+                <a:latin typeface="+mn-lt"/>
+                <a:ea typeface="+mn-ea"/>
+                <a:cs typeface="+mn-cs"/>
+              </a:rPr>
+              <a:t>은 충분히 최적화 되어있다고 결론을 </a:t>
+            </a:r>
+            <a:r>
+              <a:rPr lang="ko-KR" altLang="en-US" sz="1200" b="0" i="0" kern="1200" baseline="0" dirty="0" err="1" smtClean="0">
+                <a:solidFill>
+                  <a:schemeClr val="tx1"/>
+                </a:solidFill>
+                <a:effectLst/>
+                <a:latin typeface="+mn-lt"/>
+                <a:ea typeface="+mn-ea"/>
+                <a:cs typeface="+mn-cs"/>
+              </a:rPr>
+              <a:t>내릴수</a:t>
+            </a:r>
+            <a:r>
+              <a:rPr lang="ko-KR" altLang="en-US" sz="1200" b="0" i="0" kern="1200" baseline="0" dirty="0" smtClean="0">
+                <a:solidFill>
+                  <a:schemeClr val="tx1"/>
+                </a:solidFill>
+                <a:effectLst/>
+                <a:latin typeface="+mn-lt"/>
+                <a:ea typeface="+mn-ea"/>
+                <a:cs typeface="+mn-cs"/>
+              </a:rPr>
+              <a:t> 있다</a:t>
+            </a:r>
+            <a:r>
+              <a:rPr lang="en-US" altLang="ko-KR" sz="1200" b="0" i="0" kern="1200" baseline="0" dirty="0" smtClean="0">
                 <a:solidFill>
                   <a:schemeClr val="tx1"/>
                 </a:solidFill>
@@ -6607,7 +6902,7 @@
           <a:p>
             <a:fld id="{6F21B0EB-C86B-4604-8114-9CE19A3BBEEA}" type="slidenum">
               <a:rPr lang="ko-KR" altLang="en-US" smtClean="0"/>
-              <a:t>14</a:t>
+              <a:t>13</a:t>
             </a:fld>
             <a:endParaRPr lang="ko-KR" altLang="en-US"/>
           </a:p>
@@ -6616,7 +6911,7 @@
     </p:spTree>
     <p:extLst>
       <p:ext uri="{BB962C8B-B14F-4D97-AF65-F5344CB8AC3E}">
-        <p14:creationId xmlns:p14="http://schemas.microsoft.com/office/powerpoint/2010/main" val="4169883793"/>
+        <p14:creationId xmlns:p14="http://schemas.microsoft.com/office/powerpoint/2010/main" val="731346592"/>
       </p:ext>
     </p:extLst>
   </p:cSld>
@@ -7094,7 +7389,7 @@
           <a:p>
             <a:fld id="{60AF9543-F7D9-42EF-A3DB-0F99C24B0930}" type="datetimeFigureOut">
               <a:rPr lang="ko-KR" altLang="en-US" smtClean="0"/>
-              <a:t>2017-06-15</a:t>
+              <a:t>2017-06-16</a:t>
             </a:fld>
             <a:endParaRPr lang="ko-KR" altLang="en-US"/>
           </a:p>
@@ -7296,7 +7591,7 @@
           <a:p>
             <a:fld id="{60AF9543-F7D9-42EF-A3DB-0F99C24B0930}" type="datetimeFigureOut">
               <a:rPr lang="ko-KR" altLang="en-US" smtClean="0"/>
-              <a:t>2017-06-15</a:t>
+              <a:t>2017-06-16</a:t>
             </a:fld>
             <a:endParaRPr lang="ko-KR" altLang="en-US"/>
           </a:p>
@@ -7476,7 +7771,7 @@
           <a:p>
             <a:fld id="{60AF9543-F7D9-42EF-A3DB-0F99C24B0930}" type="datetimeFigureOut">
               <a:rPr lang="ko-KR" altLang="en-US" smtClean="0"/>
-              <a:t>2017-06-15</a:t>
+              <a:t>2017-06-16</a:t>
             </a:fld>
             <a:endParaRPr lang="ko-KR" altLang="en-US"/>
           </a:p>
@@ -7684,7 +7979,7 @@
           <a:p>
             <a:fld id="{60AF9543-F7D9-42EF-A3DB-0F99C24B0930}" type="datetimeFigureOut">
               <a:rPr lang="ko-KR" altLang="en-US" smtClean="0"/>
-              <a:t>2017-06-15</a:t>
+              <a:t>2017-06-16</a:t>
             </a:fld>
             <a:endParaRPr lang="ko-KR" altLang="en-US"/>
           </a:p>
@@ -8259,7 +8554,7 @@
           <a:p>
             <a:fld id="{60AF9543-F7D9-42EF-A3DB-0F99C24B0930}" type="datetimeFigureOut">
               <a:rPr lang="ko-KR" altLang="en-US" smtClean="0"/>
-              <a:t>2017-06-15</a:t>
+              <a:t>2017-06-16</a:t>
             </a:fld>
             <a:endParaRPr lang="ko-KR" altLang="en-US"/>
           </a:p>
@@ -8561,7 +8856,7 @@
           <a:p>
             <a:fld id="{60AF9543-F7D9-42EF-A3DB-0F99C24B0930}" type="datetimeFigureOut">
               <a:rPr lang="ko-KR" altLang="en-US" smtClean="0"/>
-              <a:t>2017-06-15</a:t>
+              <a:t>2017-06-16</a:t>
             </a:fld>
             <a:endParaRPr lang="ko-KR" altLang="en-US"/>
           </a:p>
@@ -8998,7 +9293,7 @@
           <a:p>
             <a:fld id="{60AF9543-F7D9-42EF-A3DB-0F99C24B0930}" type="datetimeFigureOut">
               <a:rPr lang="ko-KR" altLang="en-US" smtClean="0"/>
-              <a:t>2017-06-15</a:t>
+              <a:t>2017-06-16</a:t>
             </a:fld>
             <a:endParaRPr lang="ko-KR" altLang="en-US"/>
           </a:p>
@@ -9116,7 +9411,7 @@
           <a:p>
             <a:fld id="{60AF9543-F7D9-42EF-A3DB-0F99C24B0930}" type="datetimeFigureOut">
               <a:rPr lang="ko-KR" altLang="en-US" smtClean="0"/>
-              <a:t>2017-06-15</a:t>
+              <a:t>2017-06-16</a:t>
             </a:fld>
             <a:endParaRPr lang="ko-KR" altLang="en-US"/>
           </a:p>
@@ -9211,7 +9506,7 @@
           <a:p>
             <a:fld id="{60AF9543-F7D9-42EF-A3DB-0F99C24B0930}" type="datetimeFigureOut">
               <a:rPr lang="ko-KR" altLang="en-US" smtClean="0"/>
-              <a:t>2017-06-15</a:t>
+              <a:t>2017-06-16</a:t>
             </a:fld>
             <a:endParaRPr lang="ko-KR" altLang="en-US"/>
           </a:p>
@@ -9555,7 +9850,7 @@
           <a:p>
             <a:fld id="{60AF9543-F7D9-42EF-A3DB-0F99C24B0930}" type="datetimeFigureOut">
               <a:rPr lang="ko-KR" altLang="en-US" smtClean="0"/>
-              <a:t>2017-06-15</a:t>
+              <a:t>2017-06-16</a:t>
             </a:fld>
             <a:endParaRPr lang="ko-KR" altLang="en-US"/>
           </a:p>
@@ -9944,7 +10239,7 @@
           <a:p>
             <a:fld id="{60AF9543-F7D9-42EF-A3DB-0F99C24B0930}" type="datetimeFigureOut">
               <a:rPr lang="ko-KR" altLang="en-US" smtClean="0"/>
-              <a:t>2017-06-15</a:t>
+              <a:t>2017-06-16</a:t>
             </a:fld>
             <a:endParaRPr lang="ko-KR" altLang="en-US"/>
           </a:p>
@@ -10249,7 +10544,7 @@
           <a:p>
             <a:fld id="{60AF9543-F7D9-42EF-A3DB-0F99C24B0930}" type="datetimeFigureOut">
               <a:rPr lang="ko-KR" altLang="en-US" smtClean="0"/>
-              <a:t>2017-06-15</a:t>
+              <a:t>2017-06-16</a:t>
             </a:fld>
             <a:endParaRPr lang="ko-KR" altLang="en-US"/>
           </a:p>
@@ -12359,6 +12654,134 @@
           </p:txBody>
         </p:sp>
       </p:grpSp>
+      <p:sp>
+        <p:nvSpPr>
+          <p:cNvPr id="3" name="타원 2"/>
+          <p:cNvSpPr/>
+          <p:nvPr/>
+        </p:nvSpPr>
+        <p:spPr>
+          <a:xfrm>
+            <a:off x="5121892" y="5075966"/>
+            <a:ext cx="1322216" cy="615738"/>
+          </a:xfrm>
+          <a:prstGeom prst="ellipse">
+            <a:avLst/>
+          </a:prstGeom>
+          <a:solidFill>
+            <a:schemeClr val="tx2">
+              <a:lumMod val="90000"/>
+            </a:schemeClr>
+          </a:solidFill>
+          <a:ln w="38100">
+            <a:noFill/>
+          </a:ln>
+        </p:spPr>
+        <p:style>
+          <a:lnRef idx="2">
+            <a:schemeClr val="accent1">
+              <a:shade val="50000"/>
+            </a:schemeClr>
+          </a:lnRef>
+          <a:fillRef idx="1">
+            <a:schemeClr val="accent1"/>
+          </a:fillRef>
+          <a:effectRef idx="0">
+            <a:schemeClr val="accent1"/>
+          </a:effectRef>
+          <a:fontRef idx="minor">
+            <a:schemeClr val="lt1"/>
+          </a:fontRef>
+        </p:style>
+        <p:txBody>
+          <a:bodyPr rtlCol="0" anchor="ctr"/>
+          <a:lstStyle/>
+          <a:p>
+            <a:pPr algn="ctr"/>
+            <a:r>
+              <a:rPr lang="en-US" altLang="ko-KR" sz="2000" dirty="0" smtClean="0">
+                <a:solidFill>
+                  <a:schemeClr val="bg1"/>
+                </a:solidFill>
+                <a:latin typeface="D2Coding" panose="020B0609020101020101" pitchFamily="49" charset="-127"/>
+                <a:ea typeface="D2Coding" panose="020B0609020101020101" pitchFamily="49" charset="-127"/>
+              </a:rPr>
+              <a:t>Score</a:t>
+            </a:r>
+            <a:endParaRPr lang="ko-KR" altLang="en-US" sz="2000" dirty="0">
+              <a:solidFill>
+                <a:schemeClr val="bg1"/>
+              </a:solidFill>
+              <a:latin typeface="D2Coding" panose="020B0609020101020101" pitchFamily="49" charset="-127"/>
+              <a:ea typeface="D2Coding" panose="020B0609020101020101" pitchFamily="49" charset="-127"/>
+            </a:endParaRPr>
+          </a:p>
+        </p:txBody>
+      </p:sp>
+      <p:sp>
+        <p:nvSpPr>
+          <p:cNvPr id="35" name="타원 34"/>
+          <p:cNvSpPr/>
+          <p:nvPr/>
+        </p:nvSpPr>
+        <p:spPr>
+          <a:xfrm>
+            <a:off x="5121892" y="5839613"/>
+            <a:ext cx="1322216" cy="615738"/>
+          </a:xfrm>
+          <a:prstGeom prst="ellipse">
+            <a:avLst/>
+          </a:prstGeom>
+          <a:solidFill>
+            <a:schemeClr val="tx2">
+              <a:lumMod val="90000"/>
+            </a:schemeClr>
+          </a:solidFill>
+          <a:ln w="38100">
+            <a:noFill/>
+          </a:ln>
+        </p:spPr>
+        <p:style>
+          <a:lnRef idx="2">
+            <a:schemeClr val="accent1">
+              <a:shade val="50000"/>
+            </a:schemeClr>
+          </a:lnRef>
+          <a:fillRef idx="1">
+            <a:schemeClr val="accent1"/>
+          </a:fillRef>
+          <a:effectRef idx="0">
+            <a:schemeClr val="accent1"/>
+          </a:effectRef>
+          <a:fontRef idx="minor">
+            <a:schemeClr val="lt1"/>
+          </a:fontRef>
+        </p:style>
+        <p:txBody>
+          <a:bodyPr rtlCol="0" anchor="ctr"/>
+          <a:lstStyle/>
+          <a:p>
+            <a:pPr algn="ctr"/>
+            <a:r>
+              <a:rPr lang="en-US" altLang="ko-KR" sz="1500" dirty="0" smtClean="0">
+                <a:solidFill>
+                  <a:schemeClr val="bg1"/>
+                </a:solidFill>
+                <a:latin typeface="D2Coding" panose="020B0609020101020101" pitchFamily="49" charset="-127"/>
+                <a:ea typeface="D2Coding" panose="020B0609020101020101" pitchFamily="49" charset="-127"/>
+              </a:rPr>
+              <a:t>Harmony</a:t>
+            </a:r>
+            <a:endParaRPr lang="ko-KR" altLang="en-US" sz="1500" dirty="0">
+              <a:solidFill>
+                <a:schemeClr val="bg1"/>
+              </a:solidFill>
+              <a:latin typeface="D2Coding" panose="020B0609020101020101" pitchFamily="49" charset="-127"/>
+              <a:ea typeface="D2Coding" panose="020B0609020101020101" pitchFamily="49" charset="-127"/>
+            </a:endParaRPr>
+          </a:p>
+        </p:txBody>
+      </p:sp>
     </p:spTree>
     <p:extLst>
       <p:ext uri="{BB962C8B-B14F-4D97-AF65-F5344CB8AC3E}">
@@ -20199,7 +20622,19 @@
             </a:r>
           </a:p>
           <a:p>
+            <a:pPr lvl="1"/>
+            <a:r>
+              <a:rPr lang="ko-KR" altLang="en-US" dirty="0" smtClean="0"/>
+              <a:t>분위기가 특히 영향을 미치는 장소들</a:t>
+            </a:r>
             <a:endParaRPr lang="en-US" altLang="ko-KR" dirty="0"/>
+          </a:p>
+          <a:p>
+            <a:endParaRPr lang="en-US" altLang="ko-KR" dirty="0"/>
+          </a:p>
+          <a:p>
+            <a:pPr lvl="1"/>
+            <a:endParaRPr lang="en-US" altLang="ko-KR" dirty="0" smtClean="0"/>
           </a:p>
           <a:p>
             <a:r>
@@ -21506,7 +21941,7 @@
           <p:nvPr>
             <p:extLst>
               <p:ext uri="{D42A27DB-BD31-4B8C-83A1-F6EECF244321}">
-                <p14:modId xmlns:p14="http://schemas.microsoft.com/office/powerpoint/2010/main" val="2282453048"/>
+                <p14:modId xmlns:p14="http://schemas.microsoft.com/office/powerpoint/2010/main" val="2846988116"/>
               </p:ext>
             </p:extLst>
           </p:nvPr>
@@ -22078,26 +22513,32 @@
       </p:sp>
       <p:pic>
         <p:nvPicPr>
-          <p:cNvPr id="6" name="그림 5"/>
-          <p:cNvPicPr>
-            <a:picLocks noChangeAspect="1"/>
-          </p:cNvPicPr>
+          <p:cNvPr id="7" name="그림 6"/>
+          <p:cNvPicPr/>
           <p:nvPr/>
         </p:nvPicPr>
         <p:blipFill>
-          <a:blip r:embed="rId3"/>
+          <a:blip r:embed="rId3" cstate="print"/>
+          <a:srcRect/>
           <a:stretch>
             <a:fillRect/>
           </a:stretch>
         </p:blipFill>
-        <p:spPr>
-          <a:xfrm>
-            <a:off x="295422" y="290501"/>
-            <a:ext cx="11605846" cy="6386733"/>
+        <p:spPr bwMode="auto">
+          <a:xfrm rot="5400000">
+            <a:off x="3365631" y="-2061135"/>
+            <a:ext cx="5460738" cy="12019722"/>
           </a:xfrm>
           <a:prstGeom prst="rect">
             <a:avLst/>
           </a:prstGeom>
+          <a:noFill/>
+          <a:ln w="9525">
+            <a:noFill/>
+            <a:miter lim="800000"/>
+            <a:headEnd/>
+            <a:tailEnd/>
+          </a:ln>
         </p:spPr>
       </p:pic>
     </p:spTree>
@@ -22113,75 +22554,7 @@
   <p:timing>
     <p:tnLst>
       <p:par>
-        <p:cTn id="1" dur="indefinite" restart="never" nodeType="tmRoot">
-          <p:childTnLst>
-            <p:seq concurrent="1" nextAc="seek">
-              <p:cTn id="2" dur="indefinite" nodeType="mainSeq">
-                <p:childTnLst>
-                  <p:par>
-                    <p:cTn id="3" fill="hold">
-                      <p:stCondLst>
-                        <p:cond delay="indefinite"/>
-                      </p:stCondLst>
-                      <p:childTnLst>
-                        <p:par>
-                          <p:cTn id="4" fill="hold">
-                            <p:stCondLst>
-                              <p:cond delay="0"/>
-                            </p:stCondLst>
-                            <p:childTnLst>
-                              <p:par>
-                                <p:cTn id="5" presetID="1" presetClass="entr" presetSubtype="0" fill="hold" nodeType="clickEffect">
-                                  <p:stCondLst>
-                                    <p:cond delay="0"/>
-                                  </p:stCondLst>
-                                  <p:childTnLst>
-                                    <p:set>
-                                      <p:cBhvr>
-                                        <p:cTn id="6" dur="1" fill="hold">
-                                          <p:stCondLst>
-                                            <p:cond delay="0"/>
-                                          </p:stCondLst>
-                                        </p:cTn>
-                                        <p:tgtEl>
-                                          <p:spTgt spid="6"/>
-                                        </p:tgtEl>
-                                        <p:attrNameLst>
-                                          <p:attrName>style.visibility</p:attrName>
-                                        </p:attrNameLst>
-                                      </p:cBhvr>
-                                      <p:to>
-                                        <p:strVal val="visible"/>
-                                      </p:to>
-                                    </p:set>
-                                  </p:childTnLst>
-                                </p:cTn>
-                              </p:par>
-                            </p:childTnLst>
-                          </p:cTn>
-                        </p:par>
-                      </p:childTnLst>
-                    </p:cTn>
-                  </p:par>
-                </p:childTnLst>
-              </p:cTn>
-              <p:prevCondLst>
-                <p:cond evt="onPrev" delay="0">
-                  <p:tgtEl>
-                    <p:sldTgt/>
-                  </p:tgtEl>
-                </p:cond>
-              </p:prevCondLst>
-              <p:nextCondLst>
-                <p:cond evt="onNext" delay="0">
-                  <p:tgtEl>
-                    <p:sldTgt/>
-                  </p:tgtEl>
-                </p:cond>
-              </p:nextCondLst>
-            </p:seq>
-          </p:childTnLst>
-        </p:cTn>
+        <p:cTn id="1" dur="indefinite" restart="never" nodeType="tmRoot"/>
       </p:par>
     </p:tnLst>
   </p:timing>
@@ -22928,7 +23301,7 @@
           <p:nvPr>
             <p:extLst>
               <p:ext uri="{D42A27DB-BD31-4B8C-83A1-F6EECF244321}">
-                <p14:modId xmlns:p14="http://schemas.microsoft.com/office/powerpoint/2010/main" val="3457254995"/>
+                <p14:modId xmlns:p14="http://schemas.microsoft.com/office/powerpoint/2010/main" val="3053543699"/>
               </p:ext>
             </p:extLst>
           </p:nvPr>
@@ -22941,7 +23314,7 @@
           <a:graphicData uri="http://schemas.openxmlformats.org/drawingml/2006/table">
             <a:tbl>
               <a:tblPr firstRow="1" bandRow="1">
-                <a:tableStyleId>{5C22544A-7EE6-4342-B048-85BDC9FD1C3A}</a:tableStyleId>
+                <a:tableStyleId>{93296810-A885-4BE3-A3E7-6D5BEEA58F35}</a:tableStyleId>
               </a:tblPr>
               <a:tblGrid>
                 <a:gridCol w="1338471"/>
@@ -22966,28 +23339,7 @@
                       </a:endParaRPr>
                     </a:p>
                   </a:txBody>
-                  <a:tcPr>
-                    <a:lnL w="12700" cmpd="sng">
-                      <a:noFill/>
-                    </a:lnL>
-                    <a:lnR w="12700" cmpd="sng">
-                      <a:noFill/>
-                    </a:lnR>
-                    <a:lnT w="12700" cmpd="sng">
-                      <a:noFill/>
-                    </a:lnT>
-                    <a:lnB w="38100" cmpd="sng">
-                      <a:noFill/>
-                    </a:lnB>
-                    <a:lnTlToBr w="12700" cmpd="sng">
-                      <a:noFill/>
-                      <a:prstDash val="solid"/>
-                    </a:lnTlToBr>
-                    <a:lnBlToTr w="12700" cmpd="sng">
-                      <a:noFill/>
-                      <a:prstDash val="solid"/>
-                    </a:lnBlToTr>
-                  </a:tcPr>
+                  <a:tcPr/>
                 </a:tc>
               </a:tr>
               <a:tr h="1061383">
@@ -23035,28 +23387,7 @@
                       </a:r>
                     </a:p>
                   </a:txBody>
-                  <a:tcPr>
-                    <a:lnL w="12700" cmpd="sng">
-                      <a:noFill/>
-                    </a:lnL>
-                    <a:lnR w="12700" cmpd="sng">
-                      <a:noFill/>
-                    </a:lnR>
-                    <a:lnT w="38100" cmpd="sng">
-                      <a:noFill/>
-                    </a:lnT>
-                    <a:lnB w="12700" cmpd="sng">
-                      <a:noFill/>
-                    </a:lnB>
-                    <a:lnTlToBr w="12700" cmpd="sng">
-                      <a:noFill/>
-                      <a:prstDash val="solid"/>
-                    </a:lnTlToBr>
-                    <a:lnBlToTr w="12700" cmpd="sng">
-                      <a:noFill/>
-                      <a:prstDash val="solid"/>
-                    </a:lnBlToTr>
-                  </a:tcPr>
+                  <a:tcPr/>
                 </a:tc>
               </a:tr>
             </a:tbl>
@@ -23300,106 +23631,6 @@
           </a:graphicData>
         </a:graphic>
       </p:graphicFrame>
-      <p:grpSp>
-        <p:nvGrpSpPr>
-          <p:cNvPr id="236" name="그룹 235"/>
-          <p:cNvGrpSpPr/>
-          <p:nvPr/>
-        </p:nvGrpSpPr>
-        <p:grpSpPr>
-          <a:xfrm>
-            <a:off x="2571289" y="2757014"/>
-            <a:ext cx="892352" cy="585158"/>
-            <a:chOff x="2571289" y="2757014"/>
-            <a:chExt cx="892352" cy="585158"/>
-          </a:xfrm>
-        </p:grpSpPr>
-        <p:cxnSp>
-          <p:nvCxnSpPr>
-            <p:cNvPr id="142" name="구부러진 연결선 141"/>
-            <p:cNvCxnSpPr>
-              <a:stCxn id="112" idx="3"/>
-            </p:cNvCxnSpPr>
-            <p:nvPr/>
-          </p:nvCxnSpPr>
-          <p:spPr>
-            <a:xfrm flipV="1">
-              <a:off x="2571290" y="2757014"/>
-              <a:ext cx="892351" cy="492393"/>
-            </a:xfrm>
-            <a:prstGeom prst="curvedConnector3">
-              <a:avLst/>
-            </a:prstGeom>
-            <a:ln w="38100">
-              <a:solidFill>
-                <a:schemeClr val="tx1"/>
-              </a:solidFill>
-            </a:ln>
-          </p:spPr>
-          <p:style>
-            <a:lnRef idx="1">
-              <a:schemeClr val="accent1"/>
-            </a:lnRef>
-            <a:fillRef idx="0">
-              <a:schemeClr val="accent1"/>
-            </a:fillRef>
-            <a:effectRef idx="0">
-              <a:schemeClr val="accent1"/>
-            </a:effectRef>
-            <a:fontRef idx="minor">
-              <a:schemeClr val="tx1"/>
-            </a:fontRef>
-          </p:style>
-        </p:cxnSp>
-        <p:sp>
-          <p:nvSpPr>
-            <p:cNvPr id="147" name="타원 146"/>
-            <p:cNvSpPr/>
-            <p:nvPr/>
-          </p:nvSpPr>
-          <p:spPr>
-            <a:xfrm>
-              <a:off x="2571289" y="3156641"/>
-              <a:ext cx="185531" cy="185531"/>
-            </a:xfrm>
-            <a:prstGeom prst="ellipse">
-              <a:avLst/>
-            </a:prstGeom>
-            <a:solidFill>
-              <a:schemeClr val="tx1"/>
-            </a:solidFill>
-            <a:ln>
-              <a:solidFill>
-                <a:schemeClr val="tx1"/>
-              </a:solidFill>
-            </a:ln>
-          </p:spPr>
-          <p:style>
-            <a:lnRef idx="2">
-              <a:schemeClr val="accent1">
-                <a:shade val="50000"/>
-              </a:schemeClr>
-            </a:lnRef>
-            <a:fillRef idx="1">
-              <a:schemeClr val="accent1"/>
-            </a:fillRef>
-            <a:effectRef idx="0">
-              <a:schemeClr val="accent1"/>
-            </a:effectRef>
-            <a:fontRef idx="minor">
-              <a:schemeClr val="lt1"/>
-            </a:fontRef>
-          </p:style>
-          <p:txBody>
-            <a:bodyPr rtlCol="0" anchor="ctr"/>
-            <a:lstStyle/>
-            <a:p>
-              <a:pPr algn="ctr"/>
-              <a:endParaRPr lang="ko-KR" altLang="en-US"/>
-            </a:p>
-          </p:txBody>
-        </p:sp>
-      </p:grpSp>
       <p:cxnSp>
         <p:nvCxnSpPr>
           <p:cNvPr id="152" name="구부러진 연결선 151"/>
@@ -23432,7 +23663,7 @@
       </p:cxnSp>
       <p:grpSp>
         <p:nvGrpSpPr>
-          <p:cNvPr id="234" name="그룹 233"/>
+          <p:cNvPr id="4" name="그룹 3"/>
           <p:cNvGrpSpPr/>
           <p:nvPr/>
         </p:nvGrpSpPr>
@@ -23605,110 +23836,7 @@
       </p:grpSp>
       <p:grpSp>
         <p:nvGrpSpPr>
-          <p:cNvPr id="232" name="그룹 231"/>
-          <p:cNvGrpSpPr/>
-          <p:nvPr/>
-        </p:nvGrpSpPr>
-        <p:grpSpPr>
-          <a:xfrm>
-            <a:off x="7306015" y="3099879"/>
-            <a:ext cx="1013438" cy="2049465"/>
-            <a:chOff x="7306015" y="3099879"/>
-            <a:chExt cx="1013438" cy="2049465"/>
-          </a:xfrm>
-        </p:grpSpPr>
-        <p:sp>
-          <p:nvSpPr>
-            <p:cNvPr id="115" name="타원 114"/>
-            <p:cNvSpPr/>
-            <p:nvPr/>
-          </p:nvSpPr>
-          <p:spPr>
-            <a:xfrm>
-              <a:off x="8133922" y="4963813"/>
-              <a:ext cx="185531" cy="185531"/>
-            </a:xfrm>
-            <a:prstGeom prst="ellipse">
-              <a:avLst/>
-            </a:prstGeom>
-            <a:solidFill>
-              <a:schemeClr val="tx1"/>
-            </a:solidFill>
-            <a:ln>
-              <a:solidFill>
-                <a:schemeClr val="tx1"/>
-              </a:solidFill>
-            </a:ln>
-          </p:spPr>
-          <p:style>
-            <a:lnRef idx="2">
-              <a:schemeClr val="accent1">
-                <a:shade val="50000"/>
-              </a:schemeClr>
-            </a:lnRef>
-            <a:fillRef idx="1">
-              <a:schemeClr val="accent1"/>
-            </a:fillRef>
-            <a:effectRef idx="0">
-              <a:schemeClr val="accent1"/>
-            </a:effectRef>
-            <a:fontRef idx="minor">
-              <a:schemeClr val="lt1"/>
-            </a:fontRef>
-          </p:style>
-          <p:txBody>
-            <a:bodyPr rtlCol="0" anchor="ctr"/>
-            <a:lstStyle/>
-            <a:p>
-              <a:pPr algn="ctr"/>
-              <a:endParaRPr lang="ko-KR" altLang="en-US"/>
-            </a:p>
-          </p:txBody>
-        </p:sp>
-        <p:cxnSp>
-          <p:nvCxnSpPr>
-            <p:cNvPr id="171" name="구부러진 연결선 170"/>
-            <p:cNvCxnSpPr>
-              <a:stCxn id="104" idx="3"/>
-              <a:endCxn id="108" idx="3"/>
-            </p:cNvCxnSpPr>
-            <p:nvPr/>
-          </p:nvCxnSpPr>
-          <p:spPr>
-            <a:xfrm>
-              <a:off x="7306015" y="3099879"/>
-              <a:ext cx="854702" cy="2030598"/>
-            </a:xfrm>
-            <a:prstGeom prst="curvedConnector3">
-              <a:avLst>
-                <a:gd name="adj1" fmla="val 126746"/>
-              </a:avLst>
-            </a:prstGeom>
-            <a:ln w="38100">
-              <a:solidFill>
-                <a:schemeClr val="tx1"/>
-              </a:solidFill>
-            </a:ln>
-          </p:spPr>
-          <p:style>
-            <a:lnRef idx="1">
-              <a:schemeClr val="accent1"/>
-            </a:lnRef>
-            <a:fillRef idx="0">
-              <a:schemeClr val="accent1"/>
-            </a:fillRef>
-            <a:effectRef idx="0">
-              <a:schemeClr val="accent1"/>
-            </a:effectRef>
-            <a:fontRef idx="minor">
-              <a:schemeClr val="tx1"/>
-            </a:fontRef>
-          </p:style>
-        </p:cxnSp>
-      </p:grpSp>
-      <p:grpSp>
-        <p:nvGrpSpPr>
-          <p:cNvPr id="233" name="그룹 232"/>
+          <p:cNvPr id="3" name="그룹 2"/>
           <p:cNvGrpSpPr/>
           <p:nvPr/>
         </p:nvGrpSpPr>
@@ -23880,106 +24008,6 @@
             </p:style>
           </p:cxnSp>
         </p:grpSp>
-      </p:grpSp>
-      <p:grpSp>
-        <p:nvGrpSpPr>
-          <p:cNvPr id="235" name="그룹 234"/>
-          <p:cNvGrpSpPr/>
-          <p:nvPr/>
-        </p:nvGrpSpPr>
-        <p:grpSpPr>
-          <a:xfrm>
-            <a:off x="4802113" y="2546517"/>
-            <a:ext cx="1002925" cy="935238"/>
-            <a:chOff x="4802113" y="2546517"/>
-            <a:chExt cx="1002925" cy="935238"/>
-          </a:xfrm>
-        </p:grpSpPr>
-        <p:cxnSp>
-          <p:nvCxnSpPr>
-            <p:cNvPr id="167" name="구부러진 연결선 166"/>
-            <p:cNvCxnSpPr/>
-            <p:nvPr/>
-          </p:nvCxnSpPr>
-          <p:spPr>
-            <a:xfrm>
-              <a:off x="4802113" y="2546517"/>
-              <a:ext cx="1002925" cy="842473"/>
-            </a:xfrm>
-            <a:prstGeom prst="curvedConnector3">
-              <a:avLst>
-                <a:gd name="adj1" fmla="val 50000"/>
-              </a:avLst>
-            </a:prstGeom>
-            <a:ln w="38100">
-              <a:solidFill>
-                <a:schemeClr val="tx1"/>
-              </a:solidFill>
-            </a:ln>
-          </p:spPr>
-          <p:style>
-            <a:lnRef idx="1">
-              <a:schemeClr val="accent1"/>
-            </a:lnRef>
-            <a:fillRef idx="0">
-              <a:schemeClr val="accent1"/>
-            </a:fillRef>
-            <a:effectRef idx="0">
-              <a:schemeClr val="accent1"/>
-            </a:effectRef>
-            <a:fontRef idx="minor">
-              <a:schemeClr val="tx1"/>
-            </a:fontRef>
-          </p:style>
-        </p:cxnSp>
-        <p:sp>
-          <p:nvSpPr>
-            <p:cNvPr id="216" name="타원 215"/>
-            <p:cNvSpPr/>
-            <p:nvPr/>
-          </p:nvSpPr>
-          <p:spPr>
-            <a:xfrm>
-              <a:off x="5574110" y="3296224"/>
-              <a:ext cx="185531" cy="185531"/>
-            </a:xfrm>
-            <a:prstGeom prst="ellipse">
-              <a:avLst/>
-            </a:prstGeom>
-            <a:solidFill>
-              <a:schemeClr val="tx1"/>
-            </a:solidFill>
-            <a:ln>
-              <a:solidFill>
-                <a:schemeClr val="tx1"/>
-              </a:solidFill>
-            </a:ln>
-          </p:spPr>
-          <p:style>
-            <a:lnRef idx="2">
-              <a:schemeClr val="accent1">
-                <a:shade val="50000"/>
-              </a:schemeClr>
-            </a:lnRef>
-            <a:fillRef idx="1">
-              <a:schemeClr val="accent1"/>
-            </a:fillRef>
-            <a:effectRef idx="0">
-              <a:schemeClr val="accent1"/>
-            </a:effectRef>
-            <a:fontRef idx="minor">
-              <a:schemeClr val="lt1"/>
-            </a:fontRef>
-          </p:style>
-          <p:txBody>
-            <a:bodyPr rtlCol="0" anchor="ctr"/>
-            <a:lstStyle/>
-            <a:p>
-              <a:pPr algn="ctr"/>
-              <a:endParaRPr lang="ko-KR" altLang="en-US"/>
-            </a:p>
-          </p:txBody>
-        </p:sp>
       </p:grpSp>
       <p:grpSp>
         <p:nvGrpSpPr>
@@ -24328,6 +24356,453 @@
           </p:cxnSp>
         </p:grpSp>
       </p:grpSp>
+      <p:grpSp>
+        <p:nvGrpSpPr>
+          <p:cNvPr id="7" name="그룹 6"/>
+          <p:cNvGrpSpPr/>
+          <p:nvPr/>
+        </p:nvGrpSpPr>
+        <p:grpSpPr>
+          <a:xfrm>
+            <a:off x="4802113" y="2546517"/>
+            <a:ext cx="1059843" cy="938425"/>
+            <a:chOff x="4802113" y="2546517"/>
+            <a:chExt cx="1059843" cy="938425"/>
+          </a:xfrm>
+        </p:grpSpPr>
+        <p:cxnSp>
+          <p:nvCxnSpPr>
+            <p:cNvPr id="167" name="구부러진 연결선 166"/>
+            <p:cNvCxnSpPr/>
+            <p:nvPr/>
+          </p:nvCxnSpPr>
+          <p:spPr>
+            <a:xfrm>
+              <a:off x="4802113" y="2546517"/>
+              <a:ext cx="1002925" cy="842473"/>
+            </a:xfrm>
+            <a:prstGeom prst="curvedConnector3">
+              <a:avLst>
+                <a:gd name="adj1" fmla="val 50000"/>
+              </a:avLst>
+            </a:prstGeom>
+            <a:ln w="38100">
+              <a:solidFill>
+                <a:schemeClr val="tx1"/>
+              </a:solidFill>
+            </a:ln>
+          </p:spPr>
+          <p:style>
+            <a:lnRef idx="1">
+              <a:schemeClr val="accent1"/>
+            </a:lnRef>
+            <a:fillRef idx="0">
+              <a:schemeClr val="accent1"/>
+            </a:fillRef>
+            <a:effectRef idx="0">
+              <a:schemeClr val="accent1"/>
+            </a:effectRef>
+            <a:fontRef idx="minor">
+              <a:schemeClr val="tx1"/>
+            </a:fontRef>
+          </p:style>
+        </p:cxnSp>
+        <p:grpSp>
+          <p:nvGrpSpPr>
+            <p:cNvPr id="45" name="그룹 44"/>
+            <p:cNvGrpSpPr/>
+            <p:nvPr/>
+          </p:nvGrpSpPr>
+          <p:grpSpPr>
+            <a:xfrm>
+              <a:off x="5573045" y="3220077"/>
+              <a:ext cx="288911" cy="264865"/>
+              <a:chOff x="9721298" y="5410200"/>
+              <a:chExt cx="364711" cy="266700"/>
+            </a:xfrm>
+          </p:grpSpPr>
+          <p:cxnSp>
+            <p:nvCxnSpPr>
+              <p:cNvPr id="46" name="직선 연결선 45"/>
+              <p:cNvCxnSpPr/>
+              <p:nvPr/>
+            </p:nvCxnSpPr>
+            <p:spPr>
+              <a:xfrm>
+                <a:off x="9721298" y="5547127"/>
+                <a:ext cx="318052" cy="129773"/>
+              </a:xfrm>
+              <a:prstGeom prst="line">
+                <a:avLst/>
+              </a:prstGeom>
+              <a:ln w="38100">
+                <a:solidFill>
+                  <a:schemeClr val="tx1"/>
+                </a:solidFill>
+              </a:ln>
+            </p:spPr>
+            <p:style>
+              <a:lnRef idx="1">
+                <a:schemeClr val="accent1"/>
+              </a:lnRef>
+              <a:fillRef idx="0">
+                <a:schemeClr val="accent1"/>
+              </a:fillRef>
+              <a:effectRef idx="0">
+                <a:schemeClr val="accent1"/>
+              </a:effectRef>
+              <a:fontRef idx="minor">
+                <a:schemeClr val="tx1"/>
+              </a:fontRef>
+            </p:style>
+          </p:cxnSp>
+          <p:cxnSp>
+            <p:nvCxnSpPr>
+              <p:cNvPr id="47" name="직선 연결선 46"/>
+              <p:cNvCxnSpPr/>
+              <p:nvPr/>
+            </p:nvCxnSpPr>
+            <p:spPr>
+              <a:xfrm flipV="1">
+                <a:off x="9721298" y="5410200"/>
+                <a:ext cx="318052" cy="146856"/>
+              </a:xfrm>
+              <a:prstGeom prst="line">
+                <a:avLst/>
+              </a:prstGeom>
+              <a:ln w="38100">
+                <a:solidFill>
+                  <a:schemeClr val="tx1"/>
+                </a:solidFill>
+              </a:ln>
+            </p:spPr>
+            <p:style>
+              <a:lnRef idx="1">
+                <a:schemeClr val="accent1"/>
+              </a:lnRef>
+              <a:fillRef idx="0">
+                <a:schemeClr val="accent1"/>
+              </a:fillRef>
+              <a:effectRef idx="0">
+                <a:schemeClr val="accent1"/>
+              </a:effectRef>
+              <a:fontRef idx="minor">
+                <a:schemeClr val="tx1"/>
+              </a:fontRef>
+            </p:style>
+          </p:cxnSp>
+          <p:cxnSp>
+            <p:nvCxnSpPr>
+              <p:cNvPr id="48" name="직선 연결선 47"/>
+              <p:cNvCxnSpPr/>
+              <p:nvPr/>
+            </p:nvCxnSpPr>
+            <p:spPr>
+              <a:xfrm>
+                <a:off x="9735652" y="5547127"/>
+                <a:ext cx="350357" cy="0"/>
+              </a:xfrm>
+              <a:prstGeom prst="line">
+                <a:avLst/>
+              </a:prstGeom>
+              <a:ln w="38100">
+                <a:solidFill>
+                  <a:schemeClr val="tx1"/>
+                </a:solidFill>
+              </a:ln>
+            </p:spPr>
+            <p:style>
+              <a:lnRef idx="1">
+                <a:schemeClr val="accent1"/>
+              </a:lnRef>
+              <a:fillRef idx="0">
+                <a:schemeClr val="accent1"/>
+              </a:fillRef>
+              <a:effectRef idx="0">
+                <a:schemeClr val="accent1"/>
+              </a:effectRef>
+              <a:fontRef idx="minor">
+                <a:schemeClr val="tx1"/>
+              </a:fontRef>
+            </p:style>
+          </p:cxnSp>
+        </p:grpSp>
+      </p:grpSp>
+      <p:grpSp>
+        <p:nvGrpSpPr>
+          <p:cNvPr id="6" name="그룹 5"/>
+          <p:cNvGrpSpPr/>
+          <p:nvPr/>
+        </p:nvGrpSpPr>
+        <p:grpSpPr>
+          <a:xfrm>
+            <a:off x="2538836" y="2757014"/>
+            <a:ext cx="924805" cy="591694"/>
+            <a:chOff x="2538836" y="2757014"/>
+            <a:chExt cx="924805" cy="591694"/>
+          </a:xfrm>
+        </p:grpSpPr>
+        <p:cxnSp>
+          <p:nvCxnSpPr>
+            <p:cNvPr id="142" name="구부러진 연결선 141"/>
+            <p:cNvCxnSpPr>
+              <a:stCxn id="112" idx="3"/>
+            </p:cNvCxnSpPr>
+            <p:nvPr/>
+          </p:nvCxnSpPr>
+          <p:spPr>
+            <a:xfrm flipV="1">
+              <a:off x="2571290" y="2757014"/>
+              <a:ext cx="892351" cy="492393"/>
+            </a:xfrm>
+            <a:prstGeom prst="curvedConnector3">
+              <a:avLst/>
+            </a:prstGeom>
+            <a:ln w="38100">
+              <a:solidFill>
+                <a:schemeClr val="tx1"/>
+              </a:solidFill>
+            </a:ln>
+          </p:spPr>
+          <p:style>
+            <a:lnRef idx="1">
+              <a:schemeClr val="accent1"/>
+            </a:lnRef>
+            <a:fillRef idx="0">
+              <a:schemeClr val="accent1"/>
+            </a:fillRef>
+            <a:effectRef idx="0">
+              <a:schemeClr val="accent1"/>
+            </a:effectRef>
+            <a:fontRef idx="minor">
+              <a:schemeClr val="tx1"/>
+            </a:fontRef>
+          </p:style>
+        </p:cxnSp>
+        <p:grpSp>
+          <p:nvGrpSpPr>
+            <p:cNvPr id="5" name="그룹 4"/>
+            <p:cNvGrpSpPr/>
+            <p:nvPr/>
+          </p:nvGrpSpPr>
+          <p:grpSpPr>
+            <a:xfrm>
+              <a:off x="2538836" y="3099879"/>
+              <a:ext cx="198685" cy="248829"/>
+              <a:chOff x="2538836" y="3099879"/>
+              <a:chExt cx="198685" cy="248829"/>
+            </a:xfrm>
+          </p:grpSpPr>
+          <p:cxnSp>
+            <p:nvCxnSpPr>
+              <p:cNvPr id="50" name="직선 연결선 49"/>
+              <p:cNvCxnSpPr/>
+              <p:nvPr/>
+            </p:nvCxnSpPr>
+            <p:spPr>
+              <a:xfrm flipH="1">
+                <a:off x="2564255" y="3227631"/>
+                <a:ext cx="173266" cy="121077"/>
+              </a:xfrm>
+              <a:prstGeom prst="line">
+                <a:avLst/>
+              </a:prstGeom>
+              <a:ln w="38100">
+                <a:solidFill>
+                  <a:schemeClr val="tx1"/>
+                </a:solidFill>
+              </a:ln>
+            </p:spPr>
+            <p:style>
+              <a:lnRef idx="1">
+                <a:schemeClr val="accent1"/>
+              </a:lnRef>
+              <a:fillRef idx="0">
+                <a:schemeClr val="accent1"/>
+              </a:fillRef>
+              <a:effectRef idx="0">
+                <a:schemeClr val="accent1"/>
+              </a:effectRef>
+              <a:fontRef idx="minor">
+                <a:schemeClr val="tx1"/>
+              </a:fontRef>
+            </p:style>
+          </p:cxnSp>
+          <p:cxnSp>
+            <p:nvCxnSpPr>
+              <p:cNvPr id="51" name="직선 연결선 50"/>
+              <p:cNvCxnSpPr/>
+              <p:nvPr/>
+            </p:nvCxnSpPr>
+            <p:spPr>
+              <a:xfrm flipH="1" flipV="1">
+                <a:off x="2564255" y="3099879"/>
+                <a:ext cx="173266" cy="137015"/>
+              </a:xfrm>
+              <a:prstGeom prst="line">
+                <a:avLst/>
+              </a:prstGeom>
+              <a:ln w="38100">
+                <a:solidFill>
+                  <a:schemeClr val="tx1"/>
+                </a:solidFill>
+              </a:ln>
+            </p:spPr>
+            <p:style>
+              <a:lnRef idx="1">
+                <a:schemeClr val="accent1"/>
+              </a:lnRef>
+              <a:fillRef idx="0">
+                <a:schemeClr val="accent1"/>
+              </a:fillRef>
+              <a:effectRef idx="0">
+                <a:schemeClr val="accent1"/>
+              </a:effectRef>
+              <a:fontRef idx="minor">
+                <a:schemeClr val="tx1"/>
+              </a:fontRef>
+            </p:style>
+          </p:cxnSp>
+          <p:cxnSp>
+            <p:nvCxnSpPr>
+              <p:cNvPr id="52" name="직선 연결선 51"/>
+              <p:cNvCxnSpPr/>
+              <p:nvPr/>
+            </p:nvCxnSpPr>
+            <p:spPr>
+              <a:xfrm flipH="1">
+                <a:off x="2538836" y="3227631"/>
+                <a:ext cx="190865" cy="0"/>
+              </a:xfrm>
+              <a:prstGeom prst="line">
+                <a:avLst/>
+              </a:prstGeom>
+              <a:ln w="38100">
+                <a:solidFill>
+                  <a:schemeClr val="tx1"/>
+                </a:solidFill>
+              </a:ln>
+            </p:spPr>
+            <p:style>
+              <a:lnRef idx="1">
+                <a:schemeClr val="accent1"/>
+              </a:lnRef>
+              <a:fillRef idx="0">
+                <a:schemeClr val="accent1"/>
+              </a:fillRef>
+              <a:effectRef idx="0">
+                <a:schemeClr val="accent1"/>
+              </a:effectRef>
+              <a:fontRef idx="minor">
+                <a:schemeClr val="tx1"/>
+              </a:fontRef>
+            </p:style>
+          </p:cxnSp>
+        </p:grpSp>
+      </p:grpSp>
+      <p:grpSp>
+        <p:nvGrpSpPr>
+          <p:cNvPr id="232" name="그룹 231"/>
+          <p:cNvGrpSpPr/>
+          <p:nvPr/>
+        </p:nvGrpSpPr>
+        <p:grpSpPr>
+          <a:xfrm>
+            <a:off x="7306015" y="3099879"/>
+            <a:ext cx="1013438" cy="2049465"/>
+            <a:chOff x="7306015" y="3099879"/>
+            <a:chExt cx="1013438" cy="2049465"/>
+          </a:xfrm>
+        </p:grpSpPr>
+        <p:sp>
+          <p:nvSpPr>
+            <p:cNvPr id="115" name="타원 114"/>
+            <p:cNvSpPr/>
+            <p:nvPr/>
+          </p:nvSpPr>
+          <p:spPr>
+            <a:xfrm>
+              <a:off x="8133922" y="4963813"/>
+              <a:ext cx="185531" cy="185531"/>
+            </a:xfrm>
+            <a:prstGeom prst="ellipse">
+              <a:avLst/>
+            </a:prstGeom>
+            <a:solidFill>
+              <a:schemeClr val="tx1"/>
+            </a:solidFill>
+            <a:ln>
+              <a:solidFill>
+                <a:schemeClr val="tx1"/>
+              </a:solidFill>
+            </a:ln>
+          </p:spPr>
+          <p:style>
+            <a:lnRef idx="2">
+              <a:schemeClr val="accent1">
+                <a:shade val="50000"/>
+              </a:schemeClr>
+            </a:lnRef>
+            <a:fillRef idx="1">
+              <a:schemeClr val="accent1"/>
+            </a:fillRef>
+            <a:effectRef idx="0">
+              <a:schemeClr val="accent1"/>
+            </a:effectRef>
+            <a:fontRef idx="minor">
+              <a:schemeClr val="lt1"/>
+            </a:fontRef>
+          </p:style>
+          <p:txBody>
+            <a:bodyPr rtlCol="0" anchor="ctr"/>
+            <a:lstStyle/>
+            <a:p>
+              <a:pPr algn="ctr"/>
+              <a:endParaRPr lang="ko-KR" altLang="en-US"/>
+            </a:p>
+          </p:txBody>
+        </p:sp>
+        <p:cxnSp>
+          <p:nvCxnSpPr>
+            <p:cNvPr id="171" name="구부러진 연결선 170"/>
+            <p:cNvCxnSpPr>
+              <a:stCxn id="104" idx="3"/>
+              <a:endCxn id="108" idx="3"/>
+            </p:cNvCxnSpPr>
+            <p:nvPr/>
+          </p:nvCxnSpPr>
+          <p:spPr>
+            <a:xfrm>
+              <a:off x="7306015" y="3099879"/>
+              <a:ext cx="854702" cy="2030598"/>
+            </a:xfrm>
+            <a:prstGeom prst="curvedConnector3">
+              <a:avLst>
+                <a:gd name="adj1" fmla="val 126746"/>
+              </a:avLst>
+            </a:prstGeom>
+            <a:ln w="38100">
+              <a:solidFill>
+                <a:schemeClr val="tx1"/>
+              </a:solidFill>
+            </a:ln>
+          </p:spPr>
+          <p:style>
+            <a:lnRef idx="1">
+              <a:schemeClr val="accent1"/>
+            </a:lnRef>
+            <a:fillRef idx="0">
+              <a:schemeClr val="accent1"/>
+            </a:fillRef>
+            <a:effectRef idx="0">
+              <a:schemeClr val="accent1"/>
+            </a:effectRef>
+            <a:fontRef idx="minor">
+              <a:schemeClr val="tx1"/>
+            </a:fontRef>
+          </p:style>
+        </p:cxnSp>
+      </p:grpSp>
     </p:spTree>
     <p:extLst>
       <p:ext uri="{BB962C8B-B14F-4D97-AF65-F5344CB8AC3E}">
@@ -24494,7 +24969,7 @@
           <a:p>
             <a:pPr algn="ctr"/>
             <a:r>
-              <a:rPr lang="en-US" altLang="ko-KR" sz="2500" dirty="0" smtClean="0">
+              <a:rPr lang="en-US" altLang="ko-KR" sz="2300" dirty="0" smtClean="0">
                 <a:solidFill>
                   <a:schemeClr val="tx1"/>
                 </a:solidFill>
@@ -24503,7 +24978,7 @@
               </a:rPr>
               <a:t>(SQLite)</a:t>
             </a:r>
-            <a:endParaRPr lang="ko-KR" altLang="en-US" sz="2500" dirty="0">
+            <a:endParaRPr lang="ko-KR" altLang="en-US" sz="2300" dirty="0">
               <a:solidFill>
                 <a:schemeClr val="tx1"/>
               </a:solidFill>

</xml_diff>